<commit_message>
Perfil de usuário adicionado
</commit_message>
<xml_diff>
--- a/apresentação-do-sistema/apresentação-02.pptx
+++ b/apresentação-do-sistema/apresentação-02.pptx
@@ -8,8 +8,10 @@
     <p:sldId id="256" r:id="rId2"/>
     <p:sldId id="257" r:id="rId3"/>
     <p:sldId id="267" r:id="rId4"/>
-    <p:sldId id="269" r:id="rId5"/>
-    <p:sldId id="270" r:id="rId6"/>
+    <p:sldId id="272" r:id="rId5"/>
+    <p:sldId id="273" r:id="rId6"/>
+    <p:sldId id="269" r:id="rId7"/>
+    <p:sldId id="270" r:id="rId8"/>
   </p:sldIdLst>
   <p:sldSz cx="12192000" cy="6858000"/>
   <p:notesSz cx="6858000" cy="9144000"/>
@@ -304,7 +306,7 @@
           <a:p>
             <a:fld id="{3C6B3121-EEC5-4217-9790-EDD58901A106}" type="datetimeFigureOut">
               <a:rPr lang="pt-BR" smtClean="0"/>
-              <a:t>12/02/2021</a:t>
+              <a:t>18/02/2021</a:t>
             </a:fld>
             <a:endParaRPr lang="pt-BR"/>
           </a:p>
@@ -642,7 +644,7 @@
           <a:p>
             <a:fld id="{3C6B3121-EEC5-4217-9790-EDD58901A106}" type="datetimeFigureOut">
               <a:rPr lang="pt-BR" smtClean="0"/>
-              <a:t>12/02/2021</a:t>
+              <a:t>18/02/2021</a:t>
             </a:fld>
             <a:endParaRPr lang="pt-BR"/>
           </a:p>
@@ -1043,7 +1045,7 @@
           <a:p>
             <a:fld id="{3C6B3121-EEC5-4217-9790-EDD58901A106}" type="datetimeFigureOut">
               <a:rPr lang="pt-BR" smtClean="0"/>
-              <a:t>12/02/2021</a:t>
+              <a:t>18/02/2021</a:t>
             </a:fld>
             <a:endParaRPr lang="pt-BR"/>
           </a:p>
@@ -1379,7 +1381,7 @@
           <a:p>
             <a:fld id="{3C6B3121-EEC5-4217-9790-EDD58901A106}" type="datetimeFigureOut">
               <a:rPr lang="pt-BR" smtClean="0"/>
-              <a:t>12/02/2021</a:t>
+              <a:t>18/02/2021</a:t>
             </a:fld>
             <a:endParaRPr lang="pt-BR"/>
           </a:p>
@@ -1699,7 +1701,7 @@
           <a:p>
             <a:fld id="{3C6B3121-EEC5-4217-9790-EDD58901A106}" type="datetimeFigureOut">
               <a:rPr lang="pt-BR" smtClean="0"/>
-              <a:t>12/02/2021</a:t>
+              <a:t>18/02/2021</a:t>
             </a:fld>
             <a:endParaRPr lang="pt-BR"/>
           </a:p>
@@ -2095,7 +2097,7 @@
           <a:p>
             <a:fld id="{3C6B3121-EEC5-4217-9790-EDD58901A106}" type="datetimeFigureOut">
               <a:rPr lang="pt-BR" smtClean="0"/>
-              <a:t>12/02/2021</a:t>
+              <a:t>18/02/2021</a:t>
             </a:fld>
             <a:endParaRPr lang="pt-BR"/>
           </a:p>
@@ -2352,7 +2354,7 @@
           <a:p>
             <a:fld id="{3C6B3121-EEC5-4217-9790-EDD58901A106}" type="datetimeFigureOut">
               <a:rPr lang="pt-BR" smtClean="0"/>
-              <a:t>12/02/2021</a:t>
+              <a:t>18/02/2021</a:t>
             </a:fld>
             <a:endParaRPr lang="pt-BR"/>
           </a:p>
@@ -2614,7 +2616,7 @@
           <a:p>
             <a:fld id="{3C6B3121-EEC5-4217-9790-EDD58901A106}" type="datetimeFigureOut">
               <a:rPr lang="pt-BR" smtClean="0"/>
-              <a:t>12/02/2021</a:t>
+              <a:t>18/02/2021</a:t>
             </a:fld>
             <a:endParaRPr lang="pt-BR"/>
           </a:p>
@@ -2876,7 +2878,7 @@
           <a:p>
             <a:fld id="{3C6B3121-EEC5-4217-9790-EDD58901A106}" type="datetimeFigureOut">
               <a:rPr lang="pt-BR" smtClean="0"/>
-              <a:t>12/02/2021</a:t>
+              <a:t>18/02/2021</a:t>
             </a:fld>
             <a:endParaRPr lang="pt-BR"/>
           </a:p>
@@ -3205,7 +3207,7 @@
           <a:p>
             <a:fld id="{3C6B3121-EEC5-4217-9790-EDD58901A106}" type="datetimeFigureOut">
               <a:rPr lang="pt-BR" smtClean="0"/>
-              <a:t>12/02/2021</a:t>
+              <a:t>18/02/2021</a:t>
             </a:fld>
             <a:endParaRPr lang="pt-BR"/>
           </a:p>
@@ -3528,7 +3530,7 @@
           <a:p>
             <a:fld id="{3C6B3121-EEC5-4217-9790-EDD58901A106}" type="datetimeFigureOut">
               <a:rPr lang="pt-BR" smtClean="0"/>
-              <a:t>12/02/2021</a:t>
+              <a:t>18/02/2021</a:t>
             </a:fld>
             <a:endParaRPr lang="pt-BR"/>
           </a:p>
@@ -3985,7 +3987,7 @@
           <a:p>
             <a:fld id="{3C6B3121-EEC5-4217-9790-EDD58901A106}" type="datetimeFigureOut">
               <a:rPr lang="pt-BR" smtClean="0"/>
-              <a:t>12/02/2021</a:t>
+              <a:t>18/02/2021</a:t>
             </a:fld>
             <a:endParaRPr lang="pt-BR"/>
           </a:p>
@@ -4190,7 +4192,7 @@
           <a:p>
             <a:fld id="{3C6B3121-EEC5-4217-9790-EDD58901A106}" type="datetimeFigureOut">
               <a:rPr lang="pt-BR" smtClean="0"/>
-              <a:t>12/02/2021</a:t>
+              <a:t>18/02/2021</a:t>
             </a:fld>
             <a:endParaRPr lang="pt-BR"/>
           </a:p>
@@ -4367,7 +4369,7 @@
           <a:p>
             <a:fld id="{3C6B3121-EEC5-4217-9790-EDD58901A106}" type="datetimeFigureOut">
               <a:rPr lang="pt-BR" smtClean="0"/>
-              <a:t>12/02/2021</a:t>
+              <a:t>18/02/2021</a:t>
             </a:fld>
             <a:endParaRPr lang="pt-BR"/>
           </a:p>
@@ -4700,7 +4702,7 @@
           <a:p>
             <a:fld id="{3C6B3121-EEC5-4217-9790-EDD58901A106}" type="datetimeFigureOut">
               <a:rPr lang="pt-BR" smtClean="0"/>
-              <a:t>12/02/2021</a:t>
+              <a:t>18/02/2021</a:t>
             </a:fld>
             <a:endParaRPr lang="pt-BR"/>
           </a:p>
@@ -5045,7 +5047,7 @@
           <a:p>
             <a:fld id="{3C6B3121-EEC5-4217-9790-EDD58901A106}" type="datetimeFigureOut">
               <a:rPr lang="pt-BR" smtClean="0"/>
-              <a:t>12/02/2021</a:t>
+              <a:t>18/02/2021</a:t>
             </a:fld>
             <a:endParaRPr lang="pt-BR"/>
           </a:p>
@@ -7162,7 +7164,7 @@
           <a:p>
             <a:fld id="{3C6B3121-EEC5-4217-9790-EDD58901A106}" type="datetimeFigureOut">
               <a:rPr lang="pt-BR" smtClean="0"/>
-              <a:t>12/02/2021</a:t>
+              <a:t>18/02/2021</a:t>
             </a:fld>
             <a:endParaRPr lang="pt-BR"/>
           </a:p>
@@ -7877,17 +7879,6 @@
               <a:buAutoNum type="arabicPeriod"/>
             </a:pPr>
             <a:r>
-              <a:rPr lang="pt-BR" dirty="0" err="1"/>
-              <a:t>ClickOnMap</a:t>
-            </a:r>
-            <a:endParaRPr lang="pt-BR" dirty="0"/>
-          </a:p>
-          <a:p>
-            <a:pPr marL="514350" indent="-514350">
-              <a:buFont typeface="+mj-lt"/>
-              <a:buAutoNum type="arabicPeriod"/>
-            </a:pPr>
-            <a:r>
               <a:rPr lang="pt-BR" dirty="0"/>
               <a:t>Objetivos com o trabalho</a:t>
             </a:r>
@@ -8059,6 +8050,311 @@
 </file>
 
 <file path=ppt/slides/slide4.xml><?xml version="1.0" encoding="utf-8"?>
+<p:sld xmlns:a="http://schemas.openxmlformats.org/drawingml/2006/main" xmlns:r="http://schemas.openxmlformats.org/officeDocument/2006/relationships" xmlns:p="http://schemas.openxmlformats.org/presentationml/2006/main">
+  <p:cSld>
+    <p:spTree>
+      <p:nvGrpSpPr>
+        <p:cNvPr id="1" name=""/>
+        <p:cNvGrpSpPr/>
+        <p:nvPr/>
+      </p:nvGrpSpPr>
+      <p:grpSpPr>
+        <a:xfrm>
+          <a:off x="0" y="0"/>
+          <a:ext cx="0" cy="0"/>
+          <a:chOff x="0" y="0"/>
+          <a:chExt cx="0" cy="0"/>
+        </a:xfrm>
+      </p:grpSpPr>
+      <p:sp>
+        <p:nvSpPr>
+          <p:cNvPr id="2" name="Título 1">
+            <a:extLst>
+              <a:ext uri="{FF2B5EF4-FFF2-40B4-BE49-F238E27FC236}">
+                <a16:creationId xmlns:a16="http://schemas.microsoft.com/office/drawing/2014/main" id="{38F17D4B-1B57-45C1-A0F0-D3A58151502D}"/>
+              </a:ext>
+            </a:extLst>
+          </p:cNvPr>
+          <p:cNvSpPr>
+            <a:spLocks noGrp="1"/>
+          </p:cNvSpPr>
+          <p:nvPr>
+            <p:ph type="title"/>
+          </p:nvPr>
+        </p:nvSpPr>
+        <p:spPr/>
+        <p:txBody>
+          <a:bodyPr/>
+          <a:lstStyle/>
+          <a:p>
+            <a:r>
+              <a:rPr lang="pt-BR" dirty="0"/>
+              <a:t>3- Objetivos com o trabalho</a:t>
+            </a:r>
+          </a:p>
+        </p:txBody>
+      </p:sp>
+      <p:sp>
+        <p:nvSpPr>
+          <p:cNvPr id="3" name="Espaço Reservado para Conteúdo 2">
+            <a:extLst>
+              <a:ext uri="{FF2B5EF4-FFF2-40B4-BE49-F238E27FC236}">
+                <a16:creationId xmlns:a16="http://schemas.microsoft.com/office/drawing/2014/main" id="{E0E924DB-59EC-4539-B090-BDA922E66BB5}"/>
+              </a:ext>
+            </a:extLst>
+          </p:cNvPr>
+          <p:cNvSpPr>
+            <a:spLocks noGrp="1"/>
+          </p:cNvSpPr>
+          <p:nvPr>
+            <p:ph idx="1"/>
+          </p:nvPr>
+        </p:nvSpPr>
+        <p:spPr/>
+        <p:txBody>
+          <a:bodyPr/>
+          <a:lstStyle/>
+          <a:p>
+            <a:r>
+              <a:rPr lang="pt-BR" dirty="0"/>
+              <a:t>Utilização da biblioteca </a:t>
+            </a:r>
+            <a:r>
+              <a:rPr lang="pt-BR" dirty="0" err="1"/>
+              <a:t>Leaflet</a:t>
+            </a:r>
+            <a:r>
+              <a:rPr lang="pt-BR" dirty="0"/>
+              <a:t> para compor o mapa principal</a:t>
+            </a:r>
+          </a:p>
+          <a:p>
+            <a:r>
+              <a:rPr lang="pt-BR" dirty="0"/>
+              <a:t>Associar a colaboração a um dos tipos de dados vetoriais existentes – ponto, linha ou polígono (dimensionamento do fato observado)</a:t>
+            </a:r>
+          </a:p>
+          <a:p>
+            <a:r>
+              <a:rPr lang="pt-BR" dirty="0"/>
+              <a:t>Exportação dos dados no formato </a:t>
+            </a:r>
+            <a:r>
+              <a:rPr lang="pt-BR" dirty="0" err="1"/>
+              <a:t>geojson</a:t>
+            </a:r>
+            <a:r>
+              <a:rPr lang="pt-BR" dirty="0"/>
+              <a:t>, permitindo assim a leitura deles por qualquer sistema GIS (Sistema de Informação Geográfica)</a:t>
+            </a:r>
+          </a:p>
+        </p:txBody>
+      </p:sp>
+      <p:pic>
+        <p:nvPicPr>
+          <p:cNvPr id="5" name="Imagem 4">
+            <a:extLst>
+              <a:ext uri="{FF2B5EF4-FFF2-40B4-BE49-F238E27FC236}">
+                <a16:creationId xmlns:a16="http://schemas.microsoft.com/office/drawing/2014/main" id="{DA662172-9C97-4773-A555-08FFE52EE3B7}"/>
+              </a:ext>
+            </a:extLst>
+          </p:cNvPr>
+          <p:cNvPicPr>
+            <a:picLocks noChangeAspect="1"/>
+          </p:cNvPicPr>
+          <p:nvPr/>
+        </p:nvPicPr>
+        <p:blipFill>
+          <a:blip r:embed="rId2">
+            <a:extLst>
+              <a:ext uri="{28A0092B-C50C-407E-A947-70E740481C1C}">
+                <a14:useLocalDpi xmlns:a14="http://schemas.microsoft.com/office/drawing/2010/main" val="0"/>
+              </a:ext>
+            </a:extLst>
+          </a:blip>
+          <a:stretch>
+            <a:fillRect/>
+          </a:stretch>
+        </p:blipFill>
+        <p:spPr>
+          <a:xfrm>
+            <a:off x="10123535" y="2172311"/>
+            <a:ext cx="295470" cy="302153"/>
+          </a:xfrm>
+          <a:prstGeom prst="rect">
+            <a:avLst/>
+          </a:prstGeom>
+        </p:spPr>
+      </p:pic>
+      <p:pic>
+        <p:nvPicPr>
+          <p:cNvPr id="7" name="Imagem 6">
+            <a:extLst>
+              <a:ext uri="{FF2B5EF4-FFF2-40B4-BE49-F238E27FC236}">
+                <a16:creationId xmlns:a16="http://schemas.microsoft.com/office/drawing/2014/main" id="{65927178-6CC9-42EF-B492-DA0816FFE1EF}"/>
+              </a:ext>
+            </a:extLst>
+          </p:cNvPr>
+          <p:cNvPicPr>
+            <a:picLocks noChangeAspect="1"/>
+          </p:cNvPicPr>
+          <p:nvPr/>
+        </p:nvPicPr>
+        <p:blipFill>
+          <a:blip r:embed="rId2">
+            <a:extLst>
+              <a:ext uri="{28A0092B-C50C-407E-A947-70E740481C1C}">
+                <a14:useLocalDpi xmlns:a14="http://schemas.microsoft.com/office/drawing/2010/main" val="0"/>
+              </a:ext>
+            </a:extLst>
+          </a:blip>
+          <a:stretch>
+            <a:fillRect/>
+          </a:stretch>
+        </p:blipFill>
+        <p:spPr>
+          <a:xfrm>
+            <a:off x="10229364" y="2857960"/>
+            <a:ext cx="270684" cy="276806"/>
+          </a:xfrm>
+          <a:prstGeom prst="rect">
+            <a:avLst/>
+          </a:prstGeom>
+        </p:spPr>
+      </p:pic>
+      <p:pic>
+        <p:nvPicPr>
+          <p:cNvPr id="8" name="Imagem 7">
+            <a:extLst>
+              <a:ext uri="{FF2B5EF4-FFF2-40B4-BE49-F238E27FC236}">
+                <a16:creationId xmlns:a16="http://schemas.microsoft.com/office/drawing/2014/main" id="{8B7D1BFB-7507-4039-ABC9-7D2858D6C960}"/>
+              </a:ext>
+            </a:extLst>
+          </p:cNvPr>
+          <p:cNvPicPr>
+            <a:picLocks noChangeAspect="1"/>
+          </p:cNvPicPr>
+          <p:nvPr/>
+        </p:nvPicPr>
+        <p:blipFill>
+          <a:blip r:embed="rId2">
+            <a:extLst>
+              <a:ext uri="{28A0092B-C50C-407E-A947-70E740481C1C}">
+                <a14:useLocalDpi xmlns:a14="http://schemas.microsoft.com/office/drawing/2010/main" val="0"/>
+              </a:ext>
+            </a:extLst>
+          </a:blip>
+          <a:stretch>
+            <a:fillRect/>
+          </a:stretch>
+        </p:blipFill>
+        <p:spPr>
+          <a:xfrm>
+            <a:off x="9988193" y="3527913"/>
+            <a:ext cx="270684" cy="276806"/>
+          </a:xfrm>
+          <a:prstGeom prst="rect">
+            <a:avLst/>
+          </a:prstGeom>
+        </p:spPr>
+      </p:pic>
+    </p:spTree>
+    <p:extLst>
+      <p:ext uri="{BB962C8B-B14F-4D97-AF65-F5344CB8AC3E}">
+        <p14:creationId xmlns:p14="http://schemas.microsoft.com/office/powerpoint/2010/main" val="2762171324"/>
+      </p:ext>
+    </p:extLst>
+  </p:cSld>
+  <p:clrMapOvr>
+    <a:masterClrMapping/>
+  </p:clrMapOvr>
+</p:sld>
+</file>
+
+<file path=ppt/slides/slide5.xml><?xml version="1.0" encoding="utf-8"?>
+<p:sld xmlns:a="http://schemas.openxmlformats.org/drawingml/2006/main" xmlns:r="http://schemas.openxmlformats.org/officeDocument/2006/relationships" xmlns:p="http://schemas.openxmlformats.org/presentationml/2006/main">
+  <p:cSld>
+    <p:spTree>
+      <p:nvGrpSpPr>
+        <p:cNvPr id="1" name=""/>
+        <p:cNvGrpSpPr/>
+        <p:nvPr/>
+      </p:nvGrpSpPr>
+      <p:grpSpPr>
+        <a:xfrm>
+          <a:off x="0" y="0"/>
+          <a:ext cx="0" cy="0"/>
+          <a:chOff x="0" y="0"/>
+          <a:chExt cx="0" cy="0"/>
+        </a:xfrm>
+      </p:grpSpPr>
+      <p:sp>
+        <p:nvSpPr>
+          <p:cNvPr id="2" name="Título 1">
+            <a:extLst>
+              <a:ext uri="{FF2B5EF4-FFF2-40B4-BE49-F238E27FC236}">
+                <a16:creationId xmlns:a16="http://schemas.microsoft.com/office/drawing/2014/main" id="{157E5388-95B7-4E85-A673-595FE16EAD77}"/>
+              </a:ext>
+            </a:extLst>
+          </p:cNvPr>
+          <p:cNvSpPr>
+            <a:spLocks noGrp="1"/>
+          </p:cNvSpPr>
+          <p:nvPr>
+            <p:ph type="title"/>
+          </p:nvPr>
+        </p:nvSpPr>
+        <p:spPr/>
+        <p:txBody>
+          <a:bodyPr/>
+          <a:lstStyle/>
+          <a:p>
+            <a:r>
+              <a:rPr lang="pt-BR" dirty="0"/>
+              <a:t>4- O que resta fazer ?</a:t>
+            </a:r>
+          </a:p>
+        </p:txBody>
+      </p:sp>
+      <p:sp>
+        <p:nvSpPr>
+          <p:cNvPr id="3" name="Espaço Reservado para Conteúdo 2">
+            <a:extLst>
+              <a:ext uri="{FF2B5EF4-FFF2-40B4-BE49-F238E27FC236}">
+                <a16:creationId xmlns:a16="http://schemas.microsoft.com/office/drawing/2014/main" id="{6783E9C8-50AD-42D2-A414-079AB3262902}"/>
+              </a:ext>
+            </a:extLst>
+          </p:cNvPr>
+          <p:cNvSpPr>
+            <a:spLocks noGrp="1"/>
+          </p:cNvSpPr>
+          <p:nvPr>
+            <p:ph idx="1"/>
+          </p:nvPr>
+        </p:nvSpPr>
+        <p:spPr/>
+        <p:txBody>
+          <a:bodyPr/>
+          <a:lstStyle/>
+          <a:p>
+            <a:endParaRPr lang="pt-BR"/>
+          </a:p>
+        </p:txBody>
+      </p:sp>
+    </p:spTree>
+    <p:extLst>
+      <p:ext uri="{BB962C8B-B14F-4D97-AF65-F5344CB8AC3E}">
+        <p14:creationId xmlns:p14="http://schemas.microsoft.com/office/powerpoint/2010/main" val="3112294658"/>
+      </p:ext>
+    </p:extLst>
+  </p:cSld>
+  <p:clrMapOvr>
+    <a:masterClrMapping/>
+  </p:clrMapOvr>
+</p:sld>
+</file>
+
+<file path=ppt/slides/slide6.xml><?xml version="1.0" encoding="utf-8"?>
 <p:sld xmlns:a="http://schemas.openxmlformats.org/drawingml/2006/main" xmlns:r="http://schemas.openxmlformats.org/officeDocument/2006/relationships" xmlns:p="http://schemas.openxmlformats.org/presentationml/2006/main">
   <p:cSld>
     <p:spTree>
@@ -8573,7 +8869,7 @@
 </p:sld>
 </file>
 
-<file path=ppt/slides/slide5.xml><?xml version="1.0" encoding="utf-8"?>
+<file path=ppt/slides/slide7.xml><?xml version="1.0" encoding="utf-8"?>
 <p:sld xmlns:a="http://schemas.openxmlformats.org/drawingml/2006/main" xmlns:r="http://schemas.openxmlformats.org/officeDocument/2006/relationships" xmlns:p="http://schemas.openxmlformats.org/presentationml/2006/main">
   <p:cSld>
     <p:spTree>

</xml_diff>

<commit_message>
Adicionando Sequelize ao projeto
</commit_message>
<xml_diff>
--- a/apresentação-do-sistema/apresentação-02.pptx
+++ b/apresentação-do-sistema/apresentação-02.pptx
@@ -306,7 +306,7 @@
           <a:p>
             <a:fld id="{3C6B3121-EEC5-4217-9790-EDD58901A106}" type="datetimeFigureOut">
               <a:rPr lang="pt-BR" smtClean="0"/>
-              <a:t>18/02/2021</a:t>
+              <a:t>19/02/2021</a:t>
             </a:fld>
             <a:endParaRPr lang="pt-BR"/>
           </a:p>
@@ -644,7 +644,7 @@
           <a:p>
             <a:fld id="{3C6B3121-EEC5-4217-9790-EDD58901A106}" type="datetimeFigureOut">
               <a:rPr lang="pt-BR" smtClean="0"/>
-              <a:t>18/02/2021</a:t>
+              <a:t>19/02/2021</a:t>
             </a:fld>
             <a:endParaRPr lang="pt-BR"/>
           </a:p>
@@ -1045,7 +1045,7 @@
           <a:p>
             <a:fld id="{3C6B3121-EEC5-4217-9790-EDD58901A106}" type="datetimeFigureOut">
               <a:rPr lang="pt-BR" smtClean="0"/>
-              <a:t>18/02/2021</a:t>
+              <a:t>19/02/2021</a:t>
             </a:fld>
             <a:endParaRPr lang="pt-BR"/>
           </a:p>
@@ -1381,7 +1381,7 @@
           <a:p>
             <a:fld id="{3C6B3121-EEC5-4217-9790-EDD58901A106}" type="datetimeFigureOut">
               <a:rPr lang="pt-BR" smtClean="0"/>
-              <a:t>18/02/2021</a:t>
+              <a:t>19/02/2021</a:t>
             </a:fld>
             <a:endParaRPr lang="pt-BR"/>
           </a:p>
@@ -1701,7 +1701,7 @@
           <a:p>
             <a:fld id="{3C6B3121-EEC5-4217-9790-EDD58901A106}" type="datetimeFigureOut">
               <a:rPr lang="pt-BR" smtClean="0"/>
-              <a:t>18/02/2021</a:t>
+              <a:t>19/02/2021</a:t>
             </a:fld>
             <a:endParaRPr lang="pt-BR"/>
           </a:p>
@@ -2097,7 +2097,7 @@
           <a:p>
             <a:fld id="{3C6B3121-EEC5-4217-9790-EDD58901A106}" type="datetimeFigureOut">
               <a:rPr lang="pt-BR" smtClean="0"/>
-              <a:t>18/02/2021</a:t>
+              <a:t>19/02/2021</a:t>
             </a:fld>
             <a:endParaRPr lang="pt-BR"/>
           </a:p>
@@ -2354,7 +2354,7 @@
           <a:p>
             <a:fld id="{3C6B3121-EEC5-4217-9790-EDD58901A106}" type="datetimeFigureOut">
               <a:rPr lang="pt-BR" smtClean="0"/>
-              <a:t>18/02/2021</a:t>
+              <a:t>19/02/2021</a:t>
             </a:fld>
             <a:endParaRPr lang="pt-BR"/>
           </a:p>
@@ -2616,7 +2616,7 @@
           <a:p>
             <a:fld id="{3C6B3121-EEC5-4217-9790-EDD58901A106}" type="datetimeFigureOut">
               <a:rPr lang="pt-BR" smtClean="0"/>
-              <a:t>18/02/2021</a:t>
+              <a:t>19/02/2021</a:t>
             </a:fld>
             <a:endParaRPr lang="pt-BR"/>
           </a:p>
@@ -2878,7 +2878,7 @@
           <a:p>
             <a:fld id="{3C6B3121-EEC5-4217-9790-EDD58901A106}" type="datetimeFigureOut">
               <a:rPr lang="pt-BR" smtClean="0"/>
-              <a:t>18/02/2021</a:t>
+              <a:t>19/02/2021</a:t>
             </a:fld>
             <a:endParaRPr lang="pt-BR"/>
           </a:p>
@@ -3207,7 +3207,7 @@
           <a:p>
             <a:fld id="{3C6B3121-EEC5-4217-9790-EDD58901A106}" type="datetimeFigureOut">
               <a:rPr lang="pt-BR" smtClean="0"/>
-              <a:t>18/02/2021</a:t>
+              <a:t>19/02/2021</a:t>
             </a:fld>
             <a:endParaRPr lang="pt-BR"/>
           </a:p>
@@ -3530,7 +3530,7 @@
           <a:p>
             <a:fld id="{3C6B3121-EEC5-4217-9790-EDD58901A106}" type="datetimeFigureOut">
               <a:rPr lang="pt-BR" smtClean="0"/>
-              <a:t>18/02/2021</a:t>
+              <a:t>19/02/2021</a:t>
             </a:fld>
             <a:endParaRPr lang="pt-BR"/>
           </a:p>
@@ -3987,7 +3987,7 @@
           <a:p>
             <a:fld id="{3C6B3121-EEC5-4217-9790-EDD58901A106}" type="datetimeFigureOut">
               <a:rPr lang="pt-BR" smtClean="0"/>
-              <a:t>18/02/2021</a:t>
+              <a:t>19/02/2021</a:t>
             </a:fld>
             <a:endParaRPr lang="pt-BR"/>
           </a:p>
@@ -4192,7 +4192,7 @@
           <a:p>
             <a:fld id="{3C6B3121-EEC5-4217-9790-EDD58901A106}" type="datetimeFigureOut">
               <a:rPr lang="pt-BR" smtClean="0"/>
-              <a:t>18/02/2021</a:t>
+              <a:t>19/02/2021</a:t>
             </a:fld>
             <a:endParaRPr lang="pt-BR"/>
           </a:p>
@@ -4369,7 +4369,7 @@
           <a:p>
             <a:fld id="{3C6B3121-EEC5-4217-9790-EDD58901A106}" type="datetimeFigureOut">
               <a:rPr lang="pt-BR" smtClean="0"/>
-              <a:t>18/02/2021</a:t>
+              <a:t>19/02/2021</a:t>
             </a:fld>
             <a:endParaRPr lang="pt-BR"/>
           </a:p>
@@ -4702,7 +4702,7 @@
           <a:p>
             <a:fld id="{3C6B3121-EEC5-4217-9790-EDD58901A106}" type="datetimeFigureOut">
               <a:rPr lang="pt-BR" smtClean="0"/>
-              <a:t>18/02/2021</a:t>
+              <a:t>19/02/2021</a:t>
             </a:fld>
             <a:endParaRPr lang="pt-BR"/>
           </a:p>
@@ -5047,7 +5047,7 @@
           <a:p>
             <a:fld id="{3C6B3121-EEC5-4217-9790-EDD58901A106}" type="datetimeFigureOut">
               <a:rPr lang="pt-BR" smtClean="0"/>
-              <a:t>18/02/2021</a:t>
+              <a:t>19/02/2021</a:t>
             </a:fld>
             <a:endParaRPr lang="pt-BR"/>
           </a:p>
@@ -7164,7 +7164,7 @@
           <a:p>
             <a:fld id="{3C6B3121-EEC5-4217-9790-EDD58901A106}" type="datetimeFigureOut">
               <a:rPr lang="pt-BR" smtClean="0"/>
-              <a:t>18/02/2021</a:t>
+              <a:t>19/02/2021</a:t>
             </a:fld>
             <a:endParaRPr lang="pt-BR"/>
           </a:p>
@@ -7870,16 +7870,6 @@
             </a:pPr>
             <a:r>
               <a:rPr lang="pt-BR" dirty="0"/>
-              <a:t>Principais conceitos</a:t>
-            </a:r>
-          </a:p>
-          <a:p>
-            <a:pPr marL="514350" indent="-514350">
-              <a:buFont typeface="+mj-lt"/>
-              <a:buAutoNum type="arabicPeriod"/>
-            </a:pPr>
-            <a:r>
-              <a:rPr lang="pt-BR" dirty="0"/>
               <a:t>Objetivos com o trabalho</a:t>
             </a:r>
           </a:p>
@@ -7975,7 +7965,7 @@
           <a:p>
             <a:r>
               <a:rPr lang="pt-BR" dirty="0"/>
-              <a:t>3- Objetivos com o trabalho</a:t>
+              <a:t>1- Objetivos com o trabalho</a:t>
             </a:r>
           </a:p>
         </p:txBody>
@@ -8089,7 +8079,7 @@
           <a:p>
             <a:r>
               <a:rPr lang="pt-BR" dirty="0"/>
-              <a:t>3- Objetivos com o trabalho</a:t>
+              <a:t>2- Progresso com o trabalho</a:t>
             </a:r>
           </a:p>
         </p:txBody>
@@ -8145,7 +8135,15 @@
             </a:r>
             <a:r>
               <a:rPr lang="pt-BR" dirty="0"/>
-              <a:t>, permitindo assim a leitura deles por qualquer sistema GIS (Sistema de Informação Geográfica)</a:t>
+              <a:t> (e </a:t>
+            </a:r>
+            <a:r>
+              <a:rPr lang="pt-BR" dirty="0" err="1"/>
+              <a:t>csv</a:t>
+            </a:r>
+            <a:r>
+              <a:rPr lang="pt-BR" dirty="0"/>
+              <a:t>), permitindo assim a leitura deles por qualquer sistema GIS (Sistema de Informação Geográfica)</a:t>
             </a:r>
           </a:p>
         </p:txBody>
@@ -8250,7 +8248,7 @@
         </p:blipFill>
         <p:spPr>
           <a:xfrm>
-            <a:off x="9988193" y="3527913"/>
+            <a:off x="11369270" y="3546575"/>
             <a:ext cx="270684" cy="276806"/>
           </a:xfrm>
           <a:prstGeom prst="rect">
@@ -8415,14 +8413,14 @@
             <p:ph idx="1"/>
             <p:extLst>
               <p:ext uri="{D42A27DB-BD31-4B8C-83A1-F6EECF244321}">
-                <p14:modId xmlns:p14="http://schemas.microsoft.com/office/powerpoint/2010/main" val="4044522003"/>
+                <p14:modId xmlns:p14="http://schemas.microsoft.com/office/powerpoint/2010/main" val="1860907069"/>
               </p:ext>
             </p:extLst>
           </p:nvPr>
         </p:nvGraphicFramePr>
         <p:xfrm>
           <a:off x="933063" y="2105607"/>
-          <a:ext cx="10851470" cy="2416007"/>
+          <a:ext cx="10851470" cy="3056087"/>
         </p:xfrm>
         <a:graphic>
           <a:graphicData uri="http://schemas.openxmlformats.org/drawingml/2006/table">
@@ -8571,7 +8569,11 @@
                       </a:r>
                     </a:p>
                   </a:txBody>
-                  <a:tcPr marL="77525" marR="77525"/>
+                  <a:tcPr marL="77525" marR="77525">
+                    <a:solidFill>
+                      <a:srgbClr val="00B050"/>
+                    </a:solidFill>
+                  </a:tcPr>
                 </a:tc>
                 <a:tc>
                   <a:txBody>
@@ -8585,7 +8587,11 @@
                       </a:r>
                     </a:p>
                   </a:txBody>
-                  <a:tcPr marL="77525" marR="77525"/>
+                  <a:tcPr marL="77525" marR="77525">
+                    <a:solidFill>
+                      <a:srgbClr val="00B050"/>
+                    </a:solidFill>
+                  </a:tcPr>
                 </a:tc>
                 <a:tc>
                   <a:txBody>
@@ -8642,7 +8648,11 @@
                       </a:r>
                     </a:p>
                   </a:txBody>
-                  <a:tcPr marL="77525" marR="77525"/>
+                  <a:tcPr marL="77525" marR="77525">
+                    <a:solidFill>
+                      <a:srgbClr val="00B050"/>
+                    </a:solidFill>
+                  </a:tcPr>
                 </a:tc>
                 <a:tc>
                   <a:txBody>
@@ -8650,7 +8660,7 @@
                     <a:lstStyle/>
                     <a:p>
                       <a:pPr algn="ctr"/>
-                      <a:endParaRPr lang="pt-BR"/>
+                      <a:endParaRPr lang="pt-BR" dirty="0"/>
                     </a:p>
                   </a:txBody>
                   <a:tcPr marL="77525" marR="77525"/>
@@ -8661,7 +8671,7 @@
                     <a:lstStyle/>
                     <a:p>
                       <a:pPr algn="ctr"/>
-                      <a:endParaRPr lang="pt-BR"/>
+                      <a:endParaRPr lang="pt-BR" dirty="0"/>
                     </a:p>
                   </a:txBody>
                   <a:tcPr marL="77525" marR="77525"/>
@@ -8672,7 +8682,7 @@
                     <a:lstStyle/>
                     <a:p>
                       <a:pPr algn="ctr"/>
-                      <a:endParaRPr lang="pt-BR"/>
+                      <a:endParaRPr lang="pt-BR" dirty="0"/>
                     </a:p>
                   </a:txBody>
                   <a:tcPr marL="77525" marR="77525"/>
@@ -8710,7 +8720,11 @@
                       </a:r>
                     </a:p>
                   </a:txBody>
-                  <a:tcPr marL="77525" marR="77525"/>
+                  <a:tcPr marL="77525" marR="77525">
+                    <a:solidFill>
+                      <a:srgbClr val="00B050"/>
+                    </a:solidFill>
+                  </a:tcPr>
                 </a:tc>
                 <a:tc>
                   <a:txBody>
@@ -8802,7 +8816,11 @@
                       </a:r>
                     </a:p>
                   </a:txBody>
-                  <a:tcPr marL="77525" marR="77525"/>
+                  <a:tcPr marL="77525" marR="77525">
+                    <a:solidFill>
+                      <a:srgbClr val="00B050"/>
+                    </a:solidFill>
+                  </a:tcPr>
                 </a:tc>
                 <a:tc>
                   <a:txBody>
@@ -8849,6 +8867,81 @@
                 <a:extLst>
                   <a:ext uri="{0D108BD9-81ED-4DB2-BD59-A6C34878D82A}">
                     <a16:rowId xmlns:a16="http://schemas.microsoft.com/office/drawing/2014/main" val="296084593"/>
+                  </a:ext>
+                </a:extLst>
+              </a:tr>
+              <a:tr h="375776">
+                <a:tc>
+                  <a:txBody>
+                    <a:bodyPr/>
+                    <a:lstStyle/>
+                    <a:p>
+                      <a:pPr algn="ctr"/>
+                      <a:r>
+                        <a:rPr lang="pt-BR" dirty="0"/>
+                        <a:t>Revisão de código</a:t>
+                      </a:r>
+                    </a:p>
+                  </a:txBody>
+                  <a:tcPr marL="77525" marR="77525"/>
+                </a:tc>
+                <a:tc>
+                  <a:txBody>
+                    <a:bodyPr/>
+                    <a:lstStyle/>
+                    <a:p>
+                      <a:pPr algn="ctr"/>
+                      <a:endParaRPr lang="pt-BR" dirty="0"/>
+                    </a:p>
+                  </a:txBody>
+                  <a:tcPr marL="77525" marR="77525">
+                    <a:solidFill>
+                      <a:srgbClr val="CBCBCB"/>
+                    </a:solidFill>
+                  </a:tcPr>
+                </a:tc>
+                <a:tc>
+                  <a:txBody>
+                    <a:bodyPr/>
+                    <a:lstStyle/>
+                    <a:p>
+                      <a:pPr algn="ctr"/>
+                      <a:endParaRPr lang="pt-BR" dirty="0"/>
+                    </a:p>
+                  </a:txBody>
+                  <a:tcPr marL="77525" marR="77525"/>
+                </a:tc>
+                <a:tc>
+                  <a:txBody>
+                    <a:bodyPr/>
+                    <a:lstStyle/>
+                    <a:p>
+                      <a:pPr algn="ctr"/>
+                      <a:r>
+                        <a:rPr lang="pt-BR" dirty="0"/>
+                        <a:t>X</a:t>
+                      </a:r>
+                    </a:p>
+                  </a:txBody>
+                  <a:tcPr marL="77525" marR="77525"/>
+                </a:tc>
+                <a:tc>
+                  <a:txBody>
+                    <a:bodyPr/>
+                    <a:lstStyle/>
+                    <a:p>
+                      <a:pPr algn="ctr"/>
+                      <a:r>
+                        <a:rPr lang="pt-BR" dirty="0"/>
+                        <a:t>X</a:t>
+                      </a:r>
+                    </a:p>
+                  </a:txBody>
+                  <a:tcPr marL="77525" marR="77525"/>
+                </a:tc>
+                <a:extLst>
+                  <a:ext uri="{0D108BD9-81ED-4DB2-BD59-A6C34878D82A}">
+                    <a16:rowId xmlns:a16="http://schemas.microsoft.com/office/drawing/2014/main" val="1879830854"/>
                   </a:ext>
                 </a:extLst>
               </a:tr>

</xml_diff>

<commit_message>
Inserção de usuários corrigida
</commit_message>
<xml_diff>
--- a/apresentação-do-sistema/apresentação-02.pptx
+++ b/apresentação-do-sistema/apresentação-02.pptx
@@ -4,14 +4,19 @@
   <p:sldMasterIdLst>
     <p:sldMasterId id="2147483718" r:id="rId1"/>
   </p:sldMasterIdLst>
+  <p:notesMasterIdLst>
+    <p:notesMasterId r:id="rId11"/>
+  </p:notesMasterIdLst>
   <p:sldIdLst>
     <p:sldId id="256" r:id="rId2"/>
     <p:sldId id="257" r:id="rId3"/>
     <p:sldId id="267" r:id="rId4"/>
     <p:sldId id="272" r:id="rId5"/>
-    <p:sldId id="273" r:id="rId6"/>
-    <p:sldId id="269" r:id="rId7"/>
-    <p:sldId id="270" r:id="rId8"/>
+    <p:sldId id="274" r:id="rId6"/>
+    <p:sldId id="275" r:id="rId7"/>
+    <p:sldId id="273" r:id="rId8"/>
+    <p:sldId id="269" r:id="rId9"/>
+    <p:sldId id="270" r:id="rId10"/>
   </p:sldIdLst>
   <p:sldSz cx="12192000" cy="6858000"/>
   <p:notesSz cx="6858000" cy="9144000"/>
@@ -118,6 +123,355 @@
 </p:presentation>
 </file>
 
+<file path=ppt/notesMasters/notesMaster1.xml><?xml version="1.0" encoding="utf-8"?>
+<p:notesMaster xmlns:a="http://schemas.openxmlformats.org/drawingml/2006/main" xmlns:r="http://schemas.openxmlformats.org/officeDocument/2006/relationships" xmlns:p="http://schemas.openxmlformats.org/presentationml/2006/main">
+  <p:cSld>
+    <p:bg>
+      <p:bgRef idx="1001">
+        <a:schemeClr val="bg1"/>
+      </p:bgRef>
+    </p:bg>
+    <p:spTree>
+      <p:nvGrpSpPr>
+        <p:cNvPr id="1" name=""/>
+        <p:cNvGrpSpPr/>
+        <p:nvPr/>
+      </p:nvGrpSpPr>
+      <p:grpSpPr>
+        <a:xfrm>
+          <a:off x="0" y="0"/>
+          <a:ext cx="0" cy="0"/>
+          <a:chOff x="0" y="0"/>
+          <a:chExt cx="0" cy="0"/>
+        </a:xfrm>
+      </p:grpSpPr>
+      <p:sp>
+        <p:nvSpPr>
+          <p:cNvPr id="2" name="Espaço Reservado para Cabeçalho 1"/>
+          <p:cNvSpPr>
+            <a:spLocks noGrp="1"/>
+          </p:cNvSpPr>
+          <p:nvPr>
+            <p:ph type="hdr" sz="quarter"/>
+          </p:nvPr>
+        </p:nvSpPr>
+        <p:spPr>
+          <a:xfrm>
+            <a:off x="0" y="0"/>
+            <a:ext cx="2971800" cy="458788"/>
+          </a:xfrm>
+          <a:prstGeom prst="rect">
+            <a:avLst/>
+          </a:prstGeom>
+        </p:spPr>
+        <p:txBody>
+          <a:bodyPr vert="horz" lIns="91440" tIns="45720" rIns="91440" bIns="45720" rtlCol="0"/>
+          <a:lstStyle>
+            <a:lvl1pPr algn="l">
+              <a:defRPr sz="1200"/>
+            </a:lvl1pPr>
+          </a:lstStyle>
+          <a:p>
+            <a:endParaRPr lang="pt-BR"/>
+          </a:p>
+        </p:txBody>
+      </p:sp>
+      <p:sp>
+        <p:nvSpPr>
+          <p:cNvPr id="3" name="Espaço Reservado para Data 2"/>
+          <p:cNvSpPr>
+            <a:spLocks noGrp="1"/>
+          </p:cNvSpPr>
+          <p:nvPr>
+            <p:ph type="dt" idx="1"/>
+          </p:nvPr>
+        </p:nvSpPr>
+        <p:spPr>
+          <a:xfrm>
+            <a:off x="3884613" y="0"/>
+            <a:ext cx="2971800" cy="458788"/>
+          </a:xfrm>
+          <a:prstGeom prst="rect">
+            <a:avLst/>
+          </a:prstGeom>
+        </p:spPr>
+        <p:txBody>
+          <a:bodyPr vert="horz" lIns="91440" tIns="45720" rIns="91440" bIns="45720" rtlCol="0"/>
+          <a:lstStyle>
+            <a:lvl1pPr algn="r">
+              <a:defRPr sz="1200"/>
+            </a:lvl1pPr>
+          </a:lstStyle>
+          <a:p>
+            <a:fld id="{8C641393-FDFC-4B54-ACAC-19209947AB45}" type="datetimeFigureOut">
+              <a:rPr lang="pt-BR" smtClean="0"/>
+              <a:t>25/02/2021</a:t>
+            </a:fld>
+            <a:endParaRPr lang="pt-BR"/>
+          </a:p>
+        </p:txBody>
+      </p:sp>
+      <p:sp>
+        <p:nvSpPr>
+          <p:cNvPr id="4" name="Espaço Reservado para Imagem de Slide 3"/>
+          <p:cNvSpPr>
+            <a:spLocks noGrp="1" noRot="1" noChangeAspect="1"/>
+          </p:cNvSpPr>
+          <p:nvPr>
+            <p:ph type="sldImg" idx="2"/>
+          </p:nvPr>
+        </p:nvSpPr>
+        <p:spPr>
+          <a:xfrm>
+            <a:off x="685800" y="1143000"/>
+            <a:ext cx="5486400" cy="3086100"/>
+          </a:xfrm>
+          <a:prstGeom prst="rect">
+            <a:avLst/>
+          </a:prstGeom>
+          <a:noFill/>
+          <a:ln w="12700">
+            <a:solidFill>
+              <a:prstClr val="black"/>
+            </a:solidFill>
+          </a:ln>
+        </p:spPr>
+        <p:txBody>
+          <a:bodyPr vert="horz" lIns="91440" tIns="45720" rIns="91440" bIns="45720" rtlCol="0" anchor="ctr"/>
+          <a:lstStyle/>
+          <a:p>
+            <a:endParaRPr lang="pt-BR"/>
+          </a:p>
+        </p:txBody>
+      </p:sp>
+      <p:sp>
+        <p:nvSpPr>
+          <p:cNvPr id="5" name="Espaço Reservado para Anotações 4"/>
+          <p:cNvSpPr>
+            <a:spLocks noGrp="1"/>
+          </p:cNvSpPr>
+          <p:nvPr>
+            <p:ph type="body" sz="quarter" idx="3"/>
+          </p:nvPr>
+        </p:nvSpPr>
+        <p:spPr>
+          <a:xfrm>
+            <a:off x="685800" y="4400550"/>
+            <a:ext cx="5486400" cy="3600450"/>
+          </a:xfrm>
+          <a:prstGeom prst="rect">
+            <a:avLst/>
+          </a:prstGeom>
+        </p:spPr>
+        <p:txBody>
+          <a:bodyPr vert="horz" lIns="91440" tIns="45720" rIns="91440" bIns="45720" rtlCol="0"/>
+          <a:lstStyle/>
+          <a:p>
+            <a:pPr lvl="0"/>
+            <a:r>
+              <a:rPr lang="pt-BR"/>
+              <a:t>Clique para editar os estilos de texto Mestres</a:t>
+            </a:r>
+          </a:p>
+          <a:p>
+            <a:pPr lvl="1"/>
+            <a:r>
+              <a:rPr lang="pt-BR"/>
+              <a:t>Segundo nível</a:t>
+            </a:r>
+          </a:p>
+          <a:p>
+            <a:pPr lvl="2"/>
+            <a:r>
+              <a:rPr lang="pt-BR"/>
+              <a:t>Terceiro nível</a:t>
+            </a:r>
+          </a:p>
+          <a:p>
+            <a:pPr lvl="3"/>
+            <a:r>
+              <a:rPr lang="pt-BR"/>
+              <a:t>Quarto nível</a:t>
+            </a:r>
+          </a:p>
+          <a:p>
+            <a:pPr lvl="4"/>
+            <a:r>
+              <a:rPr lang="pt-BR"/>
+              <a:t>Quinto nível</a:t>
+            </a:r>
+          </a:p>
+        </p:txBody>
+      </p:sp>
+      <p:sp>
+        <p:nvSpPr>
+          <p:cNvPr id="6" name="Espaço Reservado para Rodapé 5"/>
+          <p:cNvSpPr>
+            <a:spLocks noGrp="1"/>
+          </p:cNvSpPr>
+          <p:nvPr>
+            <p:ph type="ftr" sz="quarter" idx="4"/>
+          </p:nvPr>
+        </p:nvSpPr>
+        <p:spPr>
+          <a:xfrm>
+            <a:off x="0" y="8685213"/>
+            <a:ext cx="2971800" cy="458787"/>
+          </a:xfrm>
+          <a:prstGeom prst="rect">
+            <a:avLst/>
+          </a:prstGeom>
+        </p:spPr>
+        <p:txBody>
+          <a:bodyPr vert="horz" lIns="91440" tIns="45720" rIns="91440" bIns="45720" rtlCol="0" anchor="b"/>
+          <a:lstStyle>
+            <a:lvl1pPr algn="l">
+              <a:defRPr sz="1200"/>
+            </a:lvl1pPr>
+          </a:lstStyle>
+          <a:p>
+            <a:endParaRPr lang="pt-BR"/>
+          </a:p>
+        </p:txBody>
+      </p:sp>
+      <p:sp>
+        <p:nvSpPr>
+          <p:cNvPr id="7" name="Espaço Reservado para Número de Slide 6"/>
+          <p:cNvSpPr>
+            <a:spLocks noGrp="1"/>
+          </p:cNvSpPr>
+          <p:nvPr>
+            <p:ph type="sldNum" sz="quarter" idx="5"/>
+          </p:nvPr>
+        </p:nvSpPr>
+        <p:spPr>
+          <a:xfrm>
+            <a:off x="3884613" y="8685213"/>
+            <a:ext cx="2971800" cy="458787"/>
+          </a:xfrm>
+          <a:prstGeom prst="rect">
+            <a:avLst/>
+          </a:prstGeom>
+        </p:spPr>
+        <p:txBody>
+          <a:bodyPr vert="horz" lIns="91440" tIns="45720" rIns="91440" bIns="45720" rtlCol="0" anchor="b"/>
+          <a:lstStyle>
+            <a:lvl1pPr algn="r">
+              <a:defRPr sz="1200"/>
+            </a:lvl1pPr>
+          </a:lstStyle>
+          <a:p>
+            <a:fld id="{A81D176C-D441-46B6-8AEF-1747D75A7ABD}" type="slidenum">
+              <a:rPr lang="pt-BR" smtClean="0"/>
+              <a:t>‹nº›</a:t>
+            </a:fld>
+            <a:endParaRPr lang="pt-BR"/>
+          </a:p>
+        </p:txBody>
+      </p:sp>
+    </p:spTree>
+    <p:extLst>
+      <p:ext uri="{BB962C8B-B14F-4D97-AF65-F5344CB8AC3E}">
+        <p14:creationId xmlns:p14="http://schemas.microsoft.com/office/powerpoint/2010/main" val="1250511085"/>
+      </p:ext>
+    </p:extLst>
+  </p:cSld>
+  <p:clrMap bg1="lt1" tx1="dk1" bg2="lt2" tx2="dk2" accent1="accent1" accent2="accent2" accent3="accent3" accent4="accent4" accent5="accent5" accent6="accent6" hlink="hlink" folHlink="folHlink"/>
+  <p:notesStyle>
+    <a:lvl1pPr marL="0" algn="l" defTabSz="914400" rtl="0" eaLnBrk="1" latinLnBrk="0" hangingPunct="1">
+      <a:defRPr sz="1200" kern="1200">
+        <a:solidFill>
+          <a:schemeClr val="tx1"/>
+        </a:solidFill>
+        <a:latin typeface="+mn-lt"/>
+        <a:ea typeface="+mn-ea"/>
+        <a:cs typeface="+mn-cs"/>
+      </a:defRPr>
+    </a:lvl1pPr>
+    <a:lvl2pPr marL="457200" algn="l" defTabSz="914400" rtl="0" eaLnBrk="1" latinLnBrk="0" hangingPunct="1">
+      <a:defRPr sz="1200" kern="1200">
+        <a:solidFill>
+          <a:schemeClr val="tx1"/>
+        </a:solidFill>
+        <a:latin typeface="+mn-lt"/>
+        <a:ea typeface="+mn-ea"/>
+        <a:cs typeface="+mn-cs"/>
+      </a:defRPr>
+    </a:lvl2pPr>
+    <a:lvl3pPr marL="914400" algn="l" defTabSz="914400" rtl="0" eaLnBrk="1" latinLnBrk="0" hangingPunct="1">
+      <a:defRPr sz="1200" kern="1200">
+        <a:solidFill>
+          <a:schemeClr val="tx1"/>
+        </a:solidFill>
+        <a:latin typeface="+mn-lt"/>
+        <a:ea typeface="+mn-ea"/>
+        <a:cs typeface="+mn-cs"/>
+      </a:defRPr>
+    </a:lvl3pPr>
+    <a:lvl4pPr marL="1371600" algn="l" defTabSz="914400" rtl="0" eaLnBrk="1" latinLnBrk="0" hangingPunct="1">
+      <a:defRPr sz="1200" kern="1200">
+        <a:solidFill>
+          <a:schemeClr val="tx1"/>
+        </a:solidFill>
+        <a:latin typeface="+mn-lt"/>
+        <a:ea typeface="+mn-ea"/>
+        <a:cs typeface="+mn-cs"/>
+      </a:defRPr>
+    </a:lvl4pPr>
+    <a:lvl5pPr marL="1828800" algn="l" defTabSz="914400" rtl="0" eaLnBrk="1" latinLnBrk="0" hangingPunct="1">
+      <a:defRPr sz="1200" kern="1200">
+        <a:solidFill>
+          <a:schemeClr val="tx1"/>
+        </a:solidFill>
+        <a:latin typeface="+mn-lt"/>
+        <a:ea typeface="+mn-ea"/>
+        <a:cs typeface="+mn-cs"/>
+      </a:defRPr>
+    </a:lvl5pPr>
+    <a:lvl6pPr marL="2286000" algn="l" defTabSz="914400" rtl="0" eaLnBrk="1" latinLnBrk="0" hangingPunct="1">
+      <a:defRPr sz="1200" kern="1200">
+        <a:solidFill>
+          <a:schemeClr val="tx1"/>
+        </a:solidFill>
+        <a:latin typeface="+mn-lt"/>
+        <a:ea typeface="+mn-ea"/>
+        <a:cs typeface="+mn-cs"/>
+      </a:defRPr>
+    </a:lvl6pPr>
+    <a:lvl7pPr marL="2743200" algn="l" defTabSz="914400" rtl="0" eaLnBrk="1" latinLnBrk="0" hangingPunct="1">
+      <a:defRPr sz="1200" kern="1200">
+        <a:solidFill>
+          <a:schemeClr val="tx1"/>
+        </a:solidFill>
+        <a:latin typeface="+mn-lt"/>
+        <a:ea typeface="+mn-ea"/>
+        <a:cs typeface="+mn-cs"/>
+      </a:defRPr>
+    </a:lvl7pPr>
+    <a:lvl8pPr marL="3200400" algn="l" defTabSz="914400" rtl="0" eaLnBrk="1" latinLnBrk="0" hangingPunct="1">
+      <a:defRPr sz="1200" kern="1200">
+        <a:solidFill>
+          <a:schemeClr val="tx1"/>
+        </a:solidFill>
+        <a:latin typeface="+mn-lt"/>
+        <a:ea typeface="+mn-ea"/>
+        <a:cs typeface="+mn-cs"/>
+      </a:defRPr>
+    </a:lvl8pPr>
+    <a:lvl9pPr marL="3657600" algn="l" defTabSz="914400" rtl="0" eaLnBrk="1" latinLnBrk="0" hangingPunct="1">
+      <a:defRPr sz="1200" kern="1200">
+        <a:solidFill>
+          <a:schemeClr val="tx1"/>
+        </a:solidFill>
+        <a:latin typeface="+mn-lt"/>
+        <a:ea typeface="+mn-ea"/>
+        <a:cs typeface="+mn-cs"/>
+      </a:defRPr>
+    </a:lvl9pPr>
+  </p:notesStyle>
+</p:notesMaster>
+</file>
+
 <file path=ppt/slideLayouts/slideLayout1.xml><?xml version="1.0" encoding="utf-8"?>
 <p:sldLayout xmlns:a="http://schemas.openxmlformats.org/drawingml/2006/main" xmlns:r="http://schemas.openxmlformats.org/officeDocument/2006/relationships" xmlns:p="http://schemas.openxmlformats.org/presentationml/2006/main" type="title" preserve="1">
   <p:cSld name="Slide de Título">
@@ -304,9 +658,9 @@
           <a:bodyPr/>
           <a:lstStyle/>
           <a:p>
-            <a:fld id="{3C6B3121-EEC5-4217-9790-EDD58901A106}" type="datetimeFigureOut">
+            <a:fld id="{E5966964-47FB-4874-A33D-5D10DE7C09BB}" type="datetime1">
               <a:rPr lang="pt-BR" smtClean="0"/>
-              <a:t>18/02/2021</a:t>
+              <a:t>25/02/2021</a:t>
             </a:fld>
             <a:endParaRPr lang="pt-BR"/>
           </a:p>
@@ -642,9 +996,9 @@
           <a:bodyPr/>
           <a:lstStyle/>
           <a:p>
-            <a:fld id="{3C6B3121-EEC5-4217-9790-EDD58901A106}" type="datetimeFigureOut">
+            <a:fld id="{50516EE2-862A-4662-BA86-8304C569CC07}" type="datetime1">
               <a:rPr lang="pt-BR" smtClean="0"/>
-              <a:t>18/02/2021</a:t>
+              <a:t>25/02/2021</a:t>
             </a:fld>
             <a:endParaRPr lang="pt-BR"/>
           </a:p>
@@ -1043,9 +1397,9 @@
           <a:bodyPr/>
           <a:lstStyle/>
           <a:p>
-            <a:fld id="{3C6B3121-EEC5-4217-9790-EDD58901A106}" type="datetimeFigureOut">
+            <a:fld id="{48AE116F-AF2B-4209-AFFD-F3FD70BCC2A6}" type="datetime1">
               <a:rPr lang="pt-BR" smtClean="0"/>
-              <a:t>18/02/2021</a:t>
+              <a:t>25/02/2021</a:t>
             </a:fld>
             <a:endParaRPr lang="pt-BR"/>
           </a:p>
@@ -1379,9 +1733,9 @@
           <a:bodyPr/>
           <a:lstStyle/>
           <a:p>
-            <a:fld id="{3C6B3121-EEC5-4217-9790-EDD58901A106}" type="datetimeFigureOut">
+            <a:fld id="{D6C64F99-93FF-4818-AFF7-02282D9935C0}" type="datetime1">
               <a:rPr lang="pt-BR" smtClean="0"/>
-              <a:t>18/02/2021</a:t>
+              <a:t>25/02/2021</a:t>
             </a:fld>
             <a:endParaRPr lang="pt-BR"/>
           </a:p>
@@ -1699,9 +2053,9 @@
           <a:bodyPr/>
           <a:lstStyle/>
           <a:p>
-            <a:fld id="{3C6B3121-EEC5-4217-9790-EDD58901A106}" type="datetimeFigureOut">
+            <a:fld id="{EED83076-BDEA-461F-A146-8E296655B1DA}" type="datetime1">
               <a:rPr lang="pt-BR" smtClean="0"/>
-              <a:t>18/02/2021</a:t>
+              <a:t>25/02/2021</a:t>
             </a:fld>
             <a:endParaRPr lang="pt-BR"/>
           </a:p>
@@ -2095,9 +2449,9 @@
           <a:bodyPr/>
           <a:lstStyle/>
           <a:p>
-            <a:fld id="{3C6B3121-EEC5-4217-9790-EDD58901A106}" type="datetimeFigureOut">
+            <a:fld id="{6B7BE35B-25D0-4589-88CC-B55E59D72326}" type="datetime1">
               <a:rPr lang="pt-BR" smtClean="0"/>
-              <a:t>18/02/2021</a:t>
+              <a:t>25/02/2021</a:t>
             </a:fld>
             <a:endParaRPr lang="pt-BR"/>
           </a:p>
@@ -2352,9 +2706,9 @@
           <a:bodyPr/>
           <a:lstStyle/>
           <a:p>
-            <a:fld id="{3C6B3121-EEC5-4217-9790-EDD58901A106}" type="datetimeFigureOut">
+            <a:fld id="{51B6523C-A79E-498A-A4D9-344845B49400}" type="datetime1">
               <a:rPr lang="pt-BR" smtClean="0"/>
-              <a:t>18/02/2021</a:t>
+              <a:t>25/02/2021</a:t>
             </a:fld>
             <a:endParaRPr lang="pt-BR"/>
           </a:p>
@@ -2614,9 +2968,9 @@
           <a:bodyPr/>
           <a:lstStyle/>
           <a:p>
-            <a:fld id="{3C6B3121-EEC5-4217-9790-EDD58901A106}" type="datetimeFigureOut">
+            <a:fld id="{E48CD0BF-8DB3-46F9-AB6B-05EB5F1F9DF1}" type="datetime1">
               <a:rPr lang="pt-BR" smtClean="0"/>
-              <a:t>18/02/2021</a:t>
+              <a:t>25/02/2021</a:t>
             </a:fld>
             <a:endParaRPr lang="pt-BR"/>
           </a:p>
@@ -2876,9 +3230,9 @@
           <a:bodyPr/>
           <a:lstStyle/>
           <a:p>
-            <a:fld id="{3C6B3121-EEC5-4217-9790-EDD58901A106}" type="datetimeFigureOut">
+            <a:fld id="{EFC0D9AA-6EAB-4FB7-AF5F-662EF6CDD452}" type="datetime1">
               <a:rPr lang="pt-BR" smtClean="0"/>
-              <a:t>18/02/2021</a:t>
+              <a:t>25/02/2021</a:t>
             </a:fld>
             <a:endParaRPr lang="pt-BR"/>
           </a:p>
@@ -3205,9 +3559,9 @@
           <a:bodyPr/>
           <a:lstStyle/>
           <a:p>
-            <a:fld id="{3C6B3121-EEC5-4217-9790-EDD58901A106}" type="datetimeFigureOut">
+            <a:fld id="{1799002E-80CF-4025-AA74-D53A28310CC2}" type="datetime1">
               <a:rPr lang="pt-BR" smtClean="0"/>
-              <a:t>18/02/2021</a:t>
+              <a:t>25/02/2021</a:t>
             </a:fld>
             <a:endParaRPr lang="pt-BR"/>
           </a:p>
@@ -3528,9 +3882,9 @@
           <a:bodyPr/>
           <a:lstStyle/>
           <a:p>
-            <a:fld id="{3C6B3121-EEC5-4217-9790-EDD58901A106}" type="datetimeFigureOut">
+            <a:fld id="{15EE396B-AC27-45D6-9DA2-978A7876735E}" type="datetime1">
               <a:rPr lang="pt-BR" smtClean="0"/>
-              <a:t>18/02/2021</a:t>
+              <a:t>25/02/2021</a:t>
             </a:fld>
             <a:endParaRPr lang="pt-BR"/>
           </a:p>
@@ -3985,9 +4339,9 @@
           <a:bodyPr/>
           <a:lstStyle/>
           <a:p>
-            <a:fld id="{3C6B3121-EEC5-4217-9790-EDD58901A106}" type="datetimeFigureOut">
+            <a:fld id="{E9D09F20-FF5E-4973-86AD-91AD1E9E38A5}" type="datetime1">
               <a:rPr lang="pt-BR" smtClean="0"/>
-              <a:t>18/02/2021</a:t>
+              <a:t>25/02/2021</a:t>
             </a:fld>
             <a:endParaRPr lang="pt-BR"/>
           </a:p>
@@ -4190,9 +4544,9 @@
           <a:bodyPr/>
           <a:lstStyle/>
           <a:p>
-            <a:fld id="{3C6B3121-EEC5-4217-9790-EDD58901A106}" type="datetimeFigureOut">
+            <a:fld id="{9887623D-FDF3-4D72-894A-17B83FB1E6C6}" type="datetime1">
               <a:rPr lang="pt-BR" smtClean="0"/>
-              <a:t>18/02/2021</a:t>
+              <a:t>25/02/2021</a:t>
             </a:fld>
             <a:endParaRPr lang="pt-BR"/>
           </a:p>
@@ -4367,9 +4721,9 @@
           <a:bodyPr/>
           <a:lstStyle/>
           <a:p>
-            <a:fld id="{3C6B3121-EEC5-4217-9790-EDD58901A106}" type="datetimeFigureOut">
+            <a:fld id="{5CDF3CE8-0E5F-42A0-B8C5-E7136EBF3FF4}" type="datetime1">
               <a:rPr lang="pt-BR" smtClean="0"/>
-              <a:t>18/02/2021</a:t>
+              <a:t>25/02/2021</a:t>
             </a:fld>
             <a:endParaRPr lang="pt-BR"/>
           </a:p>
@@ -4700,9 +5054,9 @@
           <a:bodyPr/>
           <a:lstStyle/>
           <a:p>
-            <a:fld id="{3C6B3121-EEC5-4217-9790-EDD58901A106}" type="datetimeFigureOut">
+            <a:fld id="{1FCDD141-40FE-4499-8C14-D0F6ECF4B410}" type="datetime1">
               <a:rPr lang="pt-BR" smtClean="0"/>
-              <a:t>18/02/2021</a:t>
+              <a:t>25/02/2021</a:t>
             </a:fld>
             <a:endParaRPr lang="pt-BR"/>
           </a:p>
@@ -5045,9 +5399,9 @@
           <a:bodyPr/>
           <a:lstStyle/>
           <a:p>
-            <a:fld id="{3C6B3121-EEC5-4217-9790-EDD58901A106}" type="datetimeFigureOut">
+            <a:fld id="{4A79BE0E-74AB-4112-A1D3-F082B1A60E3E}" type="datetime1">
               <a:rPr lang="pt-BR" smtClean="0"/>
-              <a:t>18/02/2021</a:t>
+              <a:t>25/02/2021</a:t>
             </a:fld>
             <a:endParaRPr lang="pt-BR"/>
           </a:p>
@@ -7162,9 +7516,9 @@
             </a:lvl1pPr>
           </a:lstStyle>
           <a:p>
-            <a:fld id="{3C6B3121-EEC5-4217-9790-EDD58901A106}" type="datetimeFigureOut">
+            <a:fld id="{C9FE23BC-8DE2-4335-951E-92054DC502A5}" type="datetime1">
               <a:rPr lang="pt-BR" smtClean="0"/>
-              <a:t>18/02/2021</a:t>
+              <a:t>25/02/2021</a:t>
             </a:fld>
             <a:endParaRPr lang="pt-BR"/>
           </a:p>
@@ -7272,6 +7626,7 @@
     <p:sldLayoutId id="2147483733" r:id="rId15"/>
     <p:sldLayoutId id="2147483734" r:id="rId16"/>
   </p:sldLayoutIdLst>
+  <p:hf hdr="0" ftr="0" dt="0"/>
   <p:txStyles>
     <p:titleStyle>
       <a:lvl1pPr algn="l" defTabSz="457200" rtl="0" eaLnBrk="1" latinLnBrk="0" hangingPunct="1">
@@ -7785,6 +8140,35 @@
           </a:p>
         </p:txBody>
       </p:sp>
+      <p:sp>
+        <p:nvSpPr>
+          <p:cNvPr id="4" name="Espaço Reservado para Número de Slide 3">
+            <a:extLst>
+              <a:ext uri="{FF2B5EF4-FFF2-40B4-BE49-F238E27FC236}">
+                <a16:creationId xmlns:a16="http://schemas.microsoft.com/office/drawing/2014/main" id="{738E2F26-E3E1-455A-AD5D-5C28A354A5DE}"/>
+              </a:ext>
+            </a:extLst>
+          </p:cNvPr>
+          <p:cNvSpPr>
+            <a:spLocks noGrp="1"/>
+          </p:cNvSpPr>
+          <p:nvPr>
+            <p:ph type="sldNum" sz="quarter" idx="12"/>
+          </p:nvPr>
+        </p:nvSpPr>
+        <p:spPr/>
+        <p:txBody>
+          <a:bodyPr/>
+          <a:lstStyle/>
+          <a:p>
+            <a:fld id="{805BF21B-4AC2-4D1F-B6C5-0BA92CC7D07E}" type="slidenum">
+              <a:rPr lang="pt-BR" smtClean="0"/>
+              <a:t>1</a:t>
+            </a:fld>
+            <a:endParaRPr lang="pt-BR"/>
+          </a:p>
+        </p:txBody>
+      </p:sp>
     </p:spTree>
     <p:extLst>
       <p:ext uri="{BB962C8B-B14F-4D97-AF65-F5344CB8AC3E}">
@@ -7922,6 +8306,35 @@
           </a:p>
         </p:txBody>
       </p:sp>
+      <p:sp>
+        <p:nvSpPr>
+          <p:cNvPr id="4" name="Espaço Reservado para Número de Slide 3">
+            <a:extLst>
+              <a:ext uri="{FF2B5EF4-FFF2-40B4-BE49-F238E27FC236}">
+                <a16:creationId xmlns:a16="http://schemas.microsoft.com/office/drawing/2014/main" id="{4C23ED5E-8ECA-40EE-8A4E-9A7EB14D0834}"/>
+              </a:ext>
+            </a:extLst>
+          </p:cNvPr>
+          <p:cNvSpPr>
+            <a:spLocks noGrp="1"/>
+          </p:cNvSpPr>
+          <p:nvPr>
+            <p:ph type="sldNum" sz="quarter" idx="12"/>
+          </p:nvPr>
+        </p:nvSpPr>
+        <p:spPr/>
+        <p:txBody>
+          <a:bodyPr/>
+          <a:lstStyle/>
+          <a:p>
+            <a:fld id="{805BF21B-4AC2-4D1F-B6C5-0BA92CC7D07E}" type="slidenum">
+              <a:rPr lang="pt-BR" smtClean="0"/>
+              <a:t>2</a:t>
+            </a:fld>
+            <a:endParaRPr lang="pt-BR"/>
+          </a:p>
+        </p:txBody>
+      </p:sp>
     </p:spTree>
     <p:extLst>
       <p:ext uri="{BB962C8B-B14F-4D97-AF65-F5344CB8AC3E}">
@@ -8033,6 +8446,35 @@
               <a:rPr lang="pt-BR" dirty="0"/>
               <a:t>, permitindo assim a leitura deles por qualquer sistema GIS (Sistema de Informação Geográfica)</a:t>
             </a:r>
+          </a:p>
+        </p:txBody>
+      </p:sp>
+      <p:sp>
+        <p:nvSpPr>
+          <p:cNvPr id="4" name="Espaço Reservado para Número de Slide 3">
+            <a:extLst>
+              <a:ext uri="{FF2B5EF4-FFF2-40B4-BE49-F238E27FC236}">
+                <a16:creationId xmlns:a16="http://schemas.microsoft.com/office/drawing/2014/main" id="{912ADA50-E1A7-4EF3-9E9B-26908B6ABB66}"/>
+              </a:ext>
+            </a:extLst>
+          </p:cNvPr>
+          <p:cNvSpPr>
+            <a:spLocks noGrp="1"/>
+          </p:cNvSpPr>
+          <p:nvPr>
+            <p:ph type="sldNum" sz="quarter" idx="12"/>
+          </p:nvPr>
+        </p:nvSpPr>
+        <p:spPr/>
+        <p:txBody>
+          <a:bodyPr/>
+          <a:lstStyle/>
+          <a:p>
+            <a:fld id="{805BF21B-4AC2-4D1F-B6C5-0BA92CC7D07E}" type="slidenum">
+              <a:rPr lang="pt-BR" smtClean="0"/>
+              <a:t>3</a:t>
+            </a:fld>
+            <a:endParaRPr lang="pt-BR"/>
           </a:p>
         </p:txBody>
       </p:sp>
@@ -8222,42 +8664,35 @@
           </a:prstGeom>
         </p:spPr>
       </p:pic>
-      <p:pic>
-        <p:nvPicPr>
-          <p:cNvPr id="8" name="Imagem 7">
+      <p:sp>
+        <p:nvSpPr>
+          <p:cNvPr id="4" name="Espaço Reservado para Número de Slide 3">
             <a:extLst>
               <a:ext uri="{FF2B5EF4-FFF2-40B4-BE49-F238E27FC236}">
-                <a16:creationId xmlns:a16="http://schemas.microsoft.com/office/drawing/2014/main" id="{8B7D1BFB-7507-4039-ABC9-7D2858D6C960}"/>
+                <a16:creationId xmlns:a16="http://schemas.microsoft.com/office/drawing/2014/main" id="{9CC864FD-B25A-4021-9A49-780D92B3FE1F}"/>
               </a:ext>
             </a:extLst>
           </p:cNvPr>
-          <p:cNvPicPr>
-            <a:picLocks noChangeAspect="1"/>
-          </p:cNvPicPr>
-          <p:nvPr/>
-        </p:nvPicPr>
-        <p:blipFill>
-          <a:blip r:embed="rId2">
-            <a:extLst>
-              <a:ext uri="{28A0092B-C50C-407E-A947-70E740481C1C}">
-                <a14:useLocalDpi xmlns:a14="http://schemas.microsoft.com/office/drawing/2010/main" val="0"/>
-              </a:ext>
-            </a:extLst>
-          </a:blip>
-          <a:stretch>
-            <a:fillRect/>
-          </a:stretch>
-        </p:blipFill>
-        <p:spPr>
-          <a:xfrm>
-            <a:off x="9988193" y="3527913"/>
-            <a:ext cx="270684" cy="276806"/>
-          </a:xfrm>
-          <a:prstGeom prst="rect">
-            <a:avLst/>
-          </a:prstGeom>
-        </p:spPr>
-      </p:pic>
+          <p:cNvSpPr>
+            <a:spLocks noGrp="1"/>
+          </p:cNvSpPr>
+          <p:nvPr>
+            <p:ph type="sldNum" sz="quarter" idx="12"/>
+          </p:nvPr>
+        </p:nvSpPr>
+        <p:spPr/>
+        <p:txBody>
+          <a:bodyPr/>
+          <a:lstStyle/>
+          <a:p>
+            <a:fld id="{805BF21B-4AC2-4D1F-B6C5-0BA92CC7D07E}" type="slidenum">
+              <a:rPr lang="pt-BR" smtClean="0"/>
+              <a:t>4</a:t>
+            </a:fld>
+            <a:endParaRPr lang="pt-BR"/>
+          </a:p>
+        </p:txBody>
+      </p:sp>
     </p:spTree>
     <p:extLst>
       <p:ext uri="{BB962C8B-B14F-4D97-AF65-F5344CB8AC3E}">
@@ -8293,7 +8728,7 @@
           <p:cNvPr id="2" name="Título 1">
             <a:extLst>
               <a:ext uri="{FF2B5EF4-FFF2-40B4-BE49-F238E27FC236}">
-                <a16:creationId xmlns:a16="http://schemas.microsoft.com/office/drawing/2014/main" id="{157E5388-95B7-4E85-A673-595FE16EAD77}"/>
+                <a16:creationId xmlns:a16="http://schemas.microsoft.com/office/drawing/2014/main" id="{68186E4F-188C-4D1D-8B29-09EC2EA6C34B}"/>
               </a:ext>
             </a:extLst>
           </p:cNvPr>
@@ -8311,25 +8746,60 @@
           <a:p>
             <a:r>
               <a:rPr lang="pt-BR" dirty="0"/>
-              <a:t>4- O que resta fazer ?</a:t>
-            </a:r>
-          </a:p>
-        </p:txBody>
-      </p:sp>
-      <p:sp>
-        <p:nvSpPr>
-          <p:cNvPr id="3" name="Espaço Reservado para Conteúdo 2">
+              <a:t>4- Arquitetura do sistema</a:t>
+            </a:r>
+          </a:p>
+        </p:txBody>
+      </p:sp>
+      <p:pic>
+        <p:nvPicPr>
+          <p:cNvPr id="9" name="Espaço Reservado para Conteúdo 8">
             <a:extLst>
               <a:ext uri="{FF2B5EF4-FFF2-40B4-BE49-F238E27FC236}">
-                <a16:creationId xmlns:a16="http://schemas.microsoft.com/office/drawing/2014/main" id="{6783E9C8-50AD-42D2-A414-079AB3262902}"/>
+                <a16:creationId xmlns:a16="http://schemas.microsoft.com/office/drawing/2014/main" id="{3EE2698D-487E-4932-8034-C76F2441B426}"/>
               </a:ext>
             </a:extLst>
           </p:cNvPr>
-          <p:cNvSpPr>
-            <a:spLocks noGrp="1"/>
-          </p:cNvSpPr>
+          <p:cNvPicPr>
+            <a:picLocks noGrp="1" noChangeAspect="1"/>
+          </p:cNvPicPr>
           <p:nvPr>
             <p:ph idx="1"/>
+          </p:nvPr>
+        </p:nvPicPr>
+        <p:blipFill>
+          <a:blip r:embed="rId2">
+            <a:extLst>
+              <a:ext uri="{28A0092B-C50C-407E-A947-70E740481C1C}">
+                <a14:useLocalDpi xmlns:a14="http://schemas.microsoft.com/office/drawing/2010/main" val="0"/>
+              </a:ext>
+            </a:extLst>
+          </a:blip>
+          <a:stretch>
+            <a:fillRect/>
+          </a:stretch>
+        </p:blipFill>
+        <p:spPr>
+          <a:xfrm>
+            <a:off x="1405916" y="2057157"/>
+            <a:ext cx="10578955" cy="3727823"/>
+          </a:xfrm>
+        </p:spPr>
+      </p:pic>
+      <p:sp>
+        <p:nvSpPr>
+          <p:cNvPr id="10" name="Espaço Reservado para Número de Slide 9">
+            <a:extLst>
+              <a:ext uri="{FF2B5EF4-FFF2-40B4-BE49-F238E27FC236}">
+                <a16:creationId xmlns:a16="http://schemas.microsoft.com/office/drawing/2014/main" id="{7F9137DF-9FF8-464D-9AE9-C38D4B72BD96}"/>
+              </a:ext>
+            </a:extLst>
+          </p:cNvPr>
+          <p:cNvSpPr>
+            <a:spLocks noGrp="1"/>
+          </p:cNvSpPr>
+          <p:nvPr>
+            <p:ph type="sldNum" sz="quarter" idx="12"/>
           </p:nvPr>
         </p:nvSpPr>
         <p:spPr/>
@@ -8337,6 +8807,10 @@
           <a:bodyPr/>
           <a:lstStyle/>
           <a:p>
+            <a:fld id="{805BF21B-4AC2-4D1F-B6C5-0BA92CC7D07E}" type="slidenum">
+              <a:rPr lang="pt-BR" smtClean="0"/>
+              <a:t>5</a:t>
+            </a:fld>
             <a:endParaRPr lang="pt-BR"/>
           </a:p>
         </p:txBody>
@@ -8344,7 +8818,7 @@
     </p:spTree>
     <p:extLst>
       <p:ext uri="{BB962C8B-B14F-4D97-AF65-F5344CB8AC3E}">
-        <p14:creationId xmlns:p14="http://schemas.microsoft.com/office/powerpoint/2010/main" val="3112294658"/>
+        <p14:creationId xmlns:p14="http://schemas.microsoft.com/office/powerpoint/2010/main" val="1452209387"/>
       </p:ext>
     </p:extLst>
   </p:cSld>
@@ -8376,6 +8850,329 @@
           <p:cNvPr id="2" name="Título 1">
             <a:extLst>
               <a:ext uri="{FF2B5EF4-FFF2-40B4-BE49-F238E27FC236}">
+                <a16:creationId xmlns:a16="http://schemas.microsoft.com/office/drawing/2014/main" id="{5B09F2C1-B4EB-4412-8303-24427CF83F26}"/>
+              </a:ext>
+            </a:extLst>
+          </p:cNvPr>
+          <p:cNvSpPr>
+            <a:spLocks noGrp="1"/>
+          </p:cNvSpPr>
+          <p:nvPr>
+            <p:ph type="title"/>
+          </p:nvPr>
+        </p:nvSpPr>
+        <p:spPr/>
+        <p:txBody>
+          <a:bodyPr/>
+          <a:lstStyle/>
+          <a:p>
+            <a:r>
+              <a:rPr lang="pt-BR" dirty="0"/>
+              <a:t>5- Artigo </a:t>
+            </a:r>
+          </a:p>
+        </p:txBody>
+      </p:sp>
+      <p:sp>
+        <p:nvSpPr>
+          <p:cNvPr id="3" name="Espaço Reservado para Conteúdo 2">
+            <a:extLst>
+              <a:ext uri="{FF2B5EF4-FFF2-40B4-BE49-F238E27FC236}">
+                <a16:creationId xmlns:a16="http://schemas.microsoft.com/office/drawing/2014/main" id="{C7000F07-BB96-4EE0-A90F-AE9E67514E3A}"/>
+              </a:ext>
+            </a:extLst>
+          </p:cNvPr>
+          <p:cNvSpPr>
+            <a:spLocks noGrp="1"/>
+          </p:cNvSpPr>
+          <p:nvPr>
+            <p:ph idx="1"/>
+          </p:nvPr>
+        </p:nvSpPr>
+        <p:spPr/>
+        <p:txBody>
+          <a:bodyPr/>
+          <a:lstStyle/>
+          <a:p>
+            <a:r>
+              <a:rPr lang="pt-BR" dirty="0"/>
+              <a:t>Introdução </a:t>
+            </a:r>
+          </a:p>
+          <a:p>
+            <a:r>
+              <a:rPr lang="pt-BR" dirty="0"/>
+              <a:t>Desenvolvimento</a:t>
+            </a:r>
+          </a:p>
+          <a:p>
+            <a:r>
+              <a:rPr lang="pt-BR" dirty="0"/>
+              <a:t>Resultados</a:t>
+            </a:r>
+          </a:p>
+          <a:p>
+            <a:r>
+              <a:rPr lang="pt-BR" dirty="0"/>
+              <a:t>Conclusões e Trabalhos Futuros</a:t>
+            </a:r>
+          </a:p>
+          <a:p>
+            <a:r>
+              <a:rPr lang="pt-BR" dirty="0"/>
+              <a:t>Referências</a:t>
+            </a:r>
+          </a:p>
+        </p:txBody>
+      </p:sp>
+      <p:sp>
+        <p:nvSpPr>
+          <p:cNvPr id="4" name="Espaço Reservado para Número de Slide 3">
+            <a:extLst>
+              <a:ext uri="{FF2B5EF4-FFF2-40B4-BE49-F238E27FC236}">
+                <a16:creationId xmlns:a16="http://schemas.microsoft.com/office/drawing/2014/main" id="{655C44C8-B891-4066-B2E3-5BA9CB4A3C4C}"/>
+              </a:ext>
+            </a:extLst>
+          </p:cNvPr>
+          <p:cNvSpPr>
+            <a:spLocks noGrp="1"/>
+          </p:cNvSpPr>
+          <p:nvPr>
+            <p:ph type="sldNum" sz="quarter" idx="12"/>
+          </p:nvPr>
+        </p:nvSpPr>
+        <p:spPr/>
+        <p:txBody>
+          <a:bodyPr/>
+          <a:lstStyle/>
+          <a:p>
+            <a:fld id="{805BF21B-4AC2-4D1F-B6C5-0BA92CC7D07E}" type="slidenum">
+              <a:rPr lang="pt-BR" smtClean="0"/>
+              <a:t>6</a:t>
+            </a:fld>
+            <a:endParaRPr lang="pt-BR"/>
+          </a:p>
+        </p:txBody>
+      </p:sp>
+      <p:pic>
+        <p:nvPicPr>
+          <p:cNvPr id="5" name="Imagem 4">
+            <a:extLst>
+              <a:ext uri="{FF2B5EF4-FFF2-40B4-BE49-F238E27FC236}">
+                <a16:creationId xmlns:a16="http://schemas.microsoft.com/office/drawing/2014/main" id="{D1A009AA-1E1A-4017-9855-AB6F9108D857}"/>
+              </a:ext>
+            </a:extLst>
+          </p:cNvPr>
+          <p:cNvPicPr>
+            <a:picLocks noChangeAspect="1"/>
+          </p:cNvPicPr>
+          <p:nvPr/>
+        </p:nvPicPr>
+        <p:blipFill>
+          <a:blip r:embed="rId2">
+            <a:extLst>
+              <a:ext uri="{28A0092B-C50C-407E-A947-70E740481C1C}">
+                <a14:useLocalDpi xmlns:a14="http://schemas.microsoft.com/office/drawing/2010/main" val="0"/>
+              </a:ext>
+            </a:extLst>
+          </a:blip>
+          <a:stretch>
+            <a:fillRect/>
+          </a:stretch>
+        </p:blipFill>
+        <p:spPr>
+          <a:xfrm>
+            <a:off x="4338556" y="2133600"/>
+            <a:ext cx="295470" cy="302153"/>
+          </a:xfrm>
+          <a:prstGeom prst="rect">
+            <a:avLst/>
+          </a:prstGeom>
+        </p:spPr>
+      </p:pic>
+      <p:pic>
+        <p:nvPicPr>
+          <p:cNvPr id="6" name="Imagem 5">
+            <a:extLst>
+              <a:ext uri="{FF2B5EF4-FFF2-40B4-BE49-F238E27FC236}">
+                <a16:creationId xmlns:a16="http://schemas.microsoft.com/office/drawing/2014/main" id="{29101887-D454-427C-B83D-C2EAC746A773}"/>
+              </a:ext>
+            </a:extLst>
+          </p:cNvPr>
+          <p:cNvPicPr>
+            <a:picLocks noChangeAspect="1"/>
+          </p:cNvPicPr>
+          <p:nvPr/>
+        </p:nvPicPr>
+        <p:blipFill>
+          <a:blip r:embed="rId2">
+            <a:extLst>
+              <a:ext uri="{28A0092B-C50C-407E-A947-70E740481C1C}">
+                <a14:useLocalDpi xmlns:a14="http://schemas.microsoft.com/office/drawing/2010/main" val="0"/>
+              </a:ext>
+            </a:extLst>
+          </a:blip>
+          <a:stretch>
+            <a:fillRect/>
+          </a:stretch>
+        </p:blipFill>
+        <p:spPr>
+          <a:xfrm>
+            <a:off x="4406981" y="3720258"/>
+            <a:ext cx="295470" cy="302153"/>
+          </a:xfrm>
+          <a:prstGeom prst="rect">
+            <a:avLst/>
+          </a:prstGeom>
+        </p:spPr>
+      </p:pic>
+    </p:spTree>
+    <p:extLst>
+      <p:ext uri="{BB962C8B-B14F-4D97-AF65-F5344CB8AC3E}">
+        <p14:creationId xmlns:p14="http://schemas.microsoft.com/office/powerpoint/2010/main" val="2637950602"/>
+      </p:ext>
+    </p:extLst>
+  </p:cSld>
+  <p:clrMapOvr>
+    <a:masterClrMapping/>
+  </p:clrMapOvr>
+</p:sld>
+</file>
+
+<file path=ppt/slides/slide7.xml><?xml version="1.0" encoding="utf-8"?>
+<p:sld xmlns:a="http://schemas.openxmlformats.org/drawingml/2006/main" xmlns:r="http://schemas.openxmlformats.org/officeDocument/2006/relationships" xmlns:p="http://schemas.openxmlformats.org/presentationml/2006/main">
+  <p:cSld>
+    <p:spTree>
+      <p:nvGrpSpPr>
+        <p:cNvPr id="1" name=""/>
+        <p:cNvGrpSpPr/>
+        <p:nvPr/>
+      </p:nvGrpSpPr>
+      <p:grpSpPr>
+        <a:xfrm>
+          <a:off x="0" y="0"/>
+          <a:ext cx="0" cy="0"/>
+          <a:chOff x="0" y="0"/>
+          <a:chExt cx="0" cy="0"/>
+        </a:xfrm>
+      </p:grpSpPr>
+      <p:sp>
+        <p:nvSpPr>
+          <p:cNvPr id="2" name="Título 1">
+            <a:extLst>
+              <a:ext uri="{FF2B5EF4-FFF2-40B4-BE49-F238E27FC236}">
+                <a16:creationId xmlns:a16="http://schemas.microsoft.com/office/drawing/2014/main" id="{157E5388-95B7-4E85-A673-595FE16EAD77}"/>
+              </a:ext>
+            </a:extLst>
+          </p:cNvPr>
+          <p:cNvSpPr>
+            <a:spLocks noGrp="1"/>
+          </p:cNvSpPr>
+          <p:nvPr>
+            <p:ph type="title"/>
+          </p:nvPr>
+        </p:nvSpPr>
+        <p:spPr/>
+        <p:txBody>
+          <a:bodyPr/>
+          <a:lstStyle/>
+          <a:p>
+            <a:r>
+              <a:rPr lang="pt-BR" dirty="0"/>
+              <a:t>6- Documentação (GitHub)</a:t>
+            </a:r>
+          </a:p>
+        </p:txBody>
+      </p:sp>
+      <p:sp>
+        <p:nvSpPr>
+          <p:cNvPr id="3" name="Espaço Reservado para Conteúdo 2">
+            <a:extLst>
+              <a:ext uri="{FF2B5EF4-FFF2-40B4-BE49-F238E27FC236}">
+                <a16:creationId xmlns:a16="http://schemas.microsoft.com/office/drawing/2014/main" id="{6783E9C8-50AD-42D2-A414-079AB3262902}"/>
+              </a:ext>
+            </a:extLst>
+          </p:cNvPr>
+          <p:cNvSpPr>
+            <a:spLocks noGrp="1"/>
+          </p:cNvSpPr>
+          <p:nvPr>
+            <p:ph idx="1"/>
+          </p:nvPr>
+        </p:nvSpPr>
+        <p:spPr/>
+        <p:txBody>
+          <a:bodyPr/>
+          <a:lstStyle/>
+          <a:p>
+            <a:endParaRPr lang="pt-BR" dirty="0"/>
+          </a:p>
+        </p:txBody>
+      </p:sp>
+      <p:sp>
+        <p:nvSpPr>
+          <p:cNvPr id="4" name="Espaço Reservado para Número de Slide 3">
+            <a:extLst>
+              <a:ext uri="{FF2B5EF4-FFF2-40B4-BE49-F238E27FC236}">
+                <a16:creationId xmlns:a16="http://schemas.microsoft.com/office/drawing/2014/main" id="{0FB2C98A-D154-451D-91EB-625AB3060231}"/>
+              </a:ext>
+            </a:extLst>
+          </p:cNvPr>
+          <p:cNvSpPr>
+            <a:spLocks noGrp="1"/>
+          </p:cNvSpPr>
+          <p:nvPr>
+            <p:ph type="sldNum" sz="quarter" idx="12"/>
+          </p:nvPr>
+        </p:nvSpPr>
+        <p:spPr/>
+        <p:txBody>
+          <a:bodyPr/>
+          <a:lstStyle/>
+          <a:p>
+            <a:fld id="{805BF21B-4AC2-4D1F-B6C5-0BA92CC7D07E}" type="slidenum">
+              <a:rPr lang="pt-BR" smtClean="0"/>
+              <a:t>7</a:t>
+            </a:fld>
+            <a:endParaRPr lang="pt-BR"/>
+          </a:p>
+        </p:txBody>
+      </p:sp>
+    </p:spTree>
+    <p:extLst>
+      <p:ext uri="{BB962C8B-B14F-4D97-AF65-F5344CB8AC3E}">
+        <p14:creationId xmlns:p14="http://schemas.microsoft.com/office/powerpoint/2010/main" val="3112294658"/>
+      </p:ext>
+    </p:extLst>
+  </p:cSld>
+  <p:clrMapOvr>
+    <a:masterClrMapping/>
+  </p:clrMapOvr>
+</p:sld>
+</file>
+
+<file path=ppt/slides/slide8.xml><?xml version="1.0" encoding="utf-8"?>
+<p:sld xmlns:a="http://schemas.openxmlformats.org/drawingml/2006/main" xmlns:r="http://schemas.openxmlformats.org/officeDocument/2006/relationships" xmlns:p="http://schemas.openxmlformats.org/presentationml/2006/main">
+  <p:cSld>
+    <p:spTree>
+      <p:nvGrpSpPr>
+        <p:cNvPr id="1" name=""/>
+        <p:cNvGrpSpPr/>
+        <p:nvPr/>
+      </p:nvGrpSpPr>
+      <p:grpSpPr>
+        <a:xfrm>
+          <a:off x="0" y="0"/>
+          <a:ext cx="0" cy="0"/>
+          <a:chOff x="0" y="0"/>
+          <a:chExt cx="0" cy="0"/>
+        </a:xfrm>
+      </p:grpSpPr>
+      <p:sp>
+        <p:nvSpPr>
+          <p:cNvPr id="2" name="Título 1">
+            <a:extLst>
+              <a:ext uri="{FF2B5EF4-FFF2-40B4-BE49-F238E27FC236}">
                 <a16:creationId xmlns:a16="http://schemas.microsoft.com/office/drawing/2014/main" id="{7F7A5EA2-EEAB-49B5-A52C-68B2A219593D}"/>
               </a:ext>
             </a:extLst>
@@ -8415,7 +9212,7 @@
             <p:ph idx="1"/>
             <p:extLst>
               <p:ext uri="{D42A27DB-BD31-4B8C-83A1-F6EECF244321}">
-                <p14:modId xmlns:p14="http://schemas.microsoft.com/office/powerpoint/2010/main" val="4044522003"/>
+                <p14:modId xmlns:p14="http://schemas.microsoft.com/office/powerpoint/2010/main" val="349277537"/>
               </p:ext>
             </p:extLst>
           </p:nvPr>
@@ -8571,7 +9368,11 @@
                       </a:r>
                     </a:p>
                   </a:txBody>
-                  <a:tcPr marL="77525" marR="77525"/>
+                  <a:tcPr marL="77525" marR="77525">
+                    <a:solidFill>
+                      <a:srgbClr val="92D050"/>
+                    </a:solidFill>
+                  </a:tcPr>
                 </a:tc>
                 <a:tc>
                   <a:txBody>
@@ -8585,7 +9386,13 @@
                       </a:r>
                     </a:p>
                   </a:txBody>
-                  <a:tcPr marL="77525" marR="77525"/>
+                  <a:tcPr marL="77525" marR="77525">
+                    <a:solidFill>
+                      <a:schemeClr val="bg1">
+                        <a:lumMod val="85000"/>
+                      </a:schemeClr>
+                    </a:solidFill>
+                  </a:tcPr>
                 </a:tc>
                 <a:tc>
                   <a:txBody>
@@ -8642,7 +9449,11 @@
                       </a:r>
                     </a:p>
                   </a:txBody>
-                  <a:tcPr marL="77525" marR="77525"/>
+                  <a:tcPr marL="77525" marR="77525">
+                    <a:solidFill>
+                      <a:srgbClr val="92D050"/>
+                    </a:solidFill>
+                  </a:tcPr>
                 </a:tc>
                 <a:tc>
                   <a:txBody>
@@ -8710,7 +9521,11 @@
                       </a:r>
                     </a:p>
                   </a:txBody>
-                  <a:tcPr marL="77525" marR="77525"/>
+                  <a:tcPr marL="77525" marR="77525">
+                    <a:solidFill>
+                      <a:srgbClr val="92D050"/>
+                    </a:solidFill>
+                  </a:tcPr>
                 </a:tc>
                 <a:tc>
                   <a:txBody>
@@ -8802,7 +9617,11 @@
                       </a:r>
                     </a:p>
                   </a:txBody>
-                  <a:tcPr marL="77525" marR="77525"/>
+                  <a:tcPr marL="77525" marR="77525">
+                    <a:solidFill>
+                      <a:srgbClr val="92D050"/>
+                    </a:solidFill>
+                  </a:tcPr>
                 </a:tc>
                 <a:tc>
                   <a:txBody>
@@ -8856,6 +9675,35 @@
           </a:graphicData>
         </a:graphic>
       </p:graphicFrame>
+      <p:sp>
+        <p:nvSpPr>
+          <p:cNvPr id="3" name="Espaço Reservado para Número de Slide 2">
+            <a:extLst>
+              <a:ext uri="{FF2B5EF4-FFF2-40B4-BE49-F238E27FC236}">
+                <a16:creationId xmlns:a16="http://schemas.microsoft.com/office/drawing/2014/main" id="{42B20DAE-A678-4276-9316-0B3077A6809A}"/>
+              </a:ext>
+            </a:extLst>
+          </p:cNvPr>
+          <p:cNvSpPr>
+            <a:spLocks noGrp="1"/>
+          </p:cNvSpPr>
+          <p:nvPr>
+            <p:ph type="sldNum" sz="quarter" idx="12"/>
+          </p:nvPr>
+        </p:nvSpPr>
+        <p:spPr/>
+        <p:txBody>
+          <a:bodyPr/>
+          <a:lstStyle/>
+          <a:p>
+            <a:fld id="{805BF21B-4AC2-4D1F-B6C5-0BA92CC7D07E}" type="slidenum">
+              <a:rPr lang="pt-BR" smtClean="0"/>
+              <a:t>8</a:t>
+            </a:fld>
+            <a:endParaRPr lang="pt-BR"/>
+          </a:p>
+        </p:txBody>
+      </p:sp>
     </p:spTree>
     <p:extLst>
       <p:ext uri="{BB962C8B-B14F-4D97-AF65-F5344CB8AC3E}">
@@ -8869,7 +9717,7 @@
 </p:sld>
 </file>
 
-<file path=ppt/slides/slide7.xml><?xml version="1.0" encoding="utf-8"?>
+<file path=ppt/slides/slide9.xml><?xml version="1.0" encoding="utf-8"?>
 <p:sld xmlns:a="http://schemas.openxmlformats.org/drawingml/2006/main" xmlns:r="http://schemas.openxmlformats.org/officeDocument/2006/relationships" xmlns:p="http://schemas.openxmlformats.org/presentationml/2006/main">
   <p:cSld>
     <p:spTree>
@@ -8952,6 +9800,35 @@
               <a:rPr lang="pt-BR" dirty="0"/>
               <a:t>https://github.com/TavaresCarlos/TCC</a:t>
             </a:r>
+          </a:p>
+        </p:txBody>
+      </p:sp>
+      <p:sp>
+        <p:nvSpPr>
+          <p:cNvPr id="4" name="Espaço Reservado para Número de Slide 3">
+            <a:extLst>
+              <a:ext uri="{FF2B5EF4-FFF2-40B4-BE49-F238E27FC236}">
+                <a16:creationId xmlns:a16="http://schemas.microsoft.com/office/drawing/2014/main" id="{9EF039A5-B09F-41E9-AFCC-E33B7F993C32}"/>
+              </a:ext>
+            </a:extLst>
+          </p:cNvPr>
+          <p:cNvSpPr>
+            <a:spLocks noGrp="1"/>
+          </p:cNvSpPr>
+          <p:nvPr>
+            <p:ph type="sldNum" sz="quarter" idx="12"/>
+          </p:nvPr>
+        </p:nvSpPr>
+        <p:spPr/>
+        <p:txBody>
+          <a:bodyPr/>
+          <a:lstStyle/>
+          <a:p>
+            <a:fld id="{805BF21B-4AC2-4D1F-B6C5-0BA92CC7D07E}" type="slidenum">
+              <a:rPr lang="pt-BR" smtClean="0"/>
+              <a:t>9</a:t>
+            </a:fld>
+            <a:endParaRPr lang="pt-BR"/>
           </a:p>
         </p:txBody>
       </p:sp>
@@ -9209,4 +10086,299 @@
     </a:ext>
   </a:extLst>
 </a:theme>
+</file>
+
+<file path=ppt/theme/theme2.xml><?xml version="1.0" encoding="utf-8"?>
+<a:theme xmlns:a="http://schemas.openxmlformats.org/drawingml/2006/main" name="Tema do Office">
+  <a:themeElements>
+    <a:clrScheme name="Office">
+      <a:dk1>
+        <a:sysClr val="windowText" lastClr="000000"/>
+      </a:dk1>
+      <a:lt1>
+        <a:sysClr val="window" lastClr="FFFFFF"/>
+      </a:lt1>
+      <a:dk2>
+        <a:srgbClr val="44546A"/>
+      </a:dk2>
+      <a:lt2>
+        <a:srgbClr val="E7E6E6"/>
+      </a:lt2>
+      <a:accent1>
+        <a:srgbClr val="4472C4"/>
+      </a:accent1>
+      <a:accent2>
+        <a:srgbClr val="ED7D31"/>
+      </a:accent2>
+      <a:accent3>
+        <a:srgbClr val="A5A5A5"/>
+      </a:accent3>
+      <a:accent4>
+        <a:srgbClr val="FFC000"/>
+      </a:accent4>
+      <a:accent5>
+        <a:srgbClr val="5B9BD5"/>
+      </a:accent5>
+      <a:accent6>
+        <a:srgbClr val="70AD47"/>
+      </a:accent6>
+      <a:hlink>
+        <a:srgbClr val="0563C1"/>
+      </a:hlink>
+      <a:folHlink>
+        <a:srgbClr val="954F72"/>
+      </a:folHlink>
+    </a:clrScheme>
+    <a:fontScheme name="Office">
+      <a:majorFont>
+        <a:latin typeface="Calibri Light" panose="020F0302020204030204"/>
+        <a:ea typeface=""/>
+        <a:cs typeface=""/>
+        <a:font script="Jpan" typeface="游ゴシック Light"/>
+        <a:font script="Hang" typeface="맑은 고딕"/>
+        <a:font script="Hans" typeface="等线 Light"/>
+        <a:font script="Hant" typeface="新細明體"/>
+        <a:font script="Arab" typeface="Times New Roman"/>
+        <a:font script="Hebr" typeface="Times New Roman"/>
+        <a:font script="Thai" typeface="Angsana New"/>
+        <a:font script="Ethi" typeface="Nyala"/>
+        <a:font script="Beng" typeface="Vrinda"/>
+        <a:font script="Gujr" typeface="Shruti"/>
+        <a:font script="Khmr" typeface="MoolBoran"/>
+        <a:font script="Knda" typeface="Tunga"/>
+        <a:font script="Guru" typeface="Raavi"/>
+        <a:font script="Cans" typeface="Euphemia"/>
+        <a:font script="Cher" typeface="Plantagenet Cherokee"/>
+        <a:font script="Yiii" typeface="Microsoft Yi Baiti"/>
+        <a:font script="Tibt" typeface="Microsoft Himalaya"/>
+        <a:font script="Thaa" typeface="MV Boli"/>
+        <a:font script="Deva" typeface="Mangal"/>
+        <a:font script="Telu" typeface="Gautami"/>
+        <a:font script="Taml" typeface="Latha"/>
+        <a:font script="Syrc" typeface="Estrangelo Edessa"/>
+        <a:font script="Orya" typeface="Kalinga"/>
+        <a:font script="Mlym" typeface="Kartika"/>
+        <a:font script="Laoo" typeface="DokChampa"/>
+        <a:font script="Sinh" typeface="Iskoola Pota"/>
+        <a:font script="Mong" typeface="Mongolian Baiti"/>
+        <a:font script="Viet" typeface="Times New Roman"/>
+        <a:font script="Uigh" typeface="Microsoft Uighur"/>
+        <a:font script="Geor" typeface="Sylfaen"/>
+        <a:font script="Armn" typeface="Arial"/>
+        <a:font script="Bugi" typeface="Leelawadee UI"/>
+        <a:font script="Bopo" typeface="Microsoft JhengHei"/>
+        <a:font script="Java" typeface="Javanese Text"/>
+        <a:font script="Lisu" typeface="Segoe UI"/>
+        <a:font script="Mymr" typeface="Myanmar Text"/>
+        <a:font script="Nkoo" typeface="Ebrima"/>
+        <a:font script="Olck" typeface="Nirmala UI"/>
+        <a:font script="Osma" typeface="Ebrima"/>
+        <a:font script="Phag" typeface="Phagspa"/>
+        <a:font script="Syrn" typeface="Estrangelo Edessa"/>
+        <a:font script="Syrj" typeface="Estrangelo Edessa"/>
+        <a:font script="Syre" typeface="Estrangelo Edessa"/>
+        <a:font script="Sora" typeface="Nirmala UI"/>
+        <a:font script="Tale" typeface="Microsoft Tai Le"/>
+        <a:font script="Talu" typeface="Microsoft New Tai Lue"/>
+        <a:font script="Tfng" typeface="Ebrima"/>
+      </a:majorFont>
+      <a:minorFont>
+        <a:latin typeface="Calibri" panose="020F0502020204030204"/>
+        <a:ea typeface=""/>
+        <a:cs typeface=""/>
+        <a:font script="Jpan" typeface="游ゴシック"/>
+        <a:font script="Hang" typeface="맑은 고딕"/>
+        <a:font script="Hans" typeface="等线"/>
+        <a:font script="Hant" typeface="新細明體"/>
+        <a:font script="Arab" typeface="Arial"/>
+        <a:font script="Hebr" typeface="Arial"/>
+        <a:font script="Thai" typeface="Cordia New"/>
+        <a:font script="Ethi" typeface="Nyala"/>
+        <a:font script="Beng" typeface="Vrinda"/>
+        <a:font script="Gujr" typeface="Shruti"/>
+        <a:font script="Khmr" typeface="DaunPenh"/>
+        <a:font script="Knda" typeface="Tunga"/>
+        <a:font script="Guru" typeface="Raavi"/>
+        <a:font script="Cans" typeface="Euphemia"/>
+        <a:font script="Cher" typeface="Plantagenet Cherokee"/>
+        <a:font script="Yiii" typeface="Microsoft Yi Baiti"/>
+        <a:font script="Tibt" typeface="Microsoft Himalaya"/>
+        <a:font script="Thaa" typeface="MV Boli"/>
+        <a:font script="Deva" typeface="Mangal"/>
+        <a:font script="Telu" typeface="Gautami"/>
+        <a:font script="Taml" typeface="Latha"/>
+        <a:font script="Syrc" typeface="Estrangelo Edessa"/>
+        <a:font script="Orya" typeface="Kalinga"/>
+        <a:font script="Mlym" typeface="Kartika"/>
+        <a:font script="Laoo" typeface="DokChampa"/>
+        <a:font script="Sinh" typeface="Iskoola Pota"/>
+        <a:font script="Mong" typeface="Mongolian Baiti"/>
+        <a:font script="Viet" typeface="Arial"/>
+        <a:font script="Uigh" typeface="Microsoft Uighur"/>
+        <a:font script="Geor" typeface="Sylfaen"/>
+        <a:font script="Armn" typeface="Arial"/>
+        <a:font script="Bugi" typeface="Leelawadee UI"/>
+        <a:font script="Bopo" typeface="Microsoft JhengHei"/>
+        <a:font script="Java" typeface="Javanese Text"/>
+        <a:font script="Lisu" typeface="Segoe UI"/>
+        <a:font script="Mymr" typeface="Myanmar Text"/>
+        <a:font script="Nkoo" typeface="Ebrima"/>
+        <a:font script="Olck" typeface="Nirmala UI"/>
+        <a:font script="Osma" typeface="Ebrima"/>
+        <a:font script="Phag" typeface="Phagspa"/>
+        <a:font script="Syrn" typeface="Estrangelo Edessa"/>
+        <a:font script="Syrj" typeface="Estrangelo Edessa"/>
+        <a:font script="Syre" typeface="Estrangelo Edessa"/>
+        <a:font script="Sora" typeface="Nirmala UI"/>
+        <a:font script="Tale" typeface="Microsoft Tai Le"/>
+        <a:font script="Talu" typeface="Microsoft New Tai Lue"/>
+        <a:font script="Tfng" typeface="Ebrima"/>
+      </a:minorFont>
+    </a:fontScheme>
+    <a:fmtScheme name="Office">
+      <a:fillStyleLst>
+        <a:solidFill>
+          <a:schemeClr val="phClr"/>
+        </a:solidFill>
+        <a:gradFill rotWithShape="1">
+          <a:gsLst>
+            <a:gs pos="0">
+              <a:schemeClr val="phClr">
+                <a:lumMod val="110000"/>
+                <a:satMod val="105000"/>
+                <a:tint val="67000"/>
+              </a:schemeClr>
+            </a:gs>
+            <a:gs pos="50000">
+              <a:schemeClr val="phClr">
+                <a:lumMod val="105000"/>
+                <a:satMod val="103000"/>
+                <a:tint val="73000"/>
+              </a:schemeClr>
+            </a:gs>
+            <a:gs pos="100000">
+              <a:schemeClr val="phClr">
+                <a:lumMod val="105000"/>
+                <a:satMod val="109000"/>
+                <a:tint val="81000"/>
+              </a:schemeClr>
+            </a:gs>
+          </a:gsLst>
+          <a:lin ang="5400000" scaled="0"/>
+        </a:gradFill>
+        <a:gradFill rotWithShape="1">
+          <a:gsLst>
+            <a:gs pos="0">
+              <a:schemeClr val="phClr">
+                <a:satMod val="103000"/>
+                <a:lumMod val="102000"/>
+                <a:tint val="94000"/>
+              </a:schemeClr>
+            </a:gs>
+            <a:gs pos="50000">
+              <a:schemeClr val="phClr">
+                <a:satMod val="110000"/>
+                <a:lumMod val="100000"/>
+                <a:shade val="100000"/>
+              </a:schemeClr>
+            </a:gs>
+            <a:gs pos="100000">
+              <a:schemeClr val="phClr">
+                <a:lumMod val="99000"/>
+                <a:satMod val="120000"/>
+                <a:shade val="78000"/>
+              </a:schemeClr>
+            </a:gs>
+          </a:gsLst>
+          <a:lin ang="5400000" scaled="0"/>
+        </a:gradFill>
+      </a:fillStyleLst>
+      <a:lnStyleLst>
+        <a:ln w="6350" cap="flat" cmpd="sng" algn="ctr">
+          <a:solidFill>
+            <a:schemeClr val="phClr"/>
+          </a:solidFill>
+          <a:prstDash val="solid"/>
+          <a:miter lim="800000"/>
+        </a:ln>
+        <a:ln w="12700" cap="flat" cmpd="sng" algn="ctr">
+          <a:solidFill>
+            <a:schemeClr val="phClr"/>
+          </a:solidFill>
+          <a:prstDash val="solid"/>
+          <a:miter lim="800000"/>
+        </a:ln>
+        <a:ln w="19050" cap="flat" cmpd="sng" algn="ctr">
+          <a:solidFill>
+            <a:schemeClr val="phClr"/>
+          </a:solidFill>
+          <a:prstDash val="solid"/>
+          <a:miter lim="800000"/>
+        </a:ln>
+      </a:lnStyleLst>
+      <a:effectStyleLst>
+        <a:effectStyle>
+          <a:effectLst/>
+        </a:effectStyle>
+        <a:effectStyle>
+          <a:effectLst/>
+        </a:effectStyle>
+        <a:effectStyle>
+          <a:effectLst>
+            <a:outerShdw blurRad="57150" dist="19050" dir="5400000" algn="ctr" rotWithShape="0">
+              <a:srgbClr val="000000">
+                <a:alpha val="63000"/>
+              </a:srgbClr>
+            </a:outerShdw>
+          </a:effectLst>
+        </a:effectStyle>
+      </a:effectStyleLst>
+      <a:bgFillStyleLst>
+        <a:solidFill>
+          <a:schemeClr val="phClr"/>
+        </a:solidFill>
+        <a:solidFill>
+          <a:schemeClr val="phClr">
+            <a:tint val="95000"/>
+            <a:satMod val="170000"/>
+          </a:schemeClr>
+        </a:solidFill>
+        <a:gradFill rotWithShape="1">
+          <a:gsLst>
+            <a:gs pos="0">
+              <a:schemeClr val="phClr">
+                <a:tint val="93000"/>
+                <a:satMod val="150000"/>
+                <a:shade val="98000"/>
+                <a:lumMod val="102000"/>
+              </a:schemeClr>
+            </a:gs>
+            <a:gs pos="50000">
+              <a:schemeClr val="phClr">
+                <a:tint val="98000"/>
+                <a:satMod val="130000"/>
+                <a:shade val="90000"/>
+                <a:lumMod val="103000"/>
+              </a:schemeClr>
+            </a:gs>
+            <a:gs pos="100000">
+              <a:schemeClr val="phClr">
+                <a:shade val="63000"/>
+                <a:satMod val="120000"/>
+              </a:schemeClr>
+            </a:gs>
+          </a:gsLst>
+          <a:lin ang="5400000" scaled="0"/>
+        </a:gradFill>
+      </a:bgFillStyleLst>
+    </a:fmtScheme>
+  </a:themeElements>
+  <a:objectDefaults/>
+  <a:extraClrSchemeLst/>
+  <a:extLst>
+    <a:ext uri="{05A4C25C-085E-4340-85A3-A5531E510DB2}">
+      <thm15:themeFamily xmlns:thm15="http://schemas.microsoft.com/office/thememl/2012/main" name="Office Theme" id="{62F939B6-93AF-4DB8-9C6B-D6C7DFDC589F}" vid="{4A3C46E8-61CC-4603-A589-7422A47A8E4A}"/>
+    </a:ext>
+  </a:extLst>
+</a:theme>
 </file>
</xml_diff>

<commit_message>
Filtro de exportação dos dados de acordo com a data adicionado
</commit_message>
<xml_diff>
--- a/apresentação-do-sistema/apresentação-02.pptx
+++ b/apresentação-do-sistema/apresentação-02.pptx
@@ -1,22 +1,26 @@
 
 <file path=ppt/presentation.xml><?xml version="1.0" encoding="utf-8"?>
-<p:presentation xmlns:a="http://schemas.openxmlformats.org/drawingml/2006/main" xmlns:r="http://schemas.openxmlformats.org/officeDocument/2006/relationships" xmlns:p="http://schemas.openxmlformats.org/presentationml/2006/main" saveSubsetFonts="1">
+<p:presentation xmlns:a="http://schemas.openxmlformats.org/drawingml/2006/main" xmlns:r="http://schemas.openxmlformats.org/officeDocument/2006/relationships" xmlns:p="http://schemas.openxmlformats.org/presentationml/2006/main" showSpecialPlsOnTitleSld="0" saveSubsetFonts="1">
   <p:sldMasterIdLst>
-    <p:sldMasterId id="2147483718" r:id="rId1"/>
+    <p:sldMasterId id="2147483769" r:id="rId1"/>
   </p:sldMasterIdLst>
   <p:notesMasterIdLst>
-    <p:notesMasterId r:id="rId11"/>
+    <p:notesMasterId r:id="rId15"/>
   </p:notesMasterIdLst>
   <p:sldIdLst>
     <p:sldId id="256" r:id="rId2"/>
     <p:sldId id="257" r:id="rId3"/>
-    <p:sldId id="267" r:id="rId4"/>
-    <p:sldId id="272" r:id="rId5"/>
+    <p:sldId id="272" r:id="rId4"/>
+    <p:sldId id="276" r:id="rId5"/>
     <p:sldId id="274" r:id="rId6"/>
-    <p:sldId id="275" r:id="rId7"/>
-    <p:sldId id="273" r:id="rId8"/>
-    <p:sldId id="269" r:id="rId9"/>
-    <p:sldId id="270" r:id="rId10"/>
+    <p:sldId id="277" r:id="rId7"/>
+    <p:sldId id="278" r:id="rId8"/>
+    <p:sldId id="279" r:id="rId9"/>
+    <p:sldId id="280" r:id="rId10"/>
+    <p:sldId id="281" r:id="rId11"/>
+    <p:sldId id="275" r:id="rId12"/>
+    <p:sldId id="269" r:id="rId13"/>
+    <p:sldId id="270" r:id="rId14"/>
   </p:sldIdLst>
   <p:sldSz cx="12192000" cy="6858000"/>
   <p:notesSz cx="6858000" cy="9144000"/>
@@ -205,7 +209,7 @@
           <a:p>
             <a:fld id="{8C641393-FDFC-4B54-ACAC-19209947AB45}" type="datetimeFigureOut">
               <a:rPr lang="pt-BR" smtClean="0"/>
-              <a:t>25/02/2021</a:t>
+              <a:t>25/03/2021</a:t>
             </a:fld>
             <a:endParaRPr lang="pt-BR"/>
           </a:p>
@@ -658,9 +662,9 @@
           <a:bodyPr/>
           <a:lstStyle/>
           <a:p>
-            <a:fld id="{E5966964-47FB-4874-A33D-5D10DE7C09BB}" type="datetime1">
+            <a:fld id="{E77AE2F0-FC85-4531-A6E2-5B6D3CC0E84C}" type="datetime1">
               <a:rPr lang="pt-BR" smtClean="0"/>
-              <a:t>25/02/2021</a:t>
+              <a:t>25/03/2021</a:t>
             </a:fld>
             <a:endParaRPr lang="pt-BR"/>
           </a:p>
@@ -798,7 +802,7 @@
     </p:spTree>
     <p:extLst>
       <p:ext uri="{BB962C8B-B14F-4D97-AF65-F5344CB8AC3E}">
-        <p14:creationId xmlns:p14="http://schemas.microsoft.com/office/powerpoint/2010/main" val="3956922377"/>
+        <p14:creationId xmlns:p14="http://schemas.microsoft.com/office/powerpoint/2010/main" val="2234639136"/>
       </p:ext>
     </p:extLst>
   </p:cSld>
@@ -996,9 +1000,9 @@
           <a:bodyPr/>
           <a:lstStyle/>
           <a:p>
-            <a:fld id="{50516EE2-862A-4662-BA86-8304C569CC07}" type="datetime1">
+            <a:fld id="{6FC7059E-A030-4E43-8A7C-7CF56828A05E}" type="datetime1">
               <a:rPr lang="pt-BR" smtClean="0"/>
-              <a:t>25/02/2021</a:t>
+              <a:t>25/03/2021</a:t>
             </a:fld>
             <a:endParaRPr lang="pt-BR"/>
           </a:p>
@@ -1136,7 +1140,7 @@
     </p:spTree>
     <p:extLst>
       <p:ext uri="{BB962C8B-B14F-4D97-AF65-F5344CB8AC3E}">
-        <p14:creationId xmlns:p14="http://schemas.microsoft.com/office/powerpoint/2010/main" val="279383195"/>
+        <p14:creationId xmlns:p14="http://schemas.microsoft.com/office/powerpoint/2010/main" val="810785845"/>
       </p:ext>
     </p:extLst>
   </p:cSld>
@@ -1397,9 +1401,9 @@
           <a:bodyPr/>
           <a:lstStyle/>
           <a:p>
-            <a:fld id="{48AE116F-AF2B-4209-AFFD-F3FD70BCC2A6}" type="datetime1">
+            <a:fld id="{0A975000-9A27-4723-A42F-86790FC177E4}" type="datetime1">
               <a:rPr lang="pt-BR" smtClean="0"/>
-              <a:t>25/02/2021</a:t>
+              <a:t>25/03/2021</a:t>
             </a:fld>
             <a:endParaRPr lang="pt-BR"/>
           </a:p>
@@ -1613,7 +1617,7 @@
     </p:spTree>
     <p:extLst>
       <p:ext uri="{BB962C8B-B14F-4D97-AF65-F5344CB8AC3E}">
-        <p14:creationId xmlns:p14="http://schemas.microsoft.com/office/powerpoint/2010/main" val="3361843340"/>
+        <p14:creationId xmlns:p14="http://schemas.microsoft.com/office/powerpoint/2010/main" val="2201442458"/>
       </p:ext>
     </p:extLst>
   </p:cSld>
@@ -1733,9 +1737,9 @@
           <a:bodyPr/>
           <a:lstStyle/>
           <a:p>
-            <a:fld id="{D6C64F99-93FF-4818-AFF7-02282D9935C0}" type="datetime1">
+            <a:fld id="{4BD87B2C-B9F5-4D20-99D2-9D76FD95B3E6}" type="datetime1">
               <a:rPr lang="pt-BR" smtClean="0"/>
-              <a:t>25/02/2021</a:t>
+              <a:t>25/03/2021</a:t>
             </a:fld>
             <a:endParaRPr lang="pt-BR"/>
           </a:p>
@@ -1873,7 +1877,7 @@
     </p:spTree>
     <p:extLst>
       <p:ext uri="{BB962C8B-B14F-4D97-AF65-F5344CB8AC3E}">
-        <p14:creationId xmlns:p14="http://schemas.microsoft.com/office/powerpoint/2010/main" val="3628225290"/>
+        <p14:creationId xmlns:p14="http://schemas.microsoft.com/office/powerpoint/2010/main" val="686918258"/>
       </p:ext>
     </p:extLst>
   </p:cSld>
@@ -2053,9 +2057,9 @@
           <a:bodyPr/>
           <a:lstStyle/>
           <a:p>
-            <a:fld id="{EED83076-BDEA-461F-A146-8E296655B1DA}" type="datetime1">
+            <a:fld id="{D6FF06AB-964E-459B-889F-337904FDD328}" type="datetime1">
               <a:rPr lang="pt-BR" smtClean="0"/>
-              <a:t>25/02/2021</a:t>
+              <a:t>25/03/2021</a:t>
             </a:fld>
             <a:endParaRPr lang="pt-BR"/>
           </a:p>
@@ -2269,7 +2273,7 @@
     </p:spTree>
     <p:extLst>
       <p:ext uri="{BB962C8B-B14F-4D97-AF65-F5344CB8AC3E}">
-        <p14:creationId xmlns:p14="http://schemas.microsoft.com/office/powerpoint/2010/main" val="3766524619"/>
+        <p14:creationId xmlns:p14="http://schemas.microsoft.com/office/powerpoint/2010/main" val="729649048"/>
       </p:ext>
     </p:extLst>
   </p:cSld>
@@ -2449,9 +2453,9 @@
           <a:bodyPr/>
           <a:lstStyle/>
           <a:p>
-            <a:fld id="{6B7BE35B-25D0-4589-88CC-B55E59D72326}" type="datetime1">
+            <a:fld id="{722F4CA4-0DB8-49AC-A9C7-8A12BC694679}" type="datetime1">
               <a:rPr lang="pt-BR" smtClean="0"/>
-              <a:t>25/02/2021</a:t>
+              <a:t>25/03/2021</a:t>
             </a:fld>
             <a:endParaRPr lang="pt-BR"/>
           </a:p>
@@ -2589,7 +2593,7 @@
     </p:spTree>
     <p:extLst>
       <p:ext uri="{BB962C8B-B14F-4D97-AF65-F5344CB8AC3E}">
-        <p14:creationId xmlns:p14="http://schemas.microsoft.com/office/powerpoint/2010/main" val="426495521"/>
+        <p14:creationId xmlns:p14="http://schemas.microsoft.com/office/powerpoint/2010/main" val="2862344684"/>
       </p:ext>
     </p:extLst>
   </p:cSld>
@@ -2706,9 +2710,9 @@
           <a:bodyPr/>
           <a:lstStyle/>
           <a:p>
-            <a:fld id="{51B6523C-A79E-498A-A4D9-344845B49400}" type="datetime1">
+            <a:fld id="{3BD89C38-F4CF-4299-865E-FEF8BAFF01AE}" type="datetime1">
               <a:rPr lang="pt-BR" smtClean="0"/>
-              <a:t>25/02/2021</a:t>
+              <a:t>25/03/2021</a:t>
             </a:fld>
             <a:endParaRPr lang="pt-BR"/>
           </a:p>
@@ -2841,7 +2845,7 @@
     </p:spTree>
     <p:extLst>
       <p:ext uri="{BB962C8B-B14F-4D97-AF65-F5344CB8AC3E}">
-        <p14:creationId xmlns:p14="http://schemas.microsoft.com/office/powerpoint/2010/main" val="3440496990"/>
+        <p14:creationId xmlns:p14="http://schemas.microsoft.com/office/powerpoint/2010/main" val="3656186040"/>
       </p:ext>
     </p:extLst>
   </p:cSld>
@@ -2968,9 +2972,9 @@
           <a:bodyPr/>
           <a:lstStyle/>
           <a:p>
-            <a:fld id="{E48CD0BF-8DB3-46F9-AB6B-05EB5F1F9DF1}" type="datetime1">
+            <a:fld id="{D38F2245-4267-48EA-B366-842CFF33295F}" type="datetime1">
               <a:rPr lang="pt-BR" smtClean="0"/>
-              <a:t>25/02/2021</a:t>
+              <a:t>25/03/2021</a:t>
             </a:fld>
             <a:endParaRPr lang="pt-BR"/>
           </a:p>
@@ -3103,7 +3107,7 @@
     </p:spTree>
     <p:extLst>
       <p:ext uri="{BB962C8B-B14F-4D97-AF65-F5344CB8AC3E}">
-        <p14:creationId xmlns:p14="http://schemas.microsoft.com/office/powerpoint/2010/main" val="4245807760"/>
+        <p14:creationId xmlns:p14="http://schemas.microsoft.com/office/powerpoint/2010/main" val="843654885"/>
       </p:ext>
     </p:extLst>
   </p:cSld>
@@ -3230,9 +3234,9 @@
           <a:bodyPr/>
           <a:lstStyle/>
           <a:p>
-            <a:fld id="{EFC0D9AA-6EAB-4FB7-AF5F-662EF6CDD452}" type="datetime1">
+            <a:fld id="{2ABAD931-B508-4432-A500-7E8AA61776D4}" type="datetime1">
               <a:rPr lang="pt-BR" smtClean="0"/>
-              <a:t>25/02/2021</a:t>
+              <a:t>25/03/2021</a:t>
             </a:fld>
             <a:endParaRPr lang="pt-BR"/>
           </a:p>
@@ -3365,7 +3369,7 @@
     </p:spTree>
     <p:extLst>
       <p:ext uri="{BB962C8B-B14F-4D97-AF65-F5344CB8AC3E}">
-        <p14:creationId xmlns:p14="http://schemas.microsoft.com/office/powerpoint/2010/main" val="3337108651"/>
+        <p14:creationId xmlns:p14="http://schemas.microsoft.com/office/powerpoint/2010/main" val="2813721007"/>
       </p:ext>
     </p:extLst>
   </p:cSld>
@@ -3559,9 +3563,9 @@
           <a:bodyPr/>
           <a:lstStyle/>
           <a:p>
-            <a:fld id="{1799002E-80CF-4025-AA74-D53A28310CC2}" type="datetime1">
+            <a:fld id="{78036EF8-A906-4BE4-9CEF-4388A0BD9062}" type="datetime1">
               <a:rPr lang="pt-BR" smtClean="0"/>
-              <a:t>25/02/2021</a:t>
+              <a:t>25/03/2021</a:t>
             </a:fld>
             <a:endParaRPr lang="pt-BR"/>
           </a:p>
@@ -3699,7 +3703,7 @@
     </p:spTree>
     <p:extLst>
       <p:ext uri="{BB962C8B-B14F-4D97-AF65-F5344CB8AC3E}">
-        <p14:creationId xmlns:p14="http://schemas.microsoft.com/office/powerpoint/2010/main" val="3878049795"/>
+        <p14:creationId xmlns:p14="http://schemas.microsoft.com/office/powerpoint/2010/main" val="3450469752"/>
       </p:ext>
     </p:extLst>
   </p:cSld>
@@ -3882,9 +3886,9 @@
           <a:bodyPr/>
           <a:lstStyle/>
           <a:p>
-            <a:fld id="{15EE396B-AC27-45D6-9DA2-978A7876735E}" type="datetime1">
+            <a:fld id="{1A9F916E-866A-4148-9979-B3CDF811CE63}" type="datetime1">
               <a:rPr lang="pt-BR" smtClean="0"/>
-              <a:t>25/02/2021</a:t>
+              <a:t>25/03/2021</a:t>
             </a:fld>
             <a:endParaRPr lang="pt-BR"/>
           </a:p>
@@ -4022,7 +4026,7 @@
     </p:spTree>
     <p:extLst>
       <p:ext uri="{BB962C8B-B14F-4D97-AF65-F5344CB8AC3E}">
-        <p14:creationId xmlns:p14="http://schemas.microsoft.com/office/powerpoint/2010/main" val="456400906"/>
+        <p14:creationId xmlns:p14="http://schemas.microsoft.com/office/powerpoint/2010/main" val="2799914001"/>
       </p:ext>
     </p:extLst>
   </p:cSld>
@@ -4339,9 +4343,9 @@
           <a:bodyPr/>
           <a:lstStyle/>
           <a:p>
-            <a:fld id="{E9D09F20-FF5E-4973-86AD-91AD1E9E38A5}" type="datetime1">
+            <a:fld id="{2C294B66-485B-4CC1-BB9F-DA2AF8618B54}" type="datetime1">
               <a:rPr lang="pt-BR" smtClean="0"/>
-              <a:t>25/02/2021</a:t>
+              <a:t>25/03/2021</a:t>
             </a:fld>
             <a:endParaRPr lang="pt-BR"/>
           </a:p>
@@ -4479,7 +4483,7 @@
     </p:spTree>
     <p:extLst>
       <p:ext uri="{BB962C8B-B14F-4D97-AF65-F5344CB8AC3E}">
-        <p14:creationId xmlns:p14="http://schemas.microsoft.com/office/powerpoint/2010/main" val="2965186806"/>
+        <p14:creationId xmlns:p14="http://schemas.microsoft.com/office/powerpoint/2010/main" val="3850645041"/>
       </p:ext>
     </p:extLst>
   </p:cSld>
@@ -4544,9 +4548,9 @@
           <a:bodyPr/>
           <a:lstStyle/>
           <a:p>
-            <a:fld id="{9887623D-FDF3-4D72-894A-17B83FB1E6C6}" type="datetime1">
+            <a:fld id="{725CFC88-0AE7-4361-BD6C-21632E1C26A6}" type="datetime1">
               <a:rPr lang="pt-BR" smtClean="0"/>
-              <a:t>25/02/2021</a:t>
+              <a:t>25/03/2021</a:t>
             </a:fld>
             <a:endParaRPr lang="pt-BR"/>
           </a:p>
@@ -4679,7 +4683,7 @@
     </p:spTree>
     <p:extLst>
       <p:ext uri="{BB962C8B-B14F-4D97-AF65-F5344CB8AC3E}">
-        <p14:creationId xmlns:p14="http://schemas.microsoft.com/office/powerpoint/2010/main" val="372215755"/>
+        <p14:creationId xmlns:p14="http://schemas.microsoft.com/office/powerpoint/2010/main" val="4152823043"/>
       </p:ext>
     </p:extLst>
   </p:cSld>
@@ -4721,9 +4725,9 @@
           <a:bodyPr/>
           <a:lstStyle/>
           <a:p>
-            <a:fld id="{5CDF3CE8-0E5F-42A0-B8C5-E7136EBF3FF4}" type="datetime1">
+            <a:fld id="{9A95A387-28BF-4FB8-AB11-381A9D73AF23}" type="datetime1">
               <a:rPr lang="pt-BR" smtClean="0"/>
-              <a:t>25/02/2021</a:t>
+              <a:t>25/03/2021</a:t>
             </a:fld>
             <a:endParaRPr lang="pt-BR"/>
           </a:p>
@@ -4856,7 +4860,7 @@
     </p:spTree>
     <p:extLst>
       <p:ext uri="{BB962C8B-B14F-4D97-AF65-F5344CB8AC3E}">
-        <p14:creationId xmlns:p14="http://schemas.microsoft.com/office/powerpoint/2010/main" val="3873911420"/>
+        <p14:creationId xmlns:p14="http://schemas.microsoft.com/office/powerpoint/2010/main" val="197579044"/>
       </p:ext>
     </p:extLst>
   </p:cSld>
@@ -5054,9 +5058,9 @@
           <a:bodyPr/>
           <a:lstStyle/>
           <a:p>
-            <a:fld id="{1FCDD141-40FE-4499-8C14-D0F6ECF4B410}" type="datetime1">
+            <a:fld id="{430D2509-ED21-4817-85C4-86088EA16D33}" type="datetime1">
               <a:rPr lang="pt-BR" smtClean="0"/>
-              <a:t>25/02/2021</a:t>
+              <a:t>25/03/2021</a:t>
             </a:fld>
             <a:endParaRPr lang="pt-BR"/>
           </a:p>
@@ -5189,7 +5193,7 @@
     </p:spTree>
     <p:extLst>
       <p:ext uri="{BB962C8B-B14F-4D97-AF65-F5344CB8AC3E}">
-        <p14:creationId xmlns:p14="http://schemas.microsoft.com/office/powerpoint/2010/main" val="2812532788"/>
+        <p14:creationId xmlns:p14="http://schemas.microsoft.com/office/powerpoint/2010/main" val="3197528320"/>
       </p:ext>
     </p:extLst>
   </p:cSld>
@@ -5399,9 +5403,9 @@
           <a:bodyPr/>
           <a:lstStyle/>
           <a:p>
-            <a:fld id="{4A79BE0E-74AB-4112-A1D3-F082B1A60E3E}" type="datetime1">
+            <a:fld id="{95EFD5DF-0EAD-4409-B89F-3C18C4EE4721}" type="datetime1">
               <a:rPr lang="pt-BR" smtClean="0"/>
-              <a:t>25/02/2021</a:t>
+              <a:t>25/03/2021</a:t>
             </a:fld>
             <a:endParaRPr lang="pt-BR"/>
           </a:p>
@@ -5539,7 +5543,7 @@
     </p:spTree>
     <p:extLst>
       <p:ext uri="{BB962C8B-B14F-4D97-AF65-F5344CB8AC3E}">
-        <p14:creationId xmlns:p14="http://schemas.microsoft.com/office/powerpoint/2010/main" val="1037234967"/>
+        <p14:creationId xmlns:p14="http://schemas.microsoft.com/office/powerpoint/2010/main" val="2547261125"/>
       </p:ext>
     </p:extLst>
   </p:cSld>
@@ -7516,9 +7520,9 @@
             </a:lvl1pPr>
           </a:lstStyle>
           <a:p>
-            <a:fld id="{C9FE23BC-8DE2-4335-951E-92054DC502A5}" type="datetime1">
+            <a:fld id="{76EF2189-26F1-479D-8E86-1F69112D6B63}" type="datetime1">
               <a:rPr lang="pt-BR" smtClean="0"/>
-              <a:t>25/02/2021</a:t>
+              <a:t>25/03/2021</a:t>
             </a:fld>
             <a:endParaRPr lang="pt-BR"/>
           </a:p>
@@ -7603,28 +7607,28 @@
     </p:spTree>
     <p:extLst>
       <p:ext uri="{BB962C8B-B14F-4D97-AF65-F5344CB8AC3E}">
-        <p14:creationId xmlns:p14="http://schemas.microsoft.com/office/powerpoint/2010/main" val="2636695033"/>
+        <p14:creationId xmlns:p14="http://schemas.microsoft.com/office/powerpoint/2010/main" val="902881950"/>
       </p:ext>
     </p:extLst>
   </p:cSld>
   <p:clrMap bg1="lt1" tx1="dk1" bg2="lt2" tx2="dk2" accent1="accent1" accent2="accent2" accent3="accent3" accent4="accent4" accent5="accent5" accent6="accent6" hlink="hlink" folHlink="folHlink"/>
   <p:sldLayoutIdLst>
-    <p:sldLayoutId id="2147483719" r:id="rId1"/>
-    <p:sldLayoutId id="2147483720" r:id="rId2"/>
-    <p:sldLayoutId id="2147483721" r:id="rId3"/>
-    <p:sldLayoutId id="2147483722" r:id="rId4"/>
-    <p:sldLayoutId id="2147483723" r:id="rId5"/>
-    <p:sldLayoutId id="2147483724" r:id="rId6"/>
-    <p:sldLayoutId id="2147483725" r:id="rId7"/>
-    <p:sldLayoutId id="2147483726" r:id="rId8"/>
-    <p:sldLayoutId id="2147483727" r:id="rId9"/>
-    <p:sldLayoutId id="2147483728" r:id="rId10"/>
-    <p:sldLayoutId id="2147483729" r:id="rId11"/>
-    <p:sldLayoutId id="2147483730" r:id="rId12"/>
-    <p:sldLayoutId id="2147483731" r:id="rId13"/>
-    <p:sldLayoutId id="2147483732" r:id="rId14"/>
-    <p:sldLayoutId id="2147483733" r:id="rId15"/>
-    <p:sldLayoutId id="2147483734" r:id="rId16"/>
+    <p:sldLayoutId id="2147483770" r:id="rId1"/>
+    <p:sldLayoutId id="2147483771" r:id="rId2"/>
+    <p:sldLayoutId id="2147483772" r:id="rId3"/>
+    <p:sldLayoutId id="2147483773" r:id="rId4"/>
+    <p:sldLayoutId id="2147483774" r:id="rId5"/>
+    <p:sldLayoutId id="2147483775" r:id="rId6"/>
+    <p:sldLayoutId id="2147483776" r:id="rId7"/>
+    <p:sldLayoutId id="2147483777" r:id="rId8"/>
+    <p:sldLayoutId id="2147483778" r:id="rId9"/>
+    <p:sldLayoutId id="2147483779" r:id="rId10"/>
+    <p:sldLayoutId id="2147483780" r:id="rId11"/>
+    <p:sldLayoutId id="2147483781" r:id="rId12"/>
+    <p:sldLayoutId id="2147483782" r:id="rId13"/>
+    <p:sldLayoutId id="2147483783" r:id="rId14"/>
+    <p:sldLayoutId id="2147483784" r:id="rId15"/>
+    <p:sldLayoutId id="2147483785" r:id="rId16"/>
   </p:sldLayoutIdLst>
   <p:hf hdr="0" ftr="0" dt="0"/>
   <p:txStyles>
@@ -8067,13 +8071,21 @@
           <a:p>
             <a:r>
               <a:rPr lang="pt-BR" sz="4000" dirty="0"/>
-              <a:t>Um framework para desenvolvimento de sistemas VGI com base no </a:t>
-            </a:r>
-            <a:r>
-              <a:rPr lang="pt-BR" sz="4000" dirty="0" err="1"/>
+              <a:t>Um </a:t>
+            </a:r>
+            <a:r>
+              <a:rPr lang="pt-BR" sz="4000" i="1" dirty="0"/>
+              <a:t>framework</a:t>
+            </a:r>
+            <a:r>
+              <a:rPr lang="pt-BR" sz="4000" dirty="0"/>
+              <a:t> para desenvolvimento de sistemas VGI com base no </a:t>
+            </a:r>
+            <a:r>
+              <a:rPr lang="pt-BR" sz="4000" i="1" dirty="0" err="1"/>
               <a:t>OpenStreetMap</a:t>
             </a:r>
-            <a:endParaRPr lang="pt-BR" sz="4000" dirty="0"/>
+            <a:endParaRPr lang="pt-BR" sz="4000" i="1" dirty="0"/>
           </a:p>
         </p:txBody>
       </p:sp>
@@ -8107,6 +8119,12 @@
           <a:p>
             <a:r>
               <a:rPr lang="pt-BR" dirty="0"/>
+              <a:t>Aluno: Carlos Henrique Tavares (DPI)</a:t>
+            </a:r>
+          </a:p>
+          <a:p>
+            <a:r>
+              <a:rPr lang="pt-BR" dirty="0"/>
               <a:t>Orientador: </a:t>
             </a:r>
             <a:r>
@@ -8131,41 +8149,6 @@
               <a:rPr lang="pt-BR" dirty="0"/>
               <a:t> (DEC)</a:t>
             </a:r>
-          </a:p>
-          <a:p>
-            <a:r>
-              <a:rPr lang="pt-BR" dirty="0"/>
-              <a:t>Aluno: Carlos Henrique Tavares (DPI)</a:t>
-            </a:r>
-          </a:p>
-        </p:txBody>
-      </p:sp>
-      <p:sp>
-        <p:nvSpPr>
-          <p:cNvPr id="4" name="Espaço Reservado para Número de Slide 3">
-            <a:extLst>
-              <a:ext uri="{FF2B5EF4-FFF2-40B4-BE49-F238E27FC236}">
-                <a16:creationId xmlns:a16="http://schemas.microsoft.com/office/drawing/2014/main" id="{738E2F26-E3E1-455A-AD5D-5C28A354A5DE}"/>
-              </a:ext>
-            </a:extLst>
-          </p:cNvPr>
-          <p:cNvSpPr>
-            <a:spLocks noGrp="1"/>
-          </p:cNvSpPr>
-          <p:nvPr>
-            <p:ph type="sldNum" sz="quarter" idx="12"/>
-          </p:nvPr>
-        </p:nvSpPr>
-        <p:spPr/>
-        <p:txBody>
-          <a:bodyPr/>
-          <a:lstStyle/>
-          <a:p>
-            <a:fld id="{805BF21B-4AC2-4D1F-B6C5-0BA92CC7D07E}" type="slidenum">
-              <a:rPr lang="pt-BR" smtClean="0"/>
-              <a:t>1</a:t>
-            </a:fld>
-            <a:endParaRPr lang="pt-BR"/>
           </a:p>
         </p:txBody>
       </p:sp>
@@ -8182,7 +8165,7 @@
 </p:sld>
 </file>
 
-<file path=ppt/slides/slide2.xml><?xml version="1.0" encoding="utf-8"?>
+<file path=ppt/slides/slide10.xml><?xml version="1.0" encoding="utf-8"?>
 <p:sld xmlns:a="http://schemas.openxmlformats.org/drawingml/2006/main" xmlns:r="http://schemas.openxmlformats.org/officeDocument/2006/relationships" xmlns:p="http://schemas.openxmlformats.org/presentationml/2006/main">
   <p:cSld>
     <p:spTree>
@@ -8204,7 +8187,7 @@
           <p:cNvPr id="2" name="Título 1">
             <a:extLst>
               <a:ext uri="{FF2B5EF4-FFF2-40B4-BE49-F238E27FC236}">
-                <a16:creationId xmlns:a16="http://schemas.microsoft.com/office/drawing/2014/main" id="{8280709A-F905-4C11-988E-2134C745F39D}"/>
+                <a16:creationId xmlns:a16="http://schemas.microsoft.com/office/drawing/2014/main" id="{023FB943-2055-4B82-A037-33BA0C6CD13C}"/>
               </a:ext>
             </a:extLst>
           </p:cNvPr>
@@ -8220,10 +8203,7 @@
           <a:bodyPr/>
           <a:lstStyle/>
           <a:p>
-            <a:r>
-              <a:rPr lang="pt-BR" dirty="0"/>
-              <a:t>Sumário</a:t>
-            </a:r>
+            <a:endParaRPr lang="pt-BR"/>
           </a:p>
         </p:txBody>
       </p:sp>
@@ -8232,7 +8212,7 @@
           <p:cNvPr id="3" name="Espaço Reservado para Conteúdo 2">
             <a:extLst>
               <a:ext uri="{FF2B5EF4-FFF2-40B4-BE49-F238E27FC236}">
-                <a16:creationId xmlns:a16="http://schemas.microsoft.com/office/drawing/2014/main" id="{C4EE9B25-AD2C-4E47-8D05-026EAA94F781}"/>
+                <a16:creationId xmlns:a16="http://schemas.microsoft.com/office/drawing/2014/main" id="{E17C7619-EDF7-4FFC-8F55-7E357A62F549}"/>
               </a:ext>
             </a:extLst>
           </p:cNvPr>
@@ -8248,61 +8228,10 @@
           <a:bodyPr/>
           <a:lstStyle/>
           <a:p>
-            <a:pPr marL="514350" indent="-514350">
-              <a:buFont typeface="+mj-lt"/>
-              <a:buAutoNum type="arabicPeriod"/>
-            </a:pPr>
             <a:r>
               <a:rPr lang="pt-BR" dirty="0"/>
-              <a:t>Principais conceitos</a:t>
-            </a:r>
-          </a:p>
-          <a:p>
-            <a:pPr marL="514350" indent="-514350">
-              <a:buFont typeface="+mj-lt"/>
-              <a:buAutoNum type="arabicPeriod"/>
-            </a:pPr>
-            <a:r>
-              <a:rPr lang="pt-BR" dirty="0"/>
-              <a:t>Objetivos com o trabalho</a:t>
-            </a:r>
-          </a:p>
-          <a:p>
-            <a:pPr marL="514350" indent="-514350">
-              <a:buFont typeface="+mj-lt"/>
-              <a:buAutoNum type="arabicPeriod"/>
-            </a:pPr>
-            <a:r>
-              <a:rPr lang="pt-BR" dirty="0"/>
-              <a:t>Progresso do trabalho</a:t>
-            </a:r>
-          </a:p>
-          <a:p>
-            <a:pPr marL="514350" indent="-514350">
-              <a:buFont typeface="+mj-lt"/>
-              <a:buAutoNum type="arabicPeriod"/>
-            </a:pPr>
-            <a:r>
-              <a:rPr lang="pt-BR" dirty="0"/>
-              <a:t>Evolução do trabalho</a:t>
-            </a:r>
-          </a:p>
-          <a:p>
-            <a:pPr marL="514350" indent="-514350">
-              <a:buFont typeface="+mj-lt"/>
-              <a:buAutoNum type="arabicPeriod"/>
-            </a:pPr>
-            <a:r>
-              <a:rPr lang="pt-BR" dirty="0"/>
-              <a:t>Cronograma</a:t>
-            </a:r>
-          </a:p>
-          <a:p>
-            <a:pPr marL="514350" indent="-514350">
-              <a:buFont typeface="+mj-lt"/>
-              <a:buAutoNum type="arabicPeriod"/>
-            </a:pPr>
-            <a:endParaRPr lang="pt-BR" dirty="0"/>
+              <a:t>(tela de anônimo)</a:t>
+            </a:r>
           </a:p>
         </p:txBody>
       </p:sp>
@@ -8311,7 +8240,7 @@
           <p:cNvPr id="4" name="Espaço Reservado para Número de Slide 3">
             <a:extLst>
               <a:ext uri="{FF2B5EF4-FFF2-40B4-BE49-F238E27FC236}">
-                <a16:creationId xmlns:a16="http://schemas.microsoft.com/office/drawing/2014/main" id="{4C23ED5E-8ECA-40EE-8A4E-9A7EB14D0834}"/>
+                <a16:creationId xmlns:a16="http://schemas.microsoft.com/office/drawing/2014/main" id="{91813D52-F598-4E28-96BF-EA5862AF3D4A}"/>
               </a:ext>
             </a:extLst>
           </p:cNvPr>
@@ -8329,7 +8258,7 @@
           <a:p>
             <a:fld id="{805BF21B-4AC2-4D1F-B6C5-0BA92CC7D07E}" type="slidenum">
               <a:rPr lang="pt-BR" smtClean="0"/>
-              <a:t>2</a:t>
+              <a:t>10</a:t>
             </a:fld>
             <a:endParaRPr lang="pt-BR"/>
           </a:p>
@@ -8338,7 +8267,7 @@
     </p:spTree>
     <p:extLst>
       <p:ext uri="{BB962C8B-B14F-4D97-AF65-F5344CB8AC3E}">
-        <p14:creationId xmlns:p14="http://schemas.microsoft.com/office/powerpoint/2010/main" val="2339816781"/>
+        <p14:creationId xmlns:p14="http://schemas.microsoft.com/office/powerpoint/2010/main" val="907847481"/>
       </p:ext>
     </p:extLst>
   </p:cSld>
@@ -8348,7 +8277,7 @@
 </p:sld>
 </file>
 
-<file path=ppt/slides/slide3.xml><?xml version="1.0" encoding="utf-8"?>
+<file path=ppt/slides/slide11.xml><?xml version="1.0" encoding="utf-8"?>
 <p:sld xmlns:a="http://schemas.openxmlformats.org/drawingml/2006/main" xmlns:r="http://schemas.openxmlformats.org/officeDocument/2006/relationships" xmlns:p="http://schemas.openxmlformats.org/presentationml/2006/main">
   <p:cSld>
     <p:spTree>
@@ -8370,486 +8299,6 @@
           <p:cNvPr id="2" name="Título 1">
             <a:extLst>
               <a:ext uri="{FF2B5EF4-FFF2-40B4-BE49-F238E27FC236}">
-                <a16:creationId xmlns:a16="http://schemas.microsoft.com/office/drawing/2014/main" id="{38F17D4B-1B57-45C1-A0F0-D3A58151502D}"/>
-              </a:ext>
-            </a:extLst>
-          </p:cNvPr>
-          <p:cNvSpPr>
-            <a:spLocks noGrp="1"/>
-          </p:cNvSpPr>
-          <p:nvPr>
-            <p:ph type="title"/>
-          </p:nvPr>
-        </p:nvSpPr>
-        <p:spPr/>
-        <p:txBody>
-          <a:bodyPr/>
-          <a:lstStyle/>
-          <a:p>
-            <a:r>
-              <a:rPr lang="pt-BR" dirty="0"/>
-              <a:t>3- Objetivos com o trabalho</a:t>
-            </a:r>
-          </a:p>
-        </p:txBody>
-      </p:sp>
-      <p:sp>
-        <p:nvSpPr>
-          <p:cNvPr id="3" name="Espaço Reservado para Conteúdo 2">
-            <a:extLst>
-              <a:ext uri="{FF2B5EF4-FFF2-40B4-BE49-F238E27FC236}">
-                <a16:creationId xmlns:a16="http://schemas.microsoft.com/office/drawing/2014/main" id="{E0E924DB-59EC-4539-B090-BDA922E66BB5}"/>
-              </a:ext>
-            </a:extLst>
-          </p:cNvPr>
-          <p:cNvSpPr>
-            <a:spLocks noGrp="1"/>
-          </p:cNvSpPr>
-          <p:nvPr>
-            <p:ph idx="1"/>
-          </p:nvPr>
-        </p:nvSpPr>
-        <p:spPr/>
-        <p:txBody>
-          <a:bodyPr/>
-          <a:lstStyle/>
-          <a:p>
-            <a:r>
-              <a:rPr lang="pt-BR" dirty="0"/>
-              <a:t>Utilização da biblioteca </a:t>
-            </a:r>
-            <a:r>
-              <a:rPr lang="pt-BR" dirty="0" err="1"/>
-              <a:t>Leaflet</a:t>
-            </a:r>
-            <a:r>
-              <a:rPr lang="pt-BR" dirty="0"/>
-              <a:t> para compor o mapa principal</a:t>
-            </a:r>
-          </a:p>
-          <a:p>
-            <a:r>
-              <a:rPr lang="pt-BR" dirty="0"/>
-              <a:t>Associar a colaboração a um dos tipos de dados vetoriais existentes – ponto, linha ou polígono (dimensionamento do fato observado)</a:t>
-            </a:r>
-          </a:p>
-          <a:p>
-            <a:r>
-              <a:rPr lang="pt-BR" dirty="0"/>
-              <a:t>Exportação dos dados no formato </a:t>
-            </a:r>
-            <a:r>
-              <a:rPr lang="pt-BR" dirty="0" err="1"/>
-              <a:t>geojson</a:t>
-            </a:r>
-            <a:r>
-              <a:rPr lang="pt-BR" dirty="0"/>
-              <a:t>, permitindo assim a leitura deles por qualquer sistema GIS (Sistema de Informação Geográfica)</a:t>
-            </a:r>
-          </a:p>
-        </p:txBody>
-      </p:sp>
-      <p:sp>
-        <p:nvSpPr>
-          <p:cNvPr id="4" name="Espaço Reservado para Número de Slide 3">
-            <a:extLst>
-              <a:ext uri="{FF2B5EF4-FFF2-40B4-BE49-F238E27FC236}">
-                <a16:creationId xmlns:a16="http://schemas.microsoft.com/office/drawing/2014/main" id="{912ADA50-E1A7-4EF3-9E9B-26908B6ABB66}"/>
-              </a:ext>
-            </a:extLst>
-          </p:cNvPr>
-          <p:cNvSpPr>
-            <a:spLocks noGrp="1"/>
-          </p:cNvSpPr>
-          <p:nvPr>
-            <p:ph type="sldNum" sz="quarter" idx="12"/>
-          </p:nvPr>
-        </p:nvSpPr>
-        <p:spPr/>
-        <p:txBody>
-          <a:bodyPr/>
-          <a:lstStyle/>
-          <a:p>
-            <a:fld id="{805BF21B-4AC2-4D1F-B6C5-0BA92CC7D07E}" type="slidenum">
-              <a:rPr lang="pt-BR" smtClean="0"/>
-              <a:t>3</a:t>
-            </a:fld>
-            <a:endParaRPr lang="pt-BR"/>
-          </a:p>
-        </p:txBody>
-      </p:sp>
-    </p:spTree>
-    <p:extLst>
-      <p:ext uri="{BB962C8B-B14F-4D97-AF65-F5344CB8AC3E}">
-        <p14:creationId xmlns:p14="http://schemas.microsoft.com/office/powerpoint/2010/main" val="2297197660"/>
-      </p:ext>
-    </p:extLst>
-  </p:cSld>
-  <p:clrMapOvr>
-    <a:masterClrMapping/>
-  </p:clrMapOvr>
-</p:sld>
-</file>
-
-<file path=ppt/slides/slide4.xml><?xml version="1.0" encoding="utf-8"?>
-<p:sld xmlns:a="http://schemas.openxmlformats.org/drawingml/2006/main" xmlns:r="http://schemas.openxmlformats.org/officeDocument/2006/relationships" xmlns:p="http://schemas.openxmlformats.org/presentationml/2006/main">
-  <p:cSld>
-    <p:spTree>
-      <p:nvGrpSpPr>
-        <p:cNvPr id="1" name=""/>
-        <p:cNvGrpSpPr/>
-        <p:nvPr/>
-      </p:nvGrpSpPr>
-      <p:grpSpPr>
-        <a:xfrm>
-          <a:off x="0" y="0"/>
-          <a:ext cx="0" cy="0"/>
-          <a:chOff x="0" y="0"/>
-          <a:chExt cx="0" cy="0"/>
-        </a:xfrm>
-      </p:grpSpPr>
-      <p:sp>
-        <p:nvSpPr>
-          <p:cNvPr id="2" name="Título 1">
-            <a:extLst>
-              <a:ext uri="{FF2B5EF4-FFF2-40B4-BE49-F238E27FC236}">
-                <a16:creationId xmlns:a16="http://schemas.microsoft.com/office/drawing/2014/main" id="{38F17D4B-1B57-45C1-A0F0-D3A58151502D}"/>
-              </a:ext>
-            </a:extLst>
-          </p:cNvPr>
-          <p:cNvSpPr>
-            <a:spLocks noGrp="1"/>
-          </p:cNvSpPr>
-          <p:nvPr>
-            <p:ph type="title"/>
-          </p:nvPr>
-        </p:nvSpPr>
-        <p:spPr/>
-        <p:txBody>
-          <a:bodyPr/>
-          <a:lstStyle/>
-          <a:p>
-            <a:r>
-              <a:rPr lang="pt-BR" dirty="0"/>
-              <a:t>3- Objetivos com o trabalho</a:t>
-            </a:r>
-          </a:p>
-        </p:txBody>
-      </p:sp>
-      <p:sp>
-        <p:nvSpPr>
-          <p:cNvPr id="3" name="Espaço Reservado para Conteúdo 2">
-            <a:extLst>
-              <a:ext uri="{FF2B5EF4-FFF2-40B4-BE49-F238E27FC236}">
-                <a16:creationId xmlns:a16="http://schemas.microsoft.com/office/drawing/2014/main" id="{E0E924DB-59EC-4539-B090-BDA922E66BB5}"/>
-              </a:ext>
-            </a:extLst>
-          </p:cNvPr>
-          <p:cNvSpPr>
-            <a:spLocks noGrp="1"/>
-          </p:cNvSpPr>
-          <p:nvPr>
-            <p:ph idx="1"/>
-          </p:nvPr>
-        </p:nvSpPr>
-        <p:spPr/>
-        <p:txBody>
-          <a:bodyPr/>
-          <a:lstStyle/>
-          <a:p>
-            <a:r>
-              <a:rPr lang="pt-BR" dirty="0"/>
-              <a:t>Utilização da biblioteca </a:t>
-            </a:r>
-            <a:r>
-              <a:rPr lang="pt-BR" dirty="0" err="1"/>
-              <a:t>Leaflet</a:t>
-            </a:r>
-            <a:r>
-              <a:rPr lang="pt-BR" dirty="0"/>
-              <a:t> para compor o mapa principal</a:t>
-            </a:r>
-          </a:p>
-          <a:p>
-            <a:r>
-              <a:rPr lang="pt-BR" dirty="0"/>
-              <a:t>Associar a colaboração a um dos tipos de dados vetoriais existentes – ponto, linha ou polígono (dimensionamento do fato observado)</a:t>
-            </a:r>
-          </a:p>
-          <a:p>
-            <a:r>
-              <a:rPr lang="pt-BR" dirty="0"/>
-              <a:t>Exportação dos dados no formato </a:t>
-            </a:r>
-            <a:r>
-              <a:rPr lang="pt-BR" dirty="0" err="1"/>
-              <a:t>geojson</a:t>
-            </a:r>
-            <a:r>
-              <a:rPr lang="pt-BR" dirty="0"/>
-              <a:t>, permitindo assim a leitura deles por qualquer sistema GIS (Sistema de Informação Geográfica)</a:t>
-            </a:r>
-          </a:p>
-        </p:txBody>
-      </p:sp>
-      <p:pic>
-        <p:nvPicPr>
-          <p:cNvPr id="5" name="Imagem 4">
-            <a:extLst>
-              <a:ext uri="{FF2B5EF4-FFF2-40B4-BE49-F238E27FC236}">
-                <a16:creationId xmlns:a16="http://schemas.microsoft.com/office/drawing/2014/main" id="{DA662172-9C97-4773-A555-08FFE52EE3B7}"/>
-              </a:ext>
-            </a:extLst>
-          </p:cNvPr>
-          <p:cNvPicPr>
-            <a:picLocks noChangeAspect="1"/>
-          </p:cNvPicPr>
-          <p:nvPr/>
-        </p:nvPicPr>
-        <p:blipFill>
-          <a:blip r:embed="rId2">
-            <a:extLst>
-              <a:ext uri="{28A0092B-C50C-407E-A947-70E740481C1C}">
-                <a14:useLocalDpi xmlns:a14="http://schemas.microsoft.com/office/drawing/2010/main" val="0"/>
-              </a:ext>
-            </a:extLst>
-          </a:blip>
-          <a:stretch>
-            <a:fillRect/>
-          </a:stretch>
-        </p:blipFill>
-        <p:spPr>
-          <a:xfrm>
-            <a:off x="10123535" y="2172311"/>
-            <a:ext cx="295470" cy="302153"/>
-          </a:xfrm>
-          <a:prstGeom prst="rect">
-            <a:avLst/>
-          </a:prstGeom>
-        </p:spPr>
-      </p:pic>
-      <p:pic>
-        <p:nvPicPr>
-          <p:cNvPr id="7" name="Imagem 6">
-            <a:extLst>
-              <a:ext uri="{FF2B5EF4-FFF2-40B4-BE49-F238E27FC236}">
-                <a16:creationId xmlns:a16="http://schemas.microsoft.com/office/drawing/2014/main" id="{65927178-6CC9-42EF-B492-DA0816FFE1EF}"/>
-              </a:ext>
-            </a:extLst>
-          </p:cNvPr>
-          <p:cNvPicPr>
-            <a:picLocks noChangeAspect="1"/>
-          </p:cNvPicPr>
-          <p:nvPr/>
-        </p:nvPicPr>
-        <p:blipFill>
-          <a:blip r:embed="rId2">
-            <a:extLst>
-              <a:ext uri="{28A0092B-C50C-407E-A947-70E740481C1C}">
-                <a14:useLocalDpi xmlns:a14="http://schemas.microsoft.com/office/drawing/2010/main" val="0"/>
-              </a:ext>
-            </a:extLst>
-          </a:blip>
-          <a:stretch>
-            <a:fillRect/>
-          </a:stretch>
-        </p:blipFill>
-        <p:spPr>
-          <a:xfrm>
-            <a:off x="10229364" y="2857960"/>
-            <a:ext cx="270684" cy="276806"/>
-          </a:xfrm>
-          <a:prstGeom prst="rect">
-            <a:avLst/>
-          </a:prstGeom>
-        </p:spPr>
-      </p:pic>
-      <p:sp>
-        <p:nvSpPr>
-          <p:cNvPr id="4" name="Espaço Reservado para Número de Slide 3">
-            <a:extLst>
-              <a:ext uri="{FF2B5EF4-FFF2-40B4-BE49-F238E27FC236}">
-                <a16:creationId xmlns:a16="http://schemas.microsoft.com/office/drawing/2014/main" id="{9CC864FD-B25A-4021-9A49-780D92B3FE1F}"/>
-              </a:ext>
-            </a:extLst>
-          </p:cNvPr>
-          <p:cNvSpPr>
-            <a:spLocks noGrp="1"/>
-          </p:cNvSpPr>
-          <p:nvPr>
-            <p:ph type="sldNum" sz="quarter" idx="12"/>
-          </p:nvPr>
-        </p:nvSpPr>
-        <p:spPr/>
-        <p:txBody>
-          <a:bodyPr/>
-          <a:lstStyle/>
-          <a:p>
-            <a:fld id="{805BF21B-4AC2-4D1F-B6C5-0BA92CC7D07E}" type="slidenum">
-              <a:rPr lang="pt-BR" smtClean="0"/>
-              <a:t>4</a:t>
-            </a:fld>
-            <a:endParaRPr lang="pt-BR"/>
-          </a:p>
-        </p:txBody>
-      </p:sp>
-    </p:spTree>
-    <p:extLst>
-      <p:ext uri="{BB962C8B-B14F-4D97-AF65-F5344CB8AC3E}">
-        <p14:creationId xmlns:p14="http://schemas.microsoft.com/office/powerpoint/2010/main" val="2762171324"/>
-      </p:ext>
-    </p:extLst>
-  </p:cSld>
-  <p:clrMapOvr>
-    <a:masterClrMapping/>
-  </p:clrMapOvr>
-</p:sld>
-</file>
-
-<file path=ppt/slides/slide5.xml><?xml version="1.0" encoding="utf-8"?>
-<p:sld xmlns:a="http://schemas.openxmlformats.org/drawingml/2006/main" xmlns:r="http://schemas.openxmlformats.org/officeDocument/2006/relationships" xmlns:p="http://schemas.openxmlformats.org/presentationml/2006/main">
-  <p:cSld>
-    <p:spTree>
-      <p:nvGrpSpPr>
-        <p:cNvPr id="1" name=""/>
-        <p:cNvGrpSpPr/>
-        <p:nvPr/>
-      </p:nvGrpSpPr>
-      <p:grpSpPr>
-        <a:xfrm>
-          <a:off x="0" y="0"/>
-          <a:ext cx="0" cy="0"/>
-          <a:chOff x="0" y="0"/>
-          <a:chExt cx="0" cy="0"/>
-        </a:xfrm>
-      </p:grpSpPr>
-      <p:sp>
-        <p:nvSpPr>
-          <p:cNvPr id="2" name="Título 1">
-            <a:extLst>
-              <a:ext uri="{FF2B5EF4-FFF2-40B4-BE49-F238E27FC236}">
-                <a16:creationId xmlns:a16="http://schemas.microsoft.com/office/drawing/2014/main" id="{68186E4F-188C-4D1D-8B29-09EC2EA6C34B}"/>
-              </a:ext>
-            </a:extLst>
-          </p:cNvPr>
-          <p:cNvSpPr>
-            <a:spLocks noGrp="1"/>
-          </p:cNvSpPr>
-          <p:nvPr>
-            <p:ph type="title"/>
-          </p:nvPr>
-        </p:nvSpPr>
-        <p:spPr/>
-        <p:txBody>
-          <a:bodyPr/>
-          <a:lstStyle/>
-          <a:p>
-            <a:r>
-              <a:rPr lang="pt-BR" dirty="0"/>
-              <a:t>4- Arquitetura do sistema</a:t>
-            </a:r>
-          </a:p>
-        </p:txBody>
-      </p:sp>
-      <p:pic>
-        <p:nvPicPr>
-          <p:cNvPr id="9" name="Espaço Reservado para Conteúdo 8">
-            <a:extLst>
-              <a:ext uri="{FF2B5EF4-FFF2-40B4-BE49-F238E27FC236}">
-                <a16:creationId xmlns:a16="http://schemas.microsoft.com/office/drawing/2014/main" id="{3EE2698D-487E-4932-8034-C76F2441B426}"/>
-              </a:ext>
-            </a:extLst>
-          </p:cNvPr>
-          <p:cNvPicPr>
-            <a:picLocks noGrp="1" noChangeAspect="1"/>
-          </p:cNvPicPr>
-          <p:nvPr>
-            <p:ph idx="1"/>
-          </p:nvPr>
-        </p:nvPicPr>
-        <p:blipFill>
-          <a:blip r:embed="rId2">
-            <a:extLst>
-              <a:ext uri="{28A0092B-C50C-407E-A947-70E740481C1C}">
-                <a14:useLocalDpi xmlns:a14="http://schemas.microsoft.com/office/drawing/2010/main" val="0"/>
-              </a:ext>
-            </a:extLst>
-          </a:blip>
-          <a:stretch>
-            <a:fillRect/>
-          </a:stretch>
-        </p:blipFill>
-        <p:spPr>
-          <a:xfrm>
-            <a:off x="1405916" y="2057157"/>
-            <a:ext cx="10578955" cy="3727823"/>
-          </a:xfrm>
-        </p:spPr>
-      </p:pic>
-      <p:sp>
-        <p:nvSpPr>
-          <p:cNvPr id="10" name="Espaço Reservado para Número de Slide 9">
-            <a:extLst>
-              <a:ext uri="{FF2B5EF4-FFF2-40B4-BE49-F238E27FC236}">
-                <a16:creationId xmlns:a16="http://schemas.microsoft.com/office/drawing/2014/main" id="{7F9137DF-9FF8-464D-9AE9-C38D4B72BD96}"/>
-              </a:ext>
-            </a:extLst>
-          </p:cNvPr>
-          <p:cNvSpPr>
-            <a:spLocks noGrp="1"/>
-          </p:cNvSpPr>
-          <p:nvPr>
-            <p:ph type="sldNum" sz="quarter" idx="12"/>
-          </p:nvPr>
-        </p:nvSpPr>
-        <p:spPr/>
-        <p:txBody>
-          <a:bodyPr/>
-          <a:lstStyle/>
-          <a:p>
-            <a:fld id="{805BF21B-4AC2-4D1F-B6C5-0BA92CC7D07E}" type="slidenum">
-              <a:rPr lang="pt-BR" smtClean="0"/>
-              <a:t>5</a:t>
-            </a:fld>
-            <a:endParaRPr lang="pt-BR"/>
-          </a:p>
-        </p:txBody>
-      </p:sp>
-    </p:spTree>
-    <p:extLst>
-      <p:ext uri="{BB962C8B-B14F-4D97-AF65-F5344CB8AC3E}">
-        <p14:creationId xmlns:p14="http://schemas.microsoft.com/office/powerpoint/2010/main" val="1452209387"/>
-      </p:ext>
-    </p:extLst>
-  </p:cSld>
-  <p:clrMapOvr>
-    <a:masterClrMapping/>
-  </p:clrMapOvr>
-</p:sld>
-</file>
-
-<file path=ppt/slides/slide6.xml><?xml version="1.0" encoding="utf-8"?>
-<p:sld xmlns:a="http://schemas.openxmlformats.org/drawingml/2006/main" xmlns:r="http://schemas.openxmlformats.org/officeDocument/2006/relationships" xmlns:p="http://schemas.openxmlformats.org/presentationml/2006/main">
-  <p:cSld>
-    <p:spTree>
-      <p:nvGrpSpPr>
-        <p:cNvPr id="1" name=""/>
-        <p:cNvGrpSpPr/>
-        <p:nvPr/>
-      </p:nvGrpSpPr>
-      <p:grpSpPr>
-        <a:xfrm>
-          <a:off x="0" y="0"/>
-          <a:ext cx="0" cy="0"/>
-          <a:chOff x="0" y="0"/>
-          <a:chExt cx="0" cy="0"/>
-        </a:xfrm>
-      </p:grpSpPr>
-      <p:sp>
-        <p:nvSpPr>
-          <p:cNvPr id="2" name="Título 1">
-            <a:extLst>
-              <a:ext uri="{FF2B5EF4-FFF2-40B4-BE49-F238E27FC236}">
                 <a16:creationId xmlns:a16="http://schemas.microsoft.com/office/drawing/2014/main" id="{5B09F2C1-B4EB-4412-8303-24427CF83F26}"/>
               </a:ext>
             </a:extLst>
@@ -8868,7 +8317,7 @@
           <a:p>
             <a:r>
               <a:rPr lang="pt-BR" dirty="0"/>
-              <a:t>5- Artigo </a:t>
+              <a:t>Artigo </a:t>
             </a:r>
           </a:p>
         </p:txBody>
@@ -8948,7 +8397,7 @@
           <a:p>
             <a:fld id="{805BF21B-4AC2-4D1F-B6C5-0BA92CC7D07E}" type="slidenum">
               <a:rPr lang="pt-BR" smtClean="0"/>
-              <a:t>6</a:t>
+              <a:t>11</a:t>
             </a:fld>
             <a:endParaRPr lang="pt-BR"/>
           </a:p>
@@ -9026,6 +8475,42 @@
           </a:prstGeom>
         </p:spPr>
       </p:pic>
+      <p:pic>
+        <p:nvPicPr>
+          <p:cNvPr id="7" name="Imagem 6">
+            <a:extLst>
+              <a:ext uri="{FF2B5EF4-FFF2-40B4-BE49-F238E27FC236}">
+                <a16:creationId xmlns:a16="http://schemas.microsoft.com/office/drawing/2014/main" id="{6E4A92BF-C375-438C-BC51-B491D0A49B41}"/>
+              </a:ext>
+            </a:extLst>
+          </p:cNvPr>
+          <p:cNvPicPr>
+            <a:picLocks noChangeAspect="1"/>
+          </p:cNvPicPr>
+          <p:nvPr/>
+        </p:nvPicPr>
+        <p:blipFill>
+          <a:blip r:embed="rId2">
+            <a:extLst>
+              <a:ext uri="{28A0092B-C50C-407E-A947-70E740481C1C}">
+                <a14:useLocalDpi xmlns:a14="http://schemas.microsoft.com/office/drawing/2010/main" val="0"/>
+              </a:ext>
+            </a:extLst>
+          </a:blip>
+          <a:stretch>
+            <a:fillRect/>
+          </a:stretch>
+        </p:blipFill>
+        <p:spPr>
+          <a:xfrm>
+            <a:off x="5004140" y="2557514"/>
+            <a:ext cx="295470" cy="302153"/>
+          </a:xfrm>
+          <a:prstGeom prst="rect">
+            <a:avLst/>
+          </a:prstGeom>
+        </p:spPr>
+      </p:pic>
     </p:spTree>
     <p:extLst>
       <p:ext uri="{BB962C8B-B14F-4D97-AF65-F5344CB8AC3E}">
@@ -9039,7 +8524,7 @@
 </p:sld>
 </file>
 
-<file path=ppt/slides/slide7.xml><?xml version="1.0" encoding="utf-8"?>
+<file path=ppt/slides/slide12.xml><?xml version="1.0" encoding="utf-8"?>
 <p:sld xmlns:a="http://schemas.openxmlformats.org/drawingml/2006/main" xmlns:r="http://schemas.openxmlformats.org/officeDocument/2006/relationships" xmlns:p="http://schemas.openxmlformats.org/presentationml/2006/main">
   <p:cSld>
     <p:spTree>
@@ -9061,118 +8546,6 @@
           <p:cNvPr id="2" name="Título 1">
             <a:extLst>
               <a:ext uri="{FF2B5EF4-FFF2-40B4-BE49-F238E27FC236}">
-                <a16:creationId xmlns:a16="http://schemas.microsoft.com/office/drawing/2014/main" id="{157E5388-95B7-4E85-A673-595FE16EAD77}"/>
-              </a:ext>
-            </a:extLst>
-          </p:cNvPr>
-          <p:cNvSpPr>
-            <a:spLocks noGrp="1"/>
-          </p:cNvSpPr>
-          <p:nvPr>
-            <p:ph type="title"/>
-          </p:nvPr>
-        </p:nvSpPr>
-        <p:spPr/>
-        <p:txBody>
-          <a:bodyPr/>
-          <a:lstStyle/>
-          <a:p>
-            <a:r>
-              <a:rPr lang="pt-BR" dirty="0"/>
-              <a:t>6- Documentação (GitHub)</a:t>
-            </a:r>
-          </a:p>
-        </p:txBody>
-      </p:sp>
-      <p:sp>
-        <p:nvSpPr>
-          <p:cNvPr id="3" name="Espaço Reservado para Conteúdo 2">
-            <a:extLst>
-              <a:ext uri="{FF2B5EF4-FFF2-40B4-BE49-F238E27FC236}">
-                <a16:creationId xmlns:a16="http://schemas.microsoft.com/office/drawing/2014/main" id="{6783E9C8-50AD-42D2-A414-079AB3262902}"/>
-              </a:ext>
-            </a:extLst>
-          </p:cNvPr>
-          <p:cNvSpPr>
-            <a:spLocks noGrp="1"/>
-          </p:cNvSpPr>
-          <p:nvPr>
-            <p:ph idx="1"/>
-          </p:nvPr>
-        </p:nvSpPr>
-        <p:spPr/>
-        <p:txBody>
-          <a:bodyPr/>
-          <a:lstStyle/>
-          <a:p>
-            <a:endParaRPr lang="pt-BR" dirty="0"/>
-          </a:p>
-        </p:txBody>
-      </p:sp>
-      <p:sp>
-        <p:nvSpPr>
-          <p:cNvPr id="4" name="Espaço Reservado para Número de Slide 3">
-            <a:extLst>
-              <a:ext uri="{FF2B5EF4-FFF2-40B4-BE49-F238E27FC236}">
-                <a16:creationId xmlns:a16="http://schemas.microsoft.com/office/drawing/2014/main" id="{0FB2C98A-D154-451D-91EB-625AB3060231}"/>
-              </a:ext>
-            </a:extLst>
-          </p:cNvPr>
-          <p:cNvSpPr>
-            <a:spLocks noGrp="1"/>
-          </p:cNvSpPr>
-          <p:nvPr>
-            <p:ph type="sldNum" sz="quarter" idx="12"/>
-          </p:nvPr>
-        </p:nvSpPr>
-        <p:spPr/>
-        <p:txBody>
-          <a:bodyPr/>
-          <a:lstStyle/>
-          <a:p>
-            <a:fld id="{805BF21B-4AC2-4D1F-B6C5-0BA92CC7D07E}" type="slidenum">
-              <a:rPr lang="pt-BR" smtClean="0"/>
-              <a:t>7</a:t>
-            </a:fld>
-            <a:endParaRPr lang="pt-BR"/>
-          </a:p>
-        </p:txBody>
-      </p:sp>
-    </p:spTree>
-    <p:extLst>
-      <p:ext uri="{BB962C8B-B14F-4D97-AF65-F5344CB8AC3E}">
-        <p14:creationId xmlns:p14="http://schemas.microsoft.com/office/powerpoint/2010/main" val="3112294658"/>
-      </p:ext>
-    </p:extLst>
-  </p:cSld>
-  <p:clrMapOvr>
-    <a:masterClrMapping/>
-  </p:clrMapOvr>
-</p:sld>
-</file>
-
-<file path=ppt/slides/slide8.xml><?xml version="1.0" encoding="utf-8"?>
-<p:sld xmlns:a="http://schemas.openxmlformats.org/drawingml/2006/main" xmlns:r="http://schemas.openxmlformats.org/officeDocument/2006/relationships" xmlns:p="http://schemas.openxmlformats.org/presentationml/2006/main">
-  <p:cSld>
-    <p:spTree>
-      <p:nvGrpSpPr>
-        <p:cNvPr id="1" name=""/>
-        <p:cNvGrpSpPr/>
-        <p:nvPr/>
-      </p:nvGrpSpPr>
-      <p:grpSpPr>
-        <a:xfrm>
-          <a:off x="0" y="0"/>
-          <a:ext cx="0" cy="0"/>
-          <a:chOff x="0" y="0"/>
-          <a:chExt cx="0" cy="0"/>
-        </a:xfrm>
-      </p:grpSpPr>
-      <p:sp>
-        <p:nvSpPr>
-          <p:cNvPr id="2" name="Título 1">
-            <a:extLst>
-              <a:ext uri="{FF2B5EF4-FFF2-40B4-BE49-F238E27FC236}">
                 <a16:creationId xmlns:a16="http://schemas.microsoft.com/office/drawing/2014/main" id="{7F7A5EA2-EEAB-49B5-A52C-68B2A219593D}"/>
               </a:ext>
             </a:extLst>
@@ -9191,7 +8564,7 @@
           <a:p>
             <a:r>
               <a:rPr lang="pt-BR" dirty="0"/>
-              <a:t>6- Calendário</a:t>
+              <a:t>Calendário</a:t>
             </a:r>
           </a:p>
         </p:txBody>
@@ -9212,7 +8585,7 @@
             <p:ph idx="1"/>
             <p:extLst>
               <p:ext uri="{D42A27DB-BD31-4B8C-83A1-F6EECF244321}">
-                <p14:modId xmlns:p14="http://schemas.microsoft.com/office/powerpoint/2010/main" val="349277537"/>
+                <p14:modId xmlns:p14="http://schemas.microsoft.com/office/powerpoint/2010/main" val="4052300653"/>
               </p:ext>
             </p:extLst>
           </p:nvPr>
@@ -9388,9 +8761,7 @@
                   </a:txBody>
                   <a:tcPr marL="77525" marR="77525">
                     <a:solidFill>
-                      <a:schemeClr val="bg1">
-                        <a:lumMod val="85000"/>
-                      </a:schemeClr>
+                      <a:srgbClr val="92D050"/>
                     </a:solidFill>
                   </a:tcPr>
                 </a:tc>
@@ -9400,7 +8771,10 @@
                     <a:lstStyle/>
                     <a:p>
                       <a:pPr algn="ctr"/>
-                      <a:endParaRPr lang="pt-BR"/>
+                      <a:r>
+                        <a:rPr lang="pt-BR" dirty="0"/>
+                        <a:t>X</a:t>
+                      </a:r>
                     </a:p>
                   </a:txBody>
                   <a:tcPr marL="77525" marR="77525"/>
@@ -9461,7 +8835,7 @@
                     <a:lstStyle/>
                     <a:p>
                       <a:pPr algn="ctr"/>
-                      <a:endParaRPr lang="pt-BR"/>
+                      <a:endParaRPr lang="pt-BR" dirty="0"/>
                     </a:p>
                   </a:txBody>
                   <a:tcPr marL="77525" marR="77525"/>
@@ -9539,7 +8913,11 @@
                       </a:r>
                     </a:p>
                   </a:txBody>
-                  <a:tcPr marL="77525" marR="77525"/>
+                  <a:tcPr marL="77525" marR="77525">
+                    <a:solidFill>
+                      <a:srgbClr val="92D050"/>
+                    </a:solidFill>
+                  </a:tcPr>
                 </a:tc>
                 <a:tc>
                   <a:txBody>
@@ -9635,7 +9013,11 @@
                       </a:r>
                     </a:p>
                   </a:txBody>
-                  <a:tcPr marL="77525" marR="77525"/>
+                  <a:tcPr marL="77525" marR="77525">
+                    <a:solidFill>
+                      <a:srgbClr val="92D050"/>
+                    </a:solidFill>
+                  </a:tcPr>
                 </a:tc>
                 <a:tc>
                   <a:txBody>
@@ -9698,7 +9080,7 @@
           <a:p>
             <a:fld id="{805BF21B-4AC2-4D1F-B6C5-0BA92CC7D07E}" type="slidenum">
               <a:rPr lang="pt-BR" smtClean="0"/>
-              <a:t>8</a:t>
+              <a:t>12</a:t>
             </a:fld>
             <a:endParaRPr lang="pt-BR"/>
           </a:p>
@@ -9708,6 +9090,1137 @@
     <p:extLst>
       <p:ext uri="{BB962C8B-B14F-4D97-AF65-F5344CB8AC3E}">
         <p14:creationId xmlns:p14="http://schemas.microsoft.com/office/powerpoint/2010/main" val="4067204307"/>
+      </p:ext>
+    </p:extLst>
+  </p:cSld>
+  <p:clrMapOvr>
+    <a:masterClrMapping/>
+  </p:clrMapOvr>
+</p:sld>
+</file>
+
+<file path=ppt/slides/slide13.xml><?xml version="1.0" encoding="utf-8"?>
+<p:sld xmlns:a="http://schemas.openxmlformats.org/drawingml/2006/main" xmlns:r="http://schemas.openxmlformats.org/officeDocument/2006/relationships" xmlns:p="http://schemas.openxmlformats.org/presentationml/2006/main">
+  <p:cSld>
+    <p:spTree>
+      <p:nvGrpSpPr>
+        <p:cNvPr id="1" name=""/>
+        <p:cNvGrpSpPr/>
+        <p:nvPr/>
+      </p:nvGrpSpPr>
+      <p:grpSpPr>
+        <a:xfrm>
+          <a:off x="0" y="0"/>
+          <a:ext cx="0" cy="0"/>
+          <a:chOff x="0" y="0"/>
+          <a:chExt cx="0" cy="0"/>
+        </a:xfrm>
+      </p:grpSpPr>
+      <p:sp>
+        <p:nvSpPr>
+          <p:cNvPr id="2" name="Título 1">
+            <a:extLst>
+              <a:ext uri="{FF2B5EF4-FFF2-40B4-BE49-F238E27FC236}">
+                <a16:creationId xmlns:a16="http://schemas.microsoft.com/office/drawing/2014/main" id="{C8C25D02-69C4-4672-8EF0-F1C63F8E3237}"/>
+              </a:ext>
+            </a:extLst>
+          </p:cNvPr>
+          <p:cNvSpPr>
+            <a:spLocks noGrp="1"/>
+          </p:cNvSpPr>
+          <p:nvPr>
+            <p:ph type="title"/>
+          </p:nvPr>
+        </p:nvSpPr>
+        <p:spPr/>
+        <p:txBody>
+          <a:bodyPr/>
+          <a:lstStyle/>
+          <a:p>
+            <a:pPr algn="ctr"/>
+            <a:r>
+              <a:rPr lang="pt-BR" dirty="0"/>
+              <a:t>Dúvidas ou sugestões ?</a:t>
+            </a:r>
+          </a:p>
+        </p:txBody>
+      </p:sp>
+      <p:sp>
+        <p:nvSpPr>
+          <p:cNvPr id="3" name="Espaço Reservado para Conteúdo 2">
+            <a:extLst>
+              <a:ext uri="{FF2B5EF4-FFF2-40B4-BE49-F238E27FC236}">
+                <a16:creationId xmlns:a16="http://schemas.microsoft.com/office/drawing/2014/main" id="{CE5ABC03-D737-4EBF-9571-BAA76FA72477}"/>
+              </a:ext>
+            </a:extLst>
+          </p:cNvPr>
+          <p:cNvSpPr>
+            <a:spLocks noGrp="1"/>
+          </p:cNvSpPr>
+          <p:nvPr>
+            <p:ph idx="1"/>
+          </p:nvPr>
+        </p:nvSpPr>
+        <p:spPr/>
+        <p:txBody>
+          <a:bodyPr/>
+          <a:lstStyle/>
+          <a:p>
+            <a:endParaRPr lang="pt-BR" dirty="0"/>
+          </a:p>
+          <a:p>
+            <a:endParaRPr lang="pt-BR" dirty="0"/>
+          </a:p>
+          <a:p>
+            <a:endParaRPr lang="pt-BR" dirty="0"/>
+          </a:p>
+          <a:p>
+            <a:pPr marL="0" indent="0" algn="ctr">
+              <a:buNone/>
+            </a:pPr>
+            <a:r>
+              <a:rPr lang="pt-BR" dirty="0"/>
+              <a:t>https://github.com/TavaresCarlos/TCC</a:t>
+            </a:r>
+          </a:p>
+          <a:p>
+            <a:pPr marL="0" indent="0" algn="ctr">
+              <a:buNone/>
+            </a:pPr>
+            <a:r>
+              <a:rPr lang="pt-BR" dirty="0"/>
+              <a:t>(carlos.h.tavares@ufv.br)</a:t>
+            </a:r>
+          </a:p>
+        </p:txBody>
+      </p:sp>
+      <p:sp>
+        <p:nvSpPr>
+          <p:cNvPr id="4" name="Espaço Reservado para Número de Slide 3">
+            <a:extLst>
+              <a:ext uri="{FF2B5EF4-FFF2-40B4-BE49-F238E27FC236}">
+                <a16:creationId xmlns:a16="http://schemas.microsoft.com/office/drawing/2014/main" id="{9EF039A5-B09F-41E9-AFCC-E33B7F993C32}"/>
+              </a:ext>
+            </a:extLst>
+          </p:cNvPr>
+          <p:cNvSpPr>
+            <a:spLocks noGrp="1"/>
+          </p:cNvSpPr>
+          <p:nvPr>
+            <p:ph type="sldNum" sz="quarter" idx="12"/>
+          </p:nvPr>
+        </p:nvSpPr>
+        <p:spPr/>
+        <p:txBody>
+          <a:bodyPr/>
+          <a:lstStyle/>
+          <a:p>
+            <a:fld id="{805BF21B-4AC2-4D1F-B6C5-0BA92CC7D07E}" type="slidenum">
+              <a:rPr lang="pt-BR" smtClean="0"/>
+              <a:t>13</a:t>
+            </a:fld>
+            <a:endParaRPr lang="pt-BR"/>
+          </a:p>
+        </p:txBody>
+      </p:sp>
+    </p:spTree>
+    <p:extLst>
+      <p:ext uri="{BB962C8B-B14F-4D97-AF65-F5344CB8AC3E}">
+        <p14:creationId xmlns:p14="http://schemas.microsoft.com/office/powerpoint/2010/main" val="1519502685"/>
+      </p:ext>
+    </p:extLst>
+  </p:cSld>
+  <p:clrMapOvr>
+    <a:masterClrMapping/>
+  </p:clrMapOvr>
+</p:sld>
+</file>
+
+<file path=ppt/slides/slide2.xml><?xml version="1.0" encoding="utf-8"?>
+<p:sld xmlns:a="http://schemas.openxmlformats.org/drawingml/2006/main" xmlns:r="http://schemas.openxmlformats.org/officeDocument/2006/relationships" xmlns:p="http://schemas.openxmlformats.org/presentationml/2006/main">
+  <p:cSld>
+    <p:spTree>
+      <p:nvGrpSpPr>
+        <p:cNvPr id="1" name=""/>
+        <p:cNvGrpSpPr/>
+        <p:nvPr/>
+      </p:nvGrpSpPr>
+      <p:grpSpPr>
+        <a:xfrm>
+          <a:off x="0" y="0"/>
+          <a:ext cx="0" cy="0"/>
+          <a:chOff x="0" y="0"/>
+          <a:chExt cx="0" cy="0"/>
+        </a:xfrm>
+      </p:grpSpPr>
+      <p:sp>
+        <p:nvSpPr>
+          <p:cNvPr id="2" name="Título 1">
+            <a:extLst>
+              <a:ext uri="{FF2B5EF4-FFF2-40B4-BE49-F238E27FC236}">
+                <a16:creationId xmlns:a16="http://schemas.microsoft.com/office/drawing/2014/main" id="{8280709A-F905-4C11-988E-2134C745F39D}"/>
+              </a:ext>
+            </a:extLst>
+          </p:cNvPr>
+          <p:cNvSpPr>
+            <a:spLocks noGrp="1"/>
+          </p:cNvSpPr>
+          <p:nvPr>
+            <p:ph type="title"/>
+          </p:nvPr>
+        </p:nvSpPr>
+        <p:spPr/>
+        <p:txBody>
+          <a:bodyPr/>
+          <a:lstStyle/>
+          <a:p>
+            <a:r>
+              <a:rPr lang="pt-BR" dirty="0"/>
+              <a:t>Sumário</a:t>
+            </a:r>
+          </a:p>
+        </p:txBody>
+      </p:sp>
+      <p:sp>
+        <p:nvSpPr>
+          <p:cNvPr id="3" name="Espaço Reservado para Conteúdo 2">
+            <a:extLst>
+              <a:ext uri="{FF2B5EF4-FFF2-40B4-BE49-F238E27FC236}">
+                <a16:creationId xmlns:a16="http://schemas.microsoft.com/office/drawing/2014/main" id="{C4EE9B25-AD2C-4E47-8D05-026EAA94F781}"/>
+              </a:ext>
+            </a:extLst>
+          </p:cNvPr>
+          <p:cNvSpPr>
+            <a:spLocks noGrp="1"/>
+          </p:cNvSpPr>
+          <p:nvPr>
+            <p:ph idx="1"/>
+          </p:nvPr>
+        </p:nvSpPr>
+        <p:spPr/>
+        <p:txBody>
+          <a:bodyPr/>
+          <a:lstStyle/>
+          <a:p>
+            <a:pPr marL="514350" indent="-514350">
+              <a:buFont typeface="+mj-lt"/>
+              <a:buAutoNum type="arabicPeriod"/>
+            </a:pPr>
+            <a:endParaRPr lang="pt-BR" dirty="0"/>
+          </a:p>
+        </p:txBody>
+      </p:sp>
+      <p:sp>
+        <p:nvSpPr>
+          <p:cNvPr id="4" name="Espaço Reservado para Número de Slide 3">
+            <a:extLst>
+              <a:ext uri="{FF2B5EF4-FFF2-40B4-BE49-F238E27FC236}">
+                <a16:creationId xmlns:a16="http://schemas.microsoft.com/office/drawing/2014/main" id="{4C23ED5E-8ECA-40EE-8A4E-9A7EB14D0834}"/>
+              </a:ext>
+            </a:extLst>
+          </p:cNvPr>
+          <p:cNvSpPr>
+            <a:spLocks noGrp="1"/>
+          </p:cNvSpPr>
+          <p:nvPr>
+            <p:ph type="sldNum" sz="quarter" idx="12"/>
+          </p:nvPr>
+        </p:nvSpPr>
+        <p:spPr/>
+        <p:txBody>
+          <a:bodyPr/>
+          <a:lstStyle/>
+          <a:p>
+            <a:fld id="{805BF21B-4AC2-4D1F-B6C5-0BA92CC7D07E}" type="slidenum">
+              <a:rPr lang="pt-BR" smtClean="0"/>
+              <a:t>2</a:t>
+            </a:fld>
+            <a:endParaRPr lang="pt-BR"/>
+          </a:p>
+        </p:txBody>
+      </p:sp>
+    </p:spTree>
+    <p:extLst>
+      <p:ext uri="{BB962C8B-B14F-4D97-AF65-F5344CB8AC3E}">
+        <p14:creationId xmlns:p14="http://schemas.microsoft.com/office/powerpoint/2010/main" val="2339816781"/>
+      </p:ext>
+    </p:extLst>
+  </p:cSld>
+  <p:clrMapOvr>
+    <a:masterClrMapping/>
+  </p:clrMapOvr>
+</p:sld>
+</file>
+
+<file path=ppt/slides/slide3.xml><?xml version="1.0" encoding="utf-8"?>
+<p:sld xmlns:a="http://schemas.openxmlformats.org/drawingml/2006/main" xmlns:r="http://schemas.openxmlformats.org/officeDocument/2006/relationships" xmlns:p="http://schemas.openxmlformats.org/presentationml/2006/main">
+  <p:cSld>
+    <p:spTree>
+      <p:nvGrpSpPr>
+        <p:cNvPr id="1" name=""/>
+        <p:cNvGrpSpPr/>
+        <p:nvPr/>
+      </p:nvGrpSpPr>
+      <p:grpSpPr>
+        <a:xfrm>
+          <a:off x="0" y="0"/>
+          <a:ext cx="0" cy="0"/>
+          <a:chOff x="0" y="0"/>
+          <a:chExt cx="0" cy="0"/>
+        </a:xfrm>
+      </p:grpSpPr>
+      <p:sp>
+        <p:nvSpPr>
+          <p:cNvPr id="2" name="Título 1">
+            <a:extLst>
+              <a:ext uri="{FF2B5EF4-FFF2-40B4-BE49-F238E27FC236}">
+                <a16:creationId xmlns:a16="http://schemas.microsoft.com/office/drawing/2014/main" id="{38F17D4B-1B57-45C1-A0F0-D3A58151502D}"/>
+              </a:ext>
+            </a:extLst>
+          </p:cNvPr>
+          <p:cNvSpPr>
+            <a:spLocks noGrp="1"/>
+          </p:cNvSpPr>
+          <p:nvPr>
+            <p:ph type="title"/>
+          </p:nvPr>
+        </p:nvSpPr>
+        <p:spPr/>
+        <p:txBody>
+          <a:bodyPr/>
+          <a:lstStyle/>
+          <a:p>
+            <a:r>
+              <a:rPr lang="pt-BR" dirty="0"/>
+              <a:t>Objetivos com o trabalho</a:t>
+            </a:r>
+          </a:p>
+        </p:txBody>
+      </p:sp>
+      <p:sp>
+        <p:nvSpPr>
+          <p:cNvPr id="3" name="Espaço Reservado para Conteúdo 2">
+            <a:extLst>
+              <a:ext uri="{FF2B5EF4-FFF2-40B4-BE49-F238E27FC236}">
+                <a16:creationId xmlns:a16="http://schemas.microsoft.com/office/drawing/2014/main" id="{E0E924DB-59EC-4539-B090-BDA922E66BB5}"/>
+              </a:ext>
+            </a:extLst>
+          </p:cNvPr>
+          <p:cNvSpPr>
+            <a:spLocks noGrp="1"/>
+          </p:cNvSpPr>
+          <p:nvPr>
+            <p:ph idx="1"/>
+          </p:nvPr>
+        </p:nvSpPr>
+        <p:spPr/>
+        <p:txBody>
+          <a:bodyPr/>
+          <a:lstStyle/>
+          <a:p>
+            <a:r>
+              <a:rPr lang="pt-BR" dirty="0"/>
+              <a:t>Utilização da biblioteca </a:t>
+            </a:r>
+            <a:r>
+              <a:rPr lang="pt-BR" dirty="0" err="1"/>
+              <a:t>Leaflet</a:t>
+            </a:r>
+            <a:r>
+              <a:rPr lang="pt-BR" dirty="0"/>
+              <a:t> para compor o mapa principal</a:t>
+            </a:r>
+          </a:p>
+          <a:p>
+            <a:r>
+              <a:rPr lang="pt-BR" dirty="0"/>
+              <a:t>Associar a colaboração a um dos tipos de dados vetoriais existentes – ponto, linha ou polígono (dimensionamento do fato observado)</a:t>
+            </a:r>
+          </a:p>
+          <a:p>
+            <a:r>
+              <a:rPr lang="pt-BR" dirty="0"/>
+              <a:t>Exportação dos dados no formato </a:t>
+            </a:r>
+            <a:r>
+              <a:rPr lang="pt-BR" dirty="0" err="1"/>
+              <a:t>geojson</a:t>
+            </a:r>
+            <a:r>
+              <a:rPr lang="pt-BR" dirty="0"/>
+              <a:t> e </a:t>
+            </a:r>
+            <a:r>
+              <a:rPr lang="pt-BR" dirty="0" err="1"/>
+              <a:t>csv</a:t>
+            </a:r>
+            <a:r>
+              <a:rPr lang="pt-BR" dirty="0"/>
+              <a:t>, permitindo assim a leitura deles por qualquer sistema GIS (Sistema de Informação Geográfica)</a:t>
+            </a:r>
+          </a:p>
+        </p:txBody>
+      </p:sp>
+      <p:sp>
+        <p:nvSpPr>
+          <p:cNvPr id="4" name="Espaço Reservado para Número de Slide 3">
+            <a:extLst>
+              <a:ext uri="{FF2B5EF4-FFF2-40B4-BE49-F238E27FC236}">
+                <a16:creationId xmlns:a16="http://schemas.microsoft.com/office/drawing/2014/main" id="{9CC864FD-B25A-4021-9A49-780D92B3FE1F}"/>
+              </a:ext>
+            </a:extLst>
+          </p:cNvPr>
+          <p:cNvSpPr>
+            <a:spLocks noGrp="1"/>
+          </p:cNvSpPr>
+          <p:nvPr>
+            <p:ph type="sldNum" sz="quarter" idx="12"/>
+          </p:nvPr>
+        </p:nvSpPr>
+        <p:spPr/>
+        <p:txBody>
+          <a:bodyPr/>
+          <a:lstStyle/>
+          <a:p>
+            <a:fld id="{805BF21B-4AC2-4D1F-B6C5-0BA92CC7D07E}" type="slidenum">
+              <a:rPr lang="pt-BR" smtClean="0"/>
+              <a:t>3</a:t>
+            </a:fld>
+            <a:endParaRPr lang="pt-BR"/>
+          </a:p>
+        </p:txBody>
+      </p:sp>
+    </p:spTree>
+    <p:extLst>
+      <p:ext uri="{BB962C8B-B14F-4D97-AF65-F5344CB8AC3E}">
+        <p14:creationId xmlns:p14="http://schemas.microsoft.com/office/powerpoint/2010/main" val="2762171324"/>
+      </p:ext>
+    </p:extLst>
+  </p:cSld>
+  <p:clrMapOvr>
+    <a:masterClrMapping/>
+  </p:clrMapOvr>
+</p:sld>
+</file>
+
+<file path=ppt/slides/slide4.xml><?xml version="1.0" encoding="utf-8"?>
+<p:sld xmlns:a="http://schemas.openxmlformats.org/drawingml/2006/main" xmlns:r="http://schemas.openxmlformats.org/officeDocument/2006/relationships" xmlns:p="http://schemas.openxmlformats.org/presentationml/2006/main">
+  <p:cSld>
+    <p:spTree>
+      <p:nvGrpSpPr>
+        <p:cNvPr id="1" name=""/>
+        <p:cNvGrpSpPr/>
+        <p:nvPr/>
+      </p:nvGrpSpPr>
+      <p:grpSpPr>
+        <a:xfrm>
+          <a:off x="0" y="0"/>
+          <a:ext cx="0" cy="0"/>
+          <a:chOff x="0" y="0"/>
+          <a:chExt cx="0" cy="0"/>
+        </a:xfrm>
+      </p:grpSpPr>
+      <p:sp>
+        <p:nvSpPr>
+          <p:cNvPr id="2" name="Título 1">
+            <a:extLst>
+              <a:ext uri="{FF2B5EF4-FFF2-40B4-BE49-F238E27FC236}">
+                <a16:creationId xmlns:a16="http://schemas.microsoft.com/office/drawing/2014/main" id="{38F17D4B-1B57-45C1-A0F0-D3A58151502D}"/>
+              </a:ext>
+            </a:extLst>
+          </p:cNvPr>
+          <p:cNvSpPr>
+            <a:spLocks noGrp="1"/>
+          </p:cNvSpPr>
+          <p:nvPr>
+            <p:ph type="title"/>
+          </p:nvPr>
+        </p:nvSpPr>
+        <p:spPr/>
+        <p:txBody>
+          <a:bodyPr/>
+          <a:lstStyle/>
+          <a:p>
+            <a:r>
+              <a:rPr lang="pt-BR" dirty="0"/>
+              <a:t>Objetivos com o trabalho</a:t>
+            </a:r>
+          </a:p>
+        </p:txBody>
+      </p:sp>
+      <p:sp>
+        <p:nvSpPr>
+          <p:cNvPr id="3" name="Espaço Reservado para Conteúdo 2">
+            <a:extLst>
+              <a:ext uri="{FF2B5EF4-FFF2-40B4-BE49-F238E27FC236}">
+                <a16:creationId xmlns:a16="http://schemas.microsoft.com/office/drawing/2014/main" id="{E0E924DB-59EC-4539-B090-BDA922E66BB5}"/>
+              </a:ext>
+            </a:extLst>
+          </p:cNvPr>
+          <p:cNvSpPr>
+            <a:spLocks noGrp="1"/>
+          </p:cNvSpPr>
+          <p:nvPr>
+            <p:ph idx="1"/>
+          </p:nvPr>
+        </p:nvSpPr>
+        <p:spPr/>
+        <p:txBody>
+          <a:bodyPr/>
+          <a:lstStyle/>
+          <a:p>
+            <a:r>
+              <a:rPr lang="pt-BR" dirty="0"/>
+              <a:t>Utilização da biblioteca </a:t>
+            </a:r>
+            <a:r>
+              <a:rPr lang="pt-BR" dirty="0" err="1"/>
+              <a:t>Leaflet</a:t>
+            </a:r>
+            <a:r>
+              <a:rPr lang="pt-BR" dirty="0"/>
+              <a:t> para compor o mapa principal</a:t>
+            </a:r>
+          </a:p>
+          <a:p>
+            <a:r>
+              <a:rPr lang="pt-BR" dirty="0"/>
+              <a:t>Associar a colaboração a um dos tipos de dados vetoriais existentes – ponto, linha ou polígono (dimensionamento do fato observado)</a:t>
+            </a:r>
+          </a:p>
+          <a:p>
+            <a:r>
+              <a:rPr lang="pt-BR" dirty="0"/>
+              <a:t>Exportação dos dados no formato </a:t>
+            </a:r>
+            <a:r>
+              <a:rPr lang="pt-BR" dirty="0" err="1"/>
+              <a:t>geojson</a:t>
+            </a:r>
+            <a:r>
+              <a:rPr lang="pt-BR" dirty="0"/>
+              <a:t> e </a:t>
+            </a:r>
+            <a:r>
+              <a:rPr lang="pt-BR" dirty="0" err="1"/>
+              <a:t>csv</a:t>
+            </a:r>
+            <a:r>
+              <a:rPr lang="pt-BR" dirty="0"/>
+              <a:t>, permitindo assim a leitura deles por qualquer sistema GIS (Sistema de Informação Geográfica)</a:t>
+            </a:r>
+          </a:p>
+        </p:txBody>
+      </p:sp>
+      <p:sp>
+        <p:nvSpPr>
+          <p:cNvPr id="4" name="Espaço Reservado para Número de Slide 3">
+            <a:extLst>
+              <a:ext uri="{FF2B5EF4-FFF2-40B4-BE49-F238E27FC236}">
+                <a16:creationId xmlns:a16="http://schemas.microsoft.com/office/drawing/2014/main" id="{9CC864FD-B25A-4021-9A49-780D92B3FE1F}"/>
+              </a:ext>
+            </a:extLst>
+          </p:cNvPr>
+          <p:cNvSpPr>
+            <a:spLocks noGrp="1"/>
+          </p:cNvSpPr>
+          <p:nvPr>
+            <p:ph type="sldNum" sz="quarter" idx="12"/>
+          </p:nvPr>
+        </p:nvSpPr>
+        <p:spPr/>
+        <p:txBody>
+          <a:bodyPr/>
+          <a:lstStyle/>
+          <a:p>
+            <a:fld id="{805BF21B-4AC2-4D1F-B6C5-0BA92CC7D07E}" type="slidenum">
+              <a:rPr lang="pt-BR" smtClean="0"/>
+              <a:t>4</a:t>
+            </a:fld>
+            <a:endParaRPr lang="pt-BR"/>
+          </a:p>
+        </p:txBody>
+      </p:sp>
+      <p:pic>
+        <p:nvPicPr>
+          <p:cNvPr id="5" name="Imagem 4">
+            <a:extLst>
+              <a:ext uri="{FF2B5EF4-FFF2-40B4-BE49-F238E27FC236}">
+                <a16:creationId xmlns:a16="http://schemas.microsoft.com/office/drawing/2014/main" id="{DA662172-9C97-4773-A555-08FFE52EE3B7}"/>
+              </a:ext>
+            </a:extLst>
+          </p:cNvPr>
+          <p:cNvPicPr>
+            <a:picLocks noChangeAspect="1"/>
+          </p:cNvPicPr>
+          <p:nvPr/>
+        </p:nvPicPr>
+        <p:blipFill>
+          <a:blip r:embed="rId2">
+            <a:extLst>
+              <a:ext uri="{28A0092B-C50C-407E-A947-70E740481C1C}">
+                <a14:useLocalDpi xmlns:a14="http://schemas.microsoft.com/office/drawing/2010/main" val="0"/>
+              </a:ext>
+            </a:extLst>
+          </a:blip>
+          <a:stretch>
+            <a:fillRect/>
+          </a:stretch>
+        </p:blipFill>
+        <p:spPr>
+          <a:xfrm>
+            <a:off x="10123535" y="2172311"/>
+            <a:ext cx="295470" cy="302153"/>
+          </a:xfrm>
+          <a:prstGeom prst="rect">
+            <a:avLst/>
+          </a:prstGeom>
+        </p:spPr>
+      </p:pic>
+      <p:pic>
+        <p:nvPicPr>
+          <p:cNvPr id="7" name="Imagem 6">
+            <a:extLst>
+              <a:ext uri="{FF2B5EF4-FFF2-40B4-BE49-F238E27FC236}">
+                <a16:creationId xmlns:a16="http://schemas.microsoft.com/office/drawing/2014/main" id="{65927178-6CC9-42EF-B492-DA0816FFE1EF}"/>
+              </a:ext>
+            </a:extLst>
+          </p:cNvPr>
+          <p:cNvPicPr>
+            <a:picLocks noChangeAspect="1"/>
+          </p:cNvPicPr>
+          <p:nvPr/>
+        </p:nvPicPr>
+        <p:blipFill>
+          <a:blip r:embed="rId2">
+            <a:extLst>
+              <a:ext uri="{28A0092B-C50C-407E-A947-70E740481C1C}">
+                <a14:useLocalDpi xmlns:a14="http://schemas.microsoft.com/office/drawing/2010/main" val="0"/>
+              </a:ext>
+            </a:extLst>
+          </a:blip>
+          <a:stretch>
+            <a:fillRect/>
+          </a:stretch>
+        </p:blipFill>
+        <p:spPr>
+          <a:xfrm>
+            <a:off x="10229364" y="2857960"/>
+            <a:ext cx="270684" cy="276806"/>
+          </a:xfrm>
+          <a:prstGeom prst="rect">
+            <a:avLst/>
+          </a:prstGeom>
+        </p:spPr>
+      </p:pic>
+      <p:pic>
+        <p:nvPicPr>
+          <p:cNvPr id="8" name="Imagem 7">
+            <a:extLst>
+              <a:ext uri="{FF2B5EF4-FFF2-40B4-BE49-F238E27FC236}">
+                <a16:creationId xmlns:a16="http://schemas.microsoft.com/office/drawing/2014/main" id="{CB3A4738-D641-47D6-AE8C-CE2080DD85AD}"/>
+              </a:ext>
+            </a:extLst>
+          </p:cNvPr>
+          <p:cNvPicPr>
+            <a:picLocks noChangeAspect="1"/>
+          </p:cNvPicPr>
+          <p:nvPr/>
+        </p:nvPicPr>
+        <p:blipFill>
+          <a:blip r:embed="rId2">
+            <a:extLst>
+              <a:ext uri="{28A0092B-C50C-407E-A947-70E740481C1C}">
+                <a14:useLocalDpi xmlns:a14="http://schemas.microsoft.com/office/drawing/2010/main" val="0"/>
+              </a:ext>
+            </a:extLst>
+          </a:blip>
+          <a:stretch>
+            <a:fillRect/>
+          </a:stretch>
+        </p:blipFill>
+        <p:spPr>
+          <a:xfrm>
+            <a:off x="10671013" y="3504882"/>
+            <a:ext cx="270684" cy="276806"/>
+          </a:xfrm>
+          <a:prstGeom prst="rect">
+            <a:avLst/>
+          </a:prstGeom>
+        </p:spPr>
+      </p:pic>
+    </p:spTree>
+    <p:extLst>
+      <p:ext uri="{BB962C8B-B14F-4D97-AF65-F5344CB8AC3E}">
+        <p14:creationId xmlns:p14="http://schemas.microsoft.com/office/powerpoint/2010/main" val="278982379"/>
+      </p:ext>
+    </p:extLst>
+  </p:cSld>
+  <p:clrMapOvr>
+    <a:masterClrMapping/>
+  </p:clrMapOvr>
+</p:sld>
+</file>
+
+<file path=ppt/slides/slide5.xml><?xml version="1.0" encoding="utf-8"?>
+<p:sld xmlns:a="http://schemas.openxmlformats.org/drawingml/2006/main" xmlns:r="http://schemas.openxmlformats.org/officeDocument/2006/relationships" xmlns:p="http://schemas.openxmlformats.org/presentationml/2006/main">
+  <p:cSld>
+    <p:spTree>
+      <p:nvGrpSpPr>
+        <p:cNvPr id="1" name=""/>
+        <p:cNvGrpSpPr/>
+        <p:nvPr/>
+      </p:nvGrpSpPr>
+      <p:grpSpPr>
+        <a:xfrm>
+          <a:off x="0" y="0"/>
+          <a:ext cx="0" cy="0"/>
+          <a:chOff x="0" y="0"/>
+          <a:chExt cx="0" cy="0"/>
+        </a:xfrm>
+      </p:grpSpPr>
+      <p:sp>
+        <p:nvSpPr>
+          <p:cNvPr id="2" name="Título 1">
+            <a:extLst>
+              <a:ext uri="{FF2B5EF4-FFF2-40B4-BE49-F238E27FC236}">
+                <a16:creationId xmlns:a16="http://schemas.microsoft.com/office/drawing/2014/main" id="{68186E4F-188C-4D1D-8B29-09EC2EA6C34B}"/>
+              </a:ext>
+            </a:extLst>
+          </p:cNvPr>
+          <p:cNvSpPr>
+            <a:spLocks noGrp="1"/>
+          </p:cNvSpPr>
+          <p:nvPr>
+            <p:ph type="title"/>
+          </p:nvPr>
+        </p:nvSpPr>
+        <p:spPr/>
+        <p:txBody>
+          <a:bodyPr/>
+          <a:lstStyle/>
+          <a:p>
+            <a:r>
+              <a:rPr lang="pt-BR" dirty="0"/>
+              <a:t>Arquitetura Geral</a:t>
+            </a:r>
+          </a:p>
+        </p:txBody>
+      </p:sp>
+      <p:pic>
+        <p:nvPicPr>
+          <p:cNvPr id="6" name="Espaço Reservado para Conteúdo 5">
+            <a:extLst>
+              <a:ext uri="{FF2B5EF4-FFF2-40B4-BE49-F238E27FC236}">
+                <a16:creationId xmlns:a16="http://schemas.microsoft.com/office/drawing/2014/main" id="{253465CA-D9B9-400B-9131-D064E0B2D33B}"/>
+              </a:ext>
+            </a:extLst>
+          </p:cNvPr>
+          <p:cNvPicPr>
+            <a:picLocks noGrp="1" noChangeAspect="1"/>
+          </p:cNvPicPr>
+          <p:nvPr>
+            <p:ph idx="1"/>
+          </p:nvPr>
+        </p:nvPicPr>
+        <p:blipFill>
+          <a:blip r:embed="rId2">
+            <a:extLst>
+              <a:ext uri="{28A0092B-C50C-407E-A947-70E740481C1C}">
+                <a14:useLocalDpi xmlns:a14="http://schemas.microsoft.com/office/drawing/2010/main" val="0"/>
+              </a:ext>
+            </a:extLst>
+          </a:blip>
+          <a:stretch>
+            <a:fillRect/>
+          </a:stretch>
+        </p:blipFill>
+        <p:spPr>
+          <a:xfrm>
+            <a:off x="2042419" y="2043421"/>
+            <a:ext cx="8432482" cy="2771158"/>
+          </a:xfrm>
+        </p:spPr>
+      </p:pic>
+      <p:sp>
+        <p:nvSpPr>
+          <p:cNvPr id="10" name="Espaço Reservado para Número de Slide 9">
+            <a:extLst>
+              <a:ext uri="{FF2B5EF4-FFF2-40B4-BE49-F238E27FC236}">
+                <a16:creationId xmlns:a16="http://schemas.microsoft.com/office/drawing/2014/main" id="{7F9137DF-9FF8-464D-9AE9-C38D4B72BD96}"/>
+              </a:ext>
+            </a:extLst>
+          </p:cNvPr>
+          <p:cNvSpPr>
+            <a:spLocks noGrp="1"/>
+          </p:cNvSpPr>
+          <p:nvPr>
+            <p:ph type="sldNum" sz="quarter" idx="12"/>
+          </p:nvPr>
+        </p:nvSpPr>
+        <p:spPr/>
+        <p:txBody>
+          <a:bodyPr/>
+          <a:lstStyle/>
+          <a:p>
+            <a:fld id="{805BF21B-4AC2-4D1F-B6C5-0BA92CC7D07E}" type="slidenum">
+              <a:rPr lang="pt-BR" smtClean="0"/>
+              <a:t>5</a:t>
+            </a:fld>
+            <a:endParaRPr lang="pt-BR"/>
+          </a:p>
+        </p:txBody>
+      </p:sp>
+    </p:spTree>
+    <p:extLst>
+      <p:ext uri="{BB962C8B-B14F-4D97-AF65-F5344CB8AC3E}">
+        <p14:creationId xmlns:p14="http://schemas.microsoft.com/office/powerpoint/2010/main" val="1452209387"/>
+      </p:ext>
+    </p:extLst>
+  </p:cSld>
+  <p:clrMapOvr>
+    <a:masterClrMapping/>
+  </p:clrMapOvr>
+</p:sld>
+</file>
+
+<file path=ppt/slides/slide6.xml><?xml version="1.0" encoding="utf-8"?>
+<p:sld xmlns:a="http://schemas.openxmlformats.org/drawingml/2006/main" xmlns:r="http://schemas.openxmlformats.org/officeDocument/2006/relationships" xmlns:p="http://schemas.openxmlformats.org/presentationml/2006/main">
+  <p:cSld>
+    <p:spTree>
+      <p:nvGrpSpPr>
+        <p:cNvPr id="1" name=""/>
+        <p:cNvGrpSpPr/>
+        <p:nvPr/>
+      </p:nvGrpSpPr>
+      <p:grpSpPr>
+        <a:xfrm>
+          <a:off x="0" y="0"/>
+          <a:ext cx="0" cy="0"/>
+          <a:chOff x="0" y="0"/>
+          <a:chExt cx="0" cy="0"/>
+        </a:xfrm>
+      </p:grpSpPr>
+      <p:sp>
+        <p:nvSpPr>
+          <p:cNvPr id="2" name="Título 1">
+            <a:extLst>
+              <a:ext uri="{FF2B5EF4-FFF2-40B4-BE49-F238E27FC236}">
+                <a16:creationId xmlns:a16="http://schemas.microsoft.com/office/drawing/2014/main" id="{119DA3CA-954D-43FB-B3CD-A7560E98D39E}"/>
+              </a:ext>
+            </a:extLst>
+          </p:cNvPr>
+          <p:cNvSpPr>
+            <a:spLocks noGrp="1"/>
+          </p:cNvSpPr>
+          <p:nvPr>
+            <p:ph type="title"/>
+          </p:nvPr>
+        </p:nvSpPr>
+        <p:spPr/>
+        <p:txBody>
+          <a:bodyPr/>
+          <a:lstStyle/>
+          <a:p>
+            <a:r>
+              <a:rPr lang="pt-BR" dirty="0"/>
+              <a:t>Casos de Uso</a:t>
+            </a:r>
+          </a:p>
+        </p:txBody>
+      </p:sp>
+      <p:pic>
+        <p:nvPicPr>
+          <p:cNvPr id="6" name="Espaço Reservado para Conteúdo 5">
+            <a:extLst>
+              <a:ext uri="{FF2B5EF4-FFF2-40B4-BE49-F238E27FC236}">
+                <a16:creationId xmlns:a16="http://schemas.microsoft.com/office/drawing/2014/main" id="{A1E25205-3022-4010-90FF-2D8A668D1C94}"/>
+              </a:ext>
+            </a:extLst>
+          </p:cNvPr>
+          <p:cNvPicPr>
+            <a:picLocks noGrp="1" noChangeAspect="1"/>
+          </p:cNvPicPr>
+          <p:nvPr>
+            <p:ph idx="1"/>
+          </p:nvPr>
+        </p:nvPicPr>
+        <p:blipFill>
+          <a:blip r:embed="rId2">
+            <a:extLst>
+              <a:ext uri="{28A0092B-C50C-407E-A947-70E740481C1C}">
+                <a14:useLocalDpi xmlns:a14="http://schemas.microsoft.com/office/drawing/2010/main" val="0"/>
+              </a:ext>
+            </a:extLst>
+          </a:blip>
+          <a:stretch>
+            <a:fillRect/>
+          </a:stretch>
+        </p:blipFill>
+        <p:spPr>
+          <a:xfrm>
+            <a:off x="2718624" y="1264555"/>
+            <a:ext cx="5706918" cy="5593445"/>
+          </a:xfrm>
+        </p:spPr>
+      </p:pic>
+      <p:sp>
+        <p:nvSpPr>
+          <p:cNvPr id="4" name="Espaço Reservado para Número de Slide 3">
+            <a:extLst>
+              <a:ext uri="{FF2B5EF4-FFF2-40B4-BE49-F238E27FC236}">
+                <a16:creationId xmlns:a16="http://schemas.microsoft.com/office/drawing/2014/main" id="{5093E353-3295-4A4A-8ECE-6EE1D2C7C31D}"/>
+              </a:ext>
+            </a:extLst>
+          </p:cNvPr>
+          <p:cNvSpPr>
+            <a:spLocks noGrp="1"/>
+          </p:cNvSpPr>
+          <p:nvPr>
+            <p:ph type="sldNum" sz="quarter" idx="12"/>
+          </p:nvPr>
+        </p:nvSpPr>
+        <p:spPr/>
+        <p:txBody>
+          <a:bodyPr/>
+          <a:lstStyle/>
+          <a:p>
+            <a:fld id="{805BF21B-4AC2-4D1F-B6C5-0BA92CC7D07E}" type="slidenum">
+              <a:rPr lang="pt-BR" smtClean="0"/>
+              <a:t>6</a:t>
+            </a:fld>
+            <a:endParaRPr lang="pt-BR"/>
+          </a:p>
+        </p:txBody>
+      </p:sp>
+    </p:spTree>
+    <p:extLst>
+      <p:ext uri="{BB962C8B-B14F-4D97-AF65-F5344CB8AC3E}">
+        <p14:creationId xmlns:p14="http://schemas.microsoft.com/office/powerpoint/2010/main" val="3453152970"/>
+      </p:ext>
+    </p:extLst>
+  </p:cSld>
+  <p:clrMapOvr>
+    <a:masterClrMapping/>
+  </p:clrMapOvr>
+</p:sld>
+</file>
+
+<file path=ppt/slides/slide7.xml><?xml version="1.0" encoding="utf-8"?>
+<p:sld xmlns:a="http://schemas.openxmlformats.org/drawingml/2006/main" xmlns:r="http://schemas.openxmlformats.org/officeDocument/2006/relationships" xmlns:p="http://schemas.openxmlformats.org/presentationml/2006/main">
+  <p:cSld>
+    <p:spTree>
+      <p:nvGrpSpPr>
+        <p:cNvPr id="1" name=""/>
+        <p:cNvGrpSpPr/>
+        <p:nvPr/>
+      </p:nvGrpSpPr>
+      <p:grpSpPr>
+        <a:xfrm>
+          <a:off x="0" y="0"/>
+          <a:ext cx="0" cy="0"/>
+          <a:chOff x="0" y="0"/>
+          <a:chExt cx="0" cy="0"/>
+        </a:xfrm>
+      </p:grpSpPr>
+      <p:sp>
+        <p:nvSpPr>
+          <p:cNvPr id="2" name="Título 1">
+            <a:extLst>
+              <a:ext uri="{FF2B5EF4-FFF2-40B4-BE49-F238E27FC236}">
+                <a16:creationId xmlns:a16="http://schemas.microsoft.com/office/drawing/2014/main" id="{647F773D-2546-44D2-A945-C0EFF8569E32}"/>
+              </a:ext>
+            </a:extLst>
+          </p:cNvPr>
+          <p:cNvSpPr>
+            <a:spLocks noGrp="1"/>
+          </p:cNvSpPr>
+          <p:nvPr>
+            <p:ph type="title"/>
+          </p:nvPr>
+        </p:nvSpPr>
+        <p:spPr/>
+        <p:txBody>
+          <a:bodyPr/>
+          <a:lstStyle/>
+          <a:p>
+            <a:endParaRPr lang="pt-BR"/>
+          </a:p>
+        </p:txBody>
+      </p:sp>
+      <p:sp>
+        <p:nvSpPr>
+          <p:cNvPr id="4" name="Espaço Reservado para Número de Slide 3">
+            <a:extLst>
+              <a:ext uri="{FF2B5EF4-FFF2-40B4-BE49-F238E27FC236}">
+                <a16:creationId xmlns:a16="http://schemas.microsoft.com/office/drawing/2014/main" id="{841A3836-F0D7-4255-BBD6-7D70D74ED40B}"/>
+              </a:ext>
+            </a:extLst>
+          </p:cNvPr>
+          <p:cNvSpPr>
+            <a:spLocks noGrp="1"/>
+          </p:cNvSpPr>
+          <p:nvPr>
+            <p:ph type="sldNum" sz="quarter" idx="12"/>
+          </p:nvPr>
+        </p:nvSpPr>
+        <p:spPr/>
+        <p:txBody>
+          <a:bodyPr/>
+          <a:lstStyle/>
+          <a:p>
+            <a:fld id="{805BF21B-4AC2-4D1F-B6C5-0BA92CC7D07E}" type="slidenum">
+              <a:rPr lang="pt-BR" smtClean="0"/>
+              <a:t>7</a:t>
+            </a:fld>
+            <a:endParaRPr lang="pt-BR"/>
+          </a:p>
+        </p:txBody>
+      </p:sp>
+      <p:sp>
+        <p:nvSpPr>
+          <p:cNvPr id="8" name="Espaço Reservado para Conteúdo 7">
+            <a:extLst>
+              <a:ext uri="{FF2B5EF4-FFF2-40B4-BE49-F238E27FC236}">
+                <a16:creationId xmlns:a16="http://schemas.microsoft.com/office/drawing/2014/main" id="{A6C8872E-26AC-49E2-A1A6-39FEB8C09B37}"/>
+              </a:ext>
+            </a:extLst>
+          </p:cNvPr>
+          <p:cNvSpPr>
+            <a:spLocks noGrp="1"/>
+          </p:cNvSpPr>
+          <p:nvPr>
+            <p:ph idx="1"/>
+          </p:nvPr>
+        </p:nvSpPr>
+        <p:spPr/>
+        <p:txBody>
+          <a:bodyPr/>
+          <a:lstStyle/>
+          <a:p>
+            <a:r>
+              <a:rPr lang="pt-BR" dirty="0"/>
+              <a:t>(tela de admin)</a:t>
+            </a:r>
+          </a:p>
+        </p:txBody>
+      </p:sp>
+    </p:spTree>
+    <p:extLst>
+      <p:ext uri="{BB962C8B-B14F-4D97-AF65-F5344CB8AC3E}">
+        <p14:creationId xmlns:p14="http://schemas.microsoft.com/office/powerpoint/2010/main" val="2822899287"/>
+      </p:ext>
+    </p:extLst>
+  </p:cSld>
+  <p:clrMapOvr>
+    <a:masterClrMapping/>
+  </p:clrMapOvr>
+</p:sld>
+</file>
+
+<file path=ppt/slides/slide8.xml><?xml version="1.0" encoding="utf-8"?>
+<p:sld xmlns:a="http://schemas.openxmlformats.org/drawingml/2006/main" xmlns:r="http://schemas.openxmlformats.org/officeDocument/2006/relationships" xmlns:p="http://schemas.openxmlformats.org/presentationml/2006/main">
+  <p:cSld>
+    <p:spTree>
+      <p:nvGrpSpPr>
+        <p:cNvPr id="1" name=""/>
+        <p:cNvGrpSpPr/>
+        <p:nvPr/>
+      </p:nvGrpSpPr>
+      <p:grpSpPr>
+        <a:xfrm>
+          <a:off x="0" y="0"/>
+          <a:ext cx="0" cy="0"/>
+          <a:chOff x="0" y="0"/>
+          <a:chExt cx="0" cy="0"/>
+        </a:xfrm>
+      </p:grpSpPr>
+      <p:sp>
+        <p:nvSpPr>
+          <p:cNvPr id="2" name="Título 1">
+            <a:extLst>
+              <a:ext uri="{FF2B5EF4-FFF2-40B4-BE49-F238E27FC236}">
+                <a16:creationId xmlns:a16="http://schemas.microsoft.com/office/drawing/2014/main" id="{8FC1F8BF-3AAC-4414-B562-434D2A0303BE}"/>
+              </a:ext>
+            </a:extLst>
+          </p:cNvPr>
+          <p:cNvSpPr>
+            <a:spLocks noGrp="1"/>
+          </p:cNvSpPr>
+          <p:nvPr>
+            <p:ph type="title"/>
+          </p:nvPr>
+        </p:nvSpPr>
+        <p:spPr/>
+        <p:txBody>
+          <a:bodyPr/>
+          <a:lstStyle/>
+          <a:p>
+            <a:endParaRPr lang="pt-BR"/>
+          </a:p>
+        </p:txBody>
+      </p:sp>
+      <p:sp>
+        <p:nvSpPr>
+          <p:cNvPr id="3" name="Espaço Reservado para Conteúdo 2">
+            <a:extLst>
+              <a:ext uri="{FF2B5EF4-FFF2-40B4-BE49-F238E27FC236}">
+                <a16:creationId xmlns:a16="http://schemas.microsoft.com/office/drawing/2014/main" id="{D0DFAB61-020A-4CE3-A0C9-9C3F14C57533}"/>
+              </a:ext>
+            </a:extLst>
+          </p:cNvPr>
+          <p:cNvSpPr>
+            <a:spLocks noGrp="1"/>
+          </p:cNvSpPr>
+          <p:nvPr>
+            <p:ph idx="1"/>
+          </p:nvPr>
+        </p:nvSpPr>
+        <p:spPr/>
+        <p:txBody>
+          <a:bodyPr/>
+          <a:lstStyle/>
+          <a:p>
+            <a:r>
+              <a:rPr lang="pt-BR" dirty="0"/>
+              <a:t>(tela de moderador)</a:t>
+            </a:r>
+          </a:p>
+        </p:txBody>
+      </p:sp>
+      <p:sp>
+        <p:nvSpPr>
+          <p:cNvPr id="4" name="Espaço Reservado para Número de Slide 3">
+            <a:extLst>
+              <a:ext uri="{FF2B5EF4-FFF2-40B4-BE49-F238E27FC236}">
+                <a16:creationId xmlns:a16="http://schemas.microsoft.com/office/drawing/2014/main" id="{E034A98E-6F42-4BC1-AFEC-48B56F5E12FE}"/>
+              </a:ext>
+            </a:extLst>
+          </p:cNvPr>
+          <p:cNvSpPr>
+            <a:spLocks noGrp="1"/>
+          </p:cNvSpPr>
+          <p:nvPr>
+            <p:ph type="sldNum" sz="quarter" idx="12"/>
+          </p:nvPr>
+        </p:nvSpPr>
+        <p:spPr/>
+        <p:txBody>
+          <a:bodyPr/>
+          <a:lstStyle/>
+          <a:p>
+            <a:fld id="{805BF21B-4AC2-4D1F-B6C5-0BA92CC7D07E}" type="slidenum">
+              <a:rPr lang="pt-BR" smtClean="0"/>
+              <a:t>8</a:t>
+            </a:fld>
+            <a:endParaRPr lang="pt-BR"/>
+          </a:p>
+        </p:txBody>
+      </p:sp>
+    </p:spTree>
+    <p:extLst>
+      <p:ext uri="{BB962C8B-B14F-4D97-AF65-F5344CB8AC3E}">
+        <p14:creationId xmlns:p14="http://schemas.microsoft.com/office/powerpoint/2010/main" val="936591440"/>
       </p:ext>
     </p:extLst>
   </p:cSld>
@@ -9739,7 +10252,7 @@
           <p:cNvPr id="2" name="Título 1">
             <a:extLst>
               <a:ext uri="{FF2B5EF4-FFF2-40B4-BE49-F238E27FC236}">
-                <a16:creationId xmlns:a16="http://schemas.microsoft.com/office/drawing/2014/main" id="{C8C25D02-69C4-4672-8EF0-F1C63F8E3237}"/>
+                <a16:creationId xmlns:a16="http://schemas.microsoft.com/office/drawing/2014/main" id="{9B962290-064B-4F56-AB1D-E1EB20FF6EAE}"/>
               </a:ext>
             </a:extLst>
           </p:cNvPr>
@@ -9755,11 +10268,7 @@
           <a:bodyPr/>
           <a:lstStyle/>
           <a:p>
-            <a:pPr algn="ctr"/>
-            <a:r>
-              <a:rPr lang="pt-BR" dirty="0"/>
-              <a:t>Dúvidas ou sugestões ?</a:t>
-            </a:r>
+            <a:endParaRPr lang="pt-BR"/>
           </a:p>
         </p:txBody>
       </p:sp>
@@ -9768,7 +10277,7 @@
           <p:cNvPr id="3" name="Espaço Reservado para Conteúdo 2">
             <a:extLst>
               <a:ext uri="{FF2B5EF4-FFF2-40B4-BE49-F238E27FC236}">
-                <a16:creationId xmlns:a16="http://schemas.microsoft.com/office/drawing/2014/main" id="{CE5ABC03-D737-4EBF-9571-BAA76FA72477}"/>
+                <a16:creationId xmlns:a16="http://schemas.microsoft.com/office/drawing/2014/main" id="{57C38AEF-D581-4818-BA13-B220F21FB8D8}"/>
               </a:ext>
             </a:extLst>
           </p:cNvPr>
@@ -9784,21 +10293,9 @@
           <a:bodyPr/>
           <a:lstStyle/>
           <a:p>
-            <a:endParaRPr lang="pt-BR" dirty="0"/>
-          </a:p>
-          <a:p>
-            <a:endParaRPr lang="pt-BR" dirty="0"/>
-          </a:p>
-          <a:p>
-            <a:endParaRPr lang="pt-BR" dirty="0"/>
-          </a:p>
-          <a:p>
-            <a:pPr marL="0" indent="0" algn="ctr">
-              <a:buNone/>
-            </a:pPr>
             <a:r>
               <a:rPr lang="pt-BR" dirty="0"/>
-              <a:t>https://github.com/TavaresCarlos/TCC</a:t>
+              <a:t>(tela de colaborador)</a:t>
             </a:r>
           </a:p>
         </p:txBody>
@@ -9808,7 +10305,7 @@
           <p:cNvPr id="4" name="Espaço Reservado para Número de Slide 3">
             <a:extLst>
               <a:ext uri="{FF2B5EF4-FFF2-40B4-BE49-F238E27FC236}">
-                <a16:creationId xmlns:a16="http://schemas.microsoft.com/office/drawing/2014/main" id="{9EF039A5-B09F-41E9-AFCC-E33B7F993C32}"/>
+                <a16:creationId xmlns:a16="http://schemas.microsoft.com/office/drawing/2014/main" id="{73427A7F-517E-4BA9-823D-17F9B79CE3A3}"/>
               </a:ext>
             </a:extLst>
           </p:cNvPr>
@@ -9835,7 +10332,7 @@
     </p:spTree>
     <p:extLst>
       <p:ext uri="{BB962C8B-B14F-4D97-AF65-F5344CB8AC3E}">
-        <p14:creationId xmlns:p14="http://schemas.microsoft.com/office/powerpoint/2010/main" val="1519502685"/>
+        <p14:creationId xmlns:p14="http://schemas.microsoft.com/office/powerpoint/2010/main" val="3145253642"/>
       </p:ext>
     </p:extLst>
   </p:cSld>

</xml_diff>